<commit_message>
Bug fixes; dbscan radius visualization added;
</commit_message>
<xml_diff>
--- a/Дипломная записка/ClusteringSearchResults.pptx
+++ b/Дипломная записка/ClusteringSearchResults.pptx
@@ -327,7 +327,7 @@
             <a:fld id="{B06E4FDA-C044-479F-B4CF-31789185B5D6}" type="datetimeFigureOut">
               <a:rPr lang="ru-RU" smtClean="0"/>
               <a:pPr/>
-              <a:t>27.10.2015</a:t>
+              <a:t>16.12.2015</a:t>
             </a:fld>
             <a:endParaRPr lang="ru-RU"/>
           </a:p>
@@ -594,7 +594,7 @@
             <a:fld id="{B06E4FDA-C044-479F-B4CF-31789185B5D6}" type="datetimeFigureOut">
               <a:rPr lang="ru-RU" smtClean="0"/>
               <a:pPr/>
-              <a:t>27.10.2015</a:t>
+              <a:t>16.12.2015</a:t>
             </a:fld>
             <a:endParaRPr lang="ru-RU"/>
           </a:p>
@@ -771,7 +771,7 @@
             <a:fld id="{B06E4FDA-C044-479F-B4CF-31789185B5D6}" type="datetimeFigureOut">
               <a:rPr lang="ru-RU" smtClean="0"/>
               <a:pPr/>
-              <a:t>27.10.2015</a:t>
+              <a:t>16.12.2015</a:t>
             </a:fld>
             <a:endParaRPr lang="ru-RU"/>
           </a:p>
@@ -938,7 +938,7 @@
             <a:fld id="{B06E4FDA-C044-479F-B4CF-31789185B5D6}" type="datetimeFigureOut">
               <a:rPr lang="ru-RU" smtClean="0"/>
               <a:pPr/>
-              <a:t>27.10.2015</a:t>
+              <a:t>16.12.2015</a:t>
             </a:fld>
             <a:endParaRPr lang="ru-RU"/>
           </a:p>
@@ -1189,7 +1189,7 @@
             <a:fld id="{B06E4FDA-C044-479F-B4CF-31789185B5D6}" type="datetimeFigureOut">
               <a:rPr lang="ru-RU" smtClean="0"/>
               <a:pPr/>
-              <a:t>27.10.2015</a:t>
+              <a:t>16.12.2015</a:t>
             </a:fld>
             <a:endParaRPr lang="ru-RU"/>
           </a:p>
@@ -1474,7 +1474,7 @@
             <a:fld id="{B06E4FDA-C044-479F-B4CF-31789185B5D6}" type="datetimeFigureOut">
               <a:rPr lang="ru-RU" smtClean="0"/>
               <a:pPr/>
-              <a:t>27.10.2015</a:t>
+              <a:t>16.12.2015</a:t>
             </a:fld>
             <a:endParaRPr lang="ru-RU"/>
           </a:p>
@@ -1915,7 +1915,7 @@
             <a:fld id="{B06E4FDA-C044-479F-B4CF-31789185B5D6}" type="datetimeFigureOut">
               <a:rPr lang="ru-RU" smtClean="0"/>
               <a:pPr/>
-              <a:t>27.10.2015</a:t>
+              <a:t>16.12.2015</a:t>
             </a:fld>
             <a:endParaRPr lang="ru-RU"/>
           </a:p>
@@ -2030,7 +2030,7 @@
             <a:fld id="{B06E4FDA-C044-479F-B4CF-31789185B5D6}" type="datetimeFigureOut">
               <a:rPr lang="ru-RU" smtClean="0"/>
               <a:pPr/>
-              <a:t>27.10.2015</a:t>
+              <a:t>16.12.2015</a:t>
             </a:fld>
             <a:endParaRPr lang="ru-RU"/>
           </a:p>
@@ -2122,7 +2122,7 @@
             <a:fld id="{B06E4FDA-C044-479F-B4CF-31789185B5D6}" type="datetimeFigureOut">
               <a:rPr lang="ru-RU" smtClean="0"/>
               <a:pPr/>
-              <a:t>27.10.2015</a:t>
+              <a:t>16.12.2015</a:t>
             </a:fld>
             <a:endParaRPr lang="ru-RU"/>
           </a:p>
@@ -2366,7 +2366,7 @@
             <a:fld id="{B06E4FDA-C044-479F-B4CF-31789185B5D6}" type="datetimeFigureOut">
               <a:rPr lang="ru-RU" smtClean="0"/>
               <a:pPr/>
-              <a:t>27.10.2015</a:t>
+              <a:t>16.12.2015</a:t>
             </a:fld>
             <a:endParaRPr lang="ru-RU"/>
           </a:p>
@@ -2662,7 +2662,7 @@
             <a:fld id="{B06E4FDA-C044-479F-B4CF-31789185B5D6}" type="datetimeFigureOut">
               <a:rPr lang="ru-RU" smtClean="0"/>
               <a:pPr/>
-              <a:t>27.10.2015</a:t>
+              <a:t>16.12.2015</a:t>
             </a:fld>
             <a:endParaRPr lang="ru-RU"/>
           </a:p>
@@ -2958,7 +2958,7 @@
             <a:fld id="{B06E4FDA-C044-479F-B4CF-31789185B5D6}" type="datetimeFigureOut">
               <a:rPr lang="ru-RU" smtClean="0"/>
               <a:pPr/>
-              <a:t>27.10.2015</a:t>
+              <a:t>16.12.2015</a:t>
             </a:fld>
             <a:endParaRPr lang="ru-RU"/>
           </a:p>
@@ -7323,11 +7323,11 @@
   <p:clrMapOvr>
     <a:masterClrMapping/>
   </p:clrMapOvr>
-  <mc:AlternateContent xmlns:mc="http://schemas.openxmlformats.org/markup-compatibility/2006">
-    <mc:Choice xmlns:p14="http://schemas.microsoft.com/office/powerpoint/2010/main" Requires="p14">
+  <mc:AlternateContent xmlns:mc="http://schemas.openxmlformats.org/markup-compatibility/2006" xmlns:p14="http://schemas.microsoft.com/office/powerpoint/2010/main">
+    <mc:Choice Requires="p14">
       <p:transition spd="slow" p14:dur="2000"/>
     </mc:Choice>
-    <mc:Fallback>
+    <mc:Fallback xmlns="">
       <p:transition spd="slow"/>
     </mc:Fallback>
   </mc:AlternateContent>
@@ -9795,11 +9795,11 @@
   <p:clrMapOvr>
     <a:masterClrMapping/>
   </p:clrMapOvr>
-  <mc:AlternateContent xmlns:mc="http://schemas.openxmlformats.org/markup-compatibility/2006">
-    <mc:Choice xmlns:p14="http://schemas.microsoft.com/office/powerpoint/2010/main" Requires="p14">
+  <mc:AlternateContent xmlns:mc="http://schemas.openxmlformats.org/markup-compatibility/2006" xmlns:p14="http://schemas.microsoft.com/office/powerpoint/2010/main">
+    <mc:Choice Requires="p14">
       <p:transition spd="slow" p14:dur="2000"/>
     </mc:Choice>
-    <mc:Fallback>
+    <mc:Fallback xmlns="">
       <p:transition spd="slow"/>
     </mc:Fallback>
   </mc:AlternateContent>
@@ -11890,11 +11890,11 @@
   <p:clrMapOvr>
     <a:masterClrMapping/>
   </p:clrMapOvr>
-  <mc:AlternateContent xmlns:mc="http://schemas.openxmlformats.org/markup-compatibility/2006">
-    <mc:Choice xmlns:p14="http://schemas.microsoft.com/office/powerpoint/2010/main" Requires="p14">
+  <mc:AlternateContent xmlns:mc="http://schemas.openxmlformats.org/markup-compatibility/2006" xmlns:p14="http://schemas.microsoft.com/office/powerpoint/2010/main">
+    <mc:Choice Requires="p14">
       <p:transition spd="slow" p14:dur="2000"/>
     </mc:Choice>
-    <mc:Fallback>
+    <mc:Fallback xmlns="">
       <p:transition spd="slow"/>
     </mc:Fallback>
   </mc:AlternateContent>
@@ -12893,11 +12893,11 @@
   <p:clrMapOvr>
     <a:masterClrMapping/>
   </p:clrMapOvr>
-  <mc:AlternateContent xmlns:mc="http://schemas.openxmlformats.org/markup-compatibility/2006">
-    <mc:Choice xmlns:p14="http://schemas.microsoft.com/office/powerpoint/2010/main" Requires="p14">
+  <mc:AlternateContent xmlns:mc="http://schemas.openxmlformats.org/markup-compatibility/2006" xmlns:p14="http://schemas.microsoft.com/office/powerpoint/2010/main">
+    <mc:Choice Requires="p14">
       <p:transition spd="slow" p14:dur="2000"/>
     </mc:Choice>
-    <mc:Fallback>
+    <mc:Fallback xmlns="">
       <p:transition spd="slow"/>
     </mc:Fallback>
   </mc:AlternateContent>
@@ -19182,43 +19182,20 @@
           <a:p>
             <a:r>
               <a:rPr lang="ru-RU" sz="2400" b="0" dirty="0" smtClean="0"/>
-              <a:t>1) </a:t>
-            </a:r>
+              <a:t>1) Выводятся неупорядоченно тематически</a:t>
+            </a:r>
+          </a:p>
+          <a:p>
             <a:r>
               <a:rPr lang="ru-RU" sz="2400" b="0" dirty="0" smtClean="0"/>
-              <a:t>Выводятся </a:t>
-            </a:r>
+              <a:t>2) Неудобно работать с полученными данными</a:t>
+            </a:r>
+          </a:p>
+          <a:p>
             <a:r>
               <a:rPr lang="ru-RU" sz="2400" b="0" dirty="0" smtClean="0"/>
-              <a:t>неупорядоченно </a:t>
-            </a:r>
-            <a:r>
-              <a:rPr lang="ru-RU" sz="2400" b="0" dirty="0" smtClean="0"/>
-              <a:t>тематически</a:t>
-            </a:r>
-            <a:endParaRPr lang="ru-RU" sz="2400" b="0" dirty="0" smtClean="0"/>
-          </a:p>
-          <a:p>
-            <a:r>
-              <a:rPr lang="ru-RU" sz="2400" b="0" dirty="0" smtClean="0"/>
-              <a:t>2) Неудобно работать с полученными </a:t>
-            </a:r>
-            <a:r>
-              <a:rPr lang="ru-RU" sz="2400" b="0" dirty="0" smtClean="0"/>
-              <a:t>данными</a:t>
-            </a:r>
-            <a:endParaRPr lang="ru-RU" sz="2400" b="0" dirty="0" smtClean="0"/>
-          </a:p>
-          <a:p>
-            <a:r>
-              <a:rPr lang="ru-RU" sz="2400" b="0" dirty="0" smtClean="0"/>
-              <a:t>3) Необходимо прописывать более подробный запрос для получения конкретной </a:t>
-            </a:r>
-            <a:r>
-              <a:rPr lang="ru-RU" sz="2400" b="0" dirty="0" smtClean="0"/>
-              <a:t>информации</a:t>
-            </a:r>
-            <a:endParaRPr lang="ru-RU" sz="2400" b="0" dirty="0" smtClean="0"/>
+              <a:t>3) Необходимо прописывать более подробный запрос для получения конкретной информации</a:t>
+            </a:r>
           </a:p>
         </p:txBody>
       </p:sp>
@@ -20803,7 +20780,7 @@
         </p:spPr>
         <p:txBody>
           <a:bodyPr>
-            <a:normAutofit fontScale="85000" lnSpcReduction="20000"/>
+            <a:normAutofit fontScale="92500" lnSpcReduction="20000"/>
           </a:bodyPr>
           <a:lstStyle/>
           <a:p>
@@ -20865,17 +20842,11 @@
           <a:p>
             <a:r>
               <a:rPr lang="ru-RU" b="0" dirty="0" smtClean="0"/>
-              <a:t>6) Новый </a:t>
-            </a:r>
-            <a:r>
-              <a:rPr lang="ru-RU" b="0" dirty="0"/>
-              <a:t>ракетный комплекс «Берёзка» планируют взять на вооружение в 2018 году.</a:t>
-            </a:r>
-          </a:p>
-          <a:p>
+              <a:t>7</a:t>
+            </a:r>
             <a:r>
               <a:rPr lang="ru-RU" b="0" dirty="0" smtClean="0"/>
-              <a:t>7) Леонардо </a:t>
+              <a:t>) Леонардо </a:t>
             </a:r>
             <a:r>
               <a:rPr lang="ru-RU" b="0" dirty="0" err="1"/>

</xml_diff>

<commit_message>
Site backup, nuget modules added
</commit_message>
<xml_diff>
--- a/Дипломная записка/ClusteringSearchResults.pptx
+++ b/Дипломная записка/ClusteringSearchResults.pptx
@@ -25,10 +25,10 @@
     <p:sldId id="270" r:id="rId19"/>
     <p:sldId id="283" r:id="rId20"/>
     <p:sldId id="286" r:id="rId21"/>
-    <p:sldId id="263" r:id="rId22"/>
-    <p:sldId id="272" r:id="rId23"/>
-    <p:sldId id="285" r:id="rId24"/>
-    <p:sldId id="284" r:id="rId25"/>
+    <p:sldId id="289" r:id="rId22"/>
+    <p:sldId id="290" r:id="rId23"/>
+    <p:sldId id="291" r:id="rId24"/>
+    <p:sldId id="285" r:id="rId25"/>
     <p:sldId id="287" r:id="rId26"/>
     <p:sldId id="288" r:id="rId27"/>
     <p:sldId id="273" r:id="rId28"/>
@@ -130,6 +130,22 @@
       </a:defRPr>
     </a:lvl9pPr>
   </p:defaultTextStyle>
+  <p:extLst>
+    <p:ext uri="{EFAFB233-063F-42B5-8137-9DF3F51BA10A}">
+      <p15:sldGuideLst xmlns:p15="http://schemas.microsoft.com/office/powerpoint/2012/main">
+        <p15:guide id="1" orient="horz" pos="2160">
+          <p15:clr>
+            <a:srgbClr val="A4A3A4"/>
+          </p15:clr>
+        </p15:guide>
+        <p15:guide id="2" pos="2880">
+          <p15:clr>
+            <a:srgbClr val="A4A3A4"/>
+          </p15:clr>
+        </p15:guide>
+      </p15:sldGuideLst>
+    </p:ext>
+  </p:extLst>
 </p:presentation>
 </file>
 
@@ -327,7 +343,7 @@
             <a:fld id="{B06E4FDA-C044-479F-B4CF-31789185B5D6}" type="datetimeFigureOut">
               <a:rPr lang="ru-RU" smtClean="0"/>
               <a:pPr/>
-              <a:t>27.10.2015</a:t>
+              <a:t>28.11.2015</a:t>
             </a:fld>
             <a:endParaRPr lang="ru-RU"/>
           </a:p>
@@ -594,7 +610,7 @@
             <a:fld id="{B06E4FDA-C044-479F-B4CF-31789185B5D6}" type="datetimeFigureOut">
               <a:rPr lang="ru-RU" smtClean="0"/>
               <a:pPr/>
-              <a:t>27.10.2015</a:t>
+              <a:t>28.11.2015</a:t>
             </a:fld>
             <a:endParaRPr lang="ru-RU"/>
           </a:p>
@@ -771,7 +787,7 @@
             <a:fld id="{B06E4FDA-C044-479F-B4CF-31789185B5D6}" type="datetimeFigureOut">
               <a:rPr lang="ru-RU" smtClean="0"/>
               <a:pPr/>
-              <a:t>27.10.2015</a:t>
+              <a:t>28.11.2015</a:t>
             </a:fld>
             <a:endParaRPr lang="ru-RU"/>
           </a:p>
@@ -938,7 +954,7 @@
             <a:fld id="{B06E4FDA-C044-479F-B4CF-31789185B5D6}" type="datetimeFigureOut">
               <a:rPr lang="ru-RU" smtClean="0"/>
               <a:pPr/>
-              <a:t>27.10.2015</a:t>
+              <a:t>28.11.2015</a:t>
             </a:fld>
             <a:endParaRPr lang="ru-RU"/>
           </a:p>
@@ -1189,7 +1205,7 @@
             <a:fld id="{B06E4FDA-C044-479F-B4CF-31789185B5D6}" type="datetimeFigureOut">
               <a:rPr lang="ru-RU" smtClean="0"/>
               <a:pPr/>
-              <a:t>27.10.2015</a:t>
+              <a:t>28.11.2015</a:t>
             </a:fld>
             <a:endParaRPr lang="ru-RU"/>
           </a:p>
@@ -1474,7 +1490,7 @@
             <a:fld id="{B06E4FDA-C044-479F-B4CF-31789185B5D6}" type="datetimeFigureOut">
               <a:rPr lang="ru-RU" smtClean="0"/>
               <a:pPr/>
-              <a:t>27.10.2015</a:t>
+              <a:t>28.11.2015</a:t>
             </a:fld>
             <a:endParaRPr lang="ru-RU"/>
           </a:p>
@@ -1915,7 +1931,7 @@
             <a:fld id="{B06E4FDA-C044-479F-B4CF-31789185B5D6}" type="datetimeFigureOut">
               <a:rPr lang="ru-RU" smtClean="0"/>
               <a:pPr/>
-              <a:t>27.10.2015</a:t>
+              <a:t>28.11.2015</a:t>
             </a:fld>
             <a:endParaRPr lang="ru-RU"/>
           </a:p>
@@ -2030,7 +2046,7 @@
             <a:fld id="{B06E4FDA-C044-479F-B4CF-31789185B5D6}" type="datetimeFigureOut">
               <a:rPr lang="ru-RU" smtClean="0"/>
               <a:pPr/>
-              <a:t>27.10.2015</a:t>
+              <a:t>28.11.2015</a:t>
             </a:fld>
             <a:endParaRPr lang="ru-RU"/>
           </a:p>
@@ -2122,7 +2138,7 @@
             <a:fld id="{B06E4FDA-C044-479F-B4CF-31789185B5D6}" type="datetimeFigureOut">
               <a:rPr lang="ru-RU" smtClean="0"/>
               <a:pPr/>
-              <a:t>27.10.2015</a:t>
+              <a:t>28.11.2015</a:t>
             </a:fld>
             <a:endParaRPr lang="ru-RU"/>
           </a:p>
@@ -2366,7 +2382,7 @@
             <a:fld id="{B06E4FDA-C044-479F-B4CF-31789185B5D6}" type="datetimeFigureOut">
               <a:rPr lang="ru-RU" smtClean="0"/>
               <a:pPr/>
-              <a:t>27.10.2015</a:t>
+              <a:t>28.11.2015</a:t>
             </a:fld>
             <a:endParaRPr lang="ru-RU"/>
           </a:p>
@@ -2662,7 +2678,7 @@
             <a:fld id="{B06E4FDA-C044-479F-B4CF-31789185B5D6}" type="datetimeFigureOut">
               <a:rPr lang="ru-RU" smtClean="0"/>
               <a:pPr/>
-              <a:t>27.10.2015</a:t>
+              <a:t>28.11.2015</a:t>
             </a:fld>
             <a:endParaRPr lang="ru-RU"/>
           </a:p>
@@ -2958,7 +2974,7 @@
             <a:fld id="{B06E4FDA-C044-479F-B4CF-31789185B5D6}" type="datetimeFigureOut">
               <a:rPr lang="ru-RU" smtClean="0"/>
               <a:pPr/>
-              <a:t>27.10.2015</a:t>
+              <a:t>28.11.2015</a:t>
             </a:fld>
             <a:endParaRPr lang="ru-RU"/>
           </a:p>
@@ -3558,8 +3574,20 @@
                 <a:tableStyleId>{69CF1AB2-1976-4502-BF36-3FF5EA218861}</a:tableStyleId>
               </a:tblPr>
               <a:tblGrid>
-                <a:gridCol w="3048000"/>
-                <a:gridCol w="3048000"/>
+                <a:gridCol w="3048000">
+                  <a:extLst>
+                    <a:ext uri="{9D8B030D-6E8A-4147-A177-3AD203B41FA5}">
+                      <a16:colId xmlns:a16="http://schemas.microsoft.com/office/drawing/2014/main" val="20000"/>
+                    </a:ext>
+                  </a:extLst>
+                </a:gridCol>
+                <a:gridCol w="3048000">
+                  <a:extLst>
+                    <a:ext uri="{9D8B030D-6E8A-4147-A177-3AD203B41FA5}">
+                      <a16:colId xmlns:a16="http://schemas.microsoft.com/office/drawing/2014/main" val="20001"/>
+                    </a:ext>
+                  </a:extLst>
+                </a:gridCol>
               </a:tblGrid>
               <a:tr h="648072">
                 <a:tc>
@@ -3633,6 +3661,11 @@
                   </a:txBody>
                   <a:tcPr/>
                 </a:tc>
+                <a:extLst>
+                  <a:ext uri="{0D108BD9-81ED-4DB2-BD59-A6C34878D82A}">
+                    <a16:rowId xmlns:a16="http://schemas.microsoft.com/office/drawing/2014/main" val="10000"/>
+                  </a:ext>
+                </a:extLst>
               </a:tr>
               <a:tr h="533706">
                 <a:tc>
@@ -3690,6 +3723,11 @@
                   </a:txBody>
                   <a:tcPr/>
                 </a:tc>
+                <a:extLst>
+                  <a:ext uri="{0D108BD9-81ED-4DB2-BD59-A6C34878D82A}">
+                    <a16:rowId xmlns:a16="http://schemas.microsoft.com/office/drawing/2014/main" val="10001"/>
+                  </a:ext>
+                </a:extLst>
               </a:tr>
             </a:tbl>
           </a:graphicData>
@@ -5427,15 +5465,69 @@
                 <a:tableStyleId>{5C22544A-7EE6-4342-B048-85BDC9FD1C3A}</a:tableStyleId>
               </a:tblPr>
               <a:tblGrid>
-                <a:gridCol w="1153920"/>
-                <a:gridCol w="675304"/>
-                <a:gridCol w="675304"/>
-                <a:gridCol w="675304"/>
-                <a:gridCol w="675304"/>
-                <a:gridCol w="675304"/>
-                <a:gridCol w="675304"/>
-                <a:gridCol w="675304"/>
-                <a:gridCol w="675304"/>
+                <a:gridCol w="1153920">
+                  <a:extLst>
+                    <a:ext uri="{9D8B030D-6E8A-4147-A177-3AD203B41FA5}">
+                      <a16:colId xmlns:a16="http://schemas.microsoft.com/office/drawing/2014/main" val="20000"/>
+                    </a:ext>
+                  </a:extLst>
+                </a:gridCol>
+                <a:gridCol w="675304">
+                  <a:extLst>
+                    <a:ext uri="{9D8B030D-6E8A-4147-A177-3AD203B41FA5}">
+                      <a16:colId xmlns:a16="http://schemas.microsoft.com/office/drawing/2014/main" val="20001"/>
+                    </a:ext>
+                  </a:extLst>
+                </a:gridCol>
+                <a:gridCol w="675304">
+                  <a:extLst>
+                    <a:ext uri="{9D8B030D-6E8A-4147-A177-3AD203B41FA5}">
+                      <a16:colId xmlns:a16="http://schemas.microsoft.com/office/drawing/2014/main" val="20002"/>
+                    </a:ext>
+                  </a:extLst>
+                </a:gridCol>
+                <a:gridCol w="675304">
+                  <a:extLst>
+                    <a:ext uri="{9D8B030D-6E8A-4147-A177-3AD203B41FA5}">
+                      <a16:colId xmlns:a16="http://schemas.microsoft.com/office/drawing/2014/main" val="20003"/>
+                    </a:ext>
+                  </a:extLst>
+                </a:gridCol>
+                <a:gridCol w="675304">
+                  <a:extLst>
+                    <a:ext uri="{9D8B030D-6E8A-4147-A177-3AD203B41FA5}">
+                      <a16:colId xmlns:a16="http://schemas.microsoft.com/office/drawing/2014/main" val="20004"/>
+                    </a:ext>
+                  </a:extLst>
+                </a:gridCol>
+                <a:gridCol w="675304">
+                  <a:extLst>
+                    <a:ext uri="{9D8B030D-6E8A-4147-A177-3AD203B41FA5}">
+                      <a16:colId xmlns:a16="http://schemas.microsoft.com/office/drawing/2014/main" val="20005"/>
+                    </a:ext>
+                  </a:extLst>
+                </a:gridCol>
+                <a:gridCol w="675304">
+                  <a:extLst>
+                    <a:ext uri="{9D8B030D-6E8A-4147-A177-3AD203B41FA5}">
+                      <a16:colId xmlns:a16="http://schemas.microsoft.com/office/drawing/2014/main" val="20006"/>
+                    </a:ext>
+                  </a:extLst>
+                </a:gridCol>
+                <a:gridCol w="675304">
+                  <a:extLst>
+                    <a:ext uri="{9D8B030D-6E8A-4147-A177-3AD203B41FA5}">
+                      <a16:colId xmlns:a16="http://schemas.microsoft.com/office/drawing/2014/main" val="20007"/>
+                    </a:ext>
+                  </a:extLst>
+                </a:gridCol>
+                <a:gridCol w="675304">
+                  <a:extLst>
+                    <a:ext uri="{9D8B030D-6E8A-4147-A177-3AD203B41FA5}">
+                      <a16:colId xmlns:a16="http://schemas.microsoft.com/office/drawing/2014/main" val="20008"/>
+                    </a:ext>
+                  </a:extLst>
+                </a:gridCol>
               </a:tblGrid>
               <a:tr h="370840">
                 <a:tc>
@@ -5583,6 +5675,11 @@
                   </a:txBody>
                   <a:tcPr/>
                 </a:tc>
+                <a:extLst>
+                  <a:ext uri="{0D108BD9-81ED-4DB2-BD59-A6C34878D82A}">
+                    <a16:rowId xmlns:a16="http://schemas.microsoft.com/office/drawing/2014/main" val="10000"/>
+                  </a:ext>
+                </a:extLst>
               </a:tr>
               <a:tr h="370840">
                 <a:tc>
@@ -5719,6 +5816,11 @@
                   </a:txBody>
                   <a:tcPr/>
                 </a:tc>
+                <a:extLst>
+                  <a:ext uri="{0D108BD9-81ED-4DB2-BD59-A6C34878D82A}">
+                    <a16:rowId xmlns:a16="http://schemas.microsoft.com/office/drawing/2014/main" val="10001"/>
+                  </a:ext>
+                </a:extLst>
               </a:tr>
               <a:tr h="370840">
                 <a:tc>
@@ -5855,6 +5957,11 @@
                   </a:txBody>
                   <a:tcPr/>
                 </a:tc>
+                <a:extLst>
+                  <a:ext uri="{0D108BD9-81ED-4DB2-BD59-A6C34878D82A}">
+                    <a16:rowId xmlns:a16="http://schemas.microsoft.com/office/drawing/2014/main" val="10002"/>
+                  </a:ext>
+                </a:extLst>
               </a:tr>
               <a:tr h="370840">
                 <a:tc>
@@ -5991,6 +6098,11 @@
                   </a:txBody>
                   <a:tcPr/>
                 </a:tc>
+                <a:extLst>
+                  <a:ext uri="{0D108BD9-81ED-4DB2-BD59-A6C34878D82A}">
+                    <a16:rowId xmlns:a16="http://schemas.microsoft.com/office/drawing/2014/main" val="10003"/>
+                  </a:ext>
+                </a:extLst>
               </a:tr>
               <a:tr h="370840">
                 <a:tc>
@@ -6127,6 +6239,11 @@
                   </a:txBody>
                   <a:tcPr/>
                 </a:tc>
+                <a:extLst>
+                  <a:ext uri="{0D108BD9-81ED-4DB2-BD59-A6C34878D82A}">
+                    <a16:rowId xmlns:a16="http://schemas.microsoft.com/office/drawing/2014/main" val="10004"/>
+                  </a:ext>
+                </a:extLst>
               </a:tr>
               <a:tr h="370840">
                 <a:tc>
@@ -6263,6 +6380,11 @@
                   </a:txBody>
                   <a:tcPr/>
                 </a:tc>
+                <a:extLst>
+                  <a:ext uri="{0D108BD9-81ED-4DB2-BD59-A6C34878D82A}">
+                    <a16:rowId xmlns:a16="http://schemas.microsoft.com/office/drawing/2014/main" val="10005"/>
+                  </a:ext>
+                </a:extLst>
               </a:tr>
               <a:tr h="370840">
                 <a:tc>
@@ -6399,6 +6521,11 @@
                   </a:txBody>
                   <a:tcPr/>
                 </a:tc>
+                <a:extLst>
+                  <a:ext uri="{0D108BD9-81ED-4DB2-BD59-A6C34878D82A}">
+                    <a16:rowId xmlns:a16="http://schemas.microsoft.com/office/drawing/2014/main" val="10006"/>
+                  </a:ext>
+                </a:extLst>
               </a:tr>
               <a:tr h="370840">
                 <a:tc>
@@ -6535,6 +6662,11 @@
                   </a:txBody>
                   <a:tcPr/>
                 </a:tc>
+                <a:extLst>
+                  <a:ext uri="{0D108BD9-81ED-4DB2-BD59-A6C34878D82A}">
+                    <a16:rowId xmlns:a16="http://schemas.microsoft.com/office/drawing/2014/main" val="10007"/>
+                  </a:ext>
+                </a:extLst>
               </a:tr>
               <a:tr h="393599">
                 <a:tc>
@@ -6671,6 +6803,11 @@
                   </a:txBody>
                   <a:tcPr/>
                 </a:tc>
+                <a:extLst>
+                  <a:ext uri="{0D108BD9-81ED-4DB2-BD59-A6C34878D82A}">
+                    <a16:rowId xmlns:a16="http://schemas.microsoft.com/office/drawing/2014/main" val="10008"/>
+                  </a:ext>
+                </a:extLst>
               </a:tr>
               <a:tr h="370840">
                 <a:tc>
@@ -6807,6 +6944,11 @@
                   </a:txBody>
                   <a:tcPr/>
                 </a:tc>
+                <a:extLst>
+                  <a:ext uri="{0D108BD9-81ED-4DB2-BD59-A6C34878D82A}">
+                    <a16:rowId xmlns:a16="http://schemas.microsoft.com/office/drawing/2014/main" val="10009"/>
+                  </a:ext>
+                </a:extLst>
               </a:tr>
               <a:tr h="370840">
                 <a:tc>
@@ -6943,6 +7085,11 @@
                   </a:txBody>
                   <a:tcPr/>
                 </a:tc>
+                <a:extLst>
+                  <a:ext uri="{0D108BD9-81ED-4DB2-BD59-A6C34878D82A}">
+                    <a16:rowId xmlns:a16="http://schemas.microsoft.com/office/drawing/2014/main" val="10010"/>
+                  </a:ext>
+                </a:extLst>
               </a:tr>
               <a:tr h="370840">
                 <a:tc>
@@ -7079,6 +7226,11 @@
                   </a:txBody>
                   <a:tcPr/>
                 </a:tc>
+                <a:extLst>
+                  <a:ext uri="{0D108BD9-81ED-4DB2-BD59-A6C34878D82A}">
+                    <a16:rowId xmlns:a16="http://schemas.microsoft.com/office/drawing/2014/main" val="10011"/>
+                  </a:ext>
+                </a:extLst>
               </a:tr>
             </a:tbl>
           </a:graphicData>
@@ -7323,11 +7475,11 @@
   <p:clrMapOvr>
     <a:masterClrMapping/>
   </p:clrMapOvr>
-  <mc:AlternateContent xmlns:mc="http://schemas.openxmlformats.org/markup-compatibility/2006">
-    <mc:Choice xmlns:p14="http://schemas.microsoft.com/office/powerpoint/2010/main" Requires="p14">
+  <mc:AlternateContent xmlns:mc="http://schemas.openxmlformats.org/markup-compatibility/2006" xmlns:p14="http://schemas.microsoft.com/office/powerpoint/2010/main">
+    <mc:Choice Requires="p14">
       <p:transition spd="slow" p14:dur="2000"/>
     </mc:Choice>
-    <mc:Fallback>
+    <mc:Fallback xmlns="">
       <p:transition spd="slow"/>
     </mc:Fallback>
   </mc:AlternateContent>
@@ -7383,15 +7535,69 @@
                 <a:tableStyleId>{5C22544A-7EE6-4342-B048-85BDC9FD1C3A}</a:tableStyleId>
               </a:tblPr>
               <a:tblGrid>
-                <a:gridCol w="837213"/>
-                <a:gridCol w="906983"/>
-                <a:gridCol w="872097"/>
-                <a:gridCol w="872097"/>
-                <a:gridCol w="872097"/>
-                <a:gridCol w="872097"/>
-                <a:gridCol w="872097"/>
-                <a:gridCol w="872097"/>
-                <a:gridCol w="872097"/>
+                <a:gridCol w="837213">
+                  <a:extLst>
+                    <a:ext uri="{9D8B030D-6E8A-4147-A177-3AD203B41FA5}">
+                      <a16:colId xmlns:a16="http://schemas.microsoft.com/office/drawing/2014/main" val="20000"/>
+                    </a:ext>
+                  </a:extLst>
+                </a:gridCol>
+                <a:gridCol w="906983">
+                  <a:extLst>
+                    <a:ext uri="{9D8B030D-6E8A-4147-A177-3AD203B41FA5}">
+                      <a16:colId xmlns:a16="http://schemas.microsoft.com/office/drawing/2014/main" val="20001"/>
+                    </a:ext>
+                  </a:extLst>
+                </a:gridCol>
+                <a:gridCol w="872097">
+                  <a:extLst>
+                    <a:ext uri="{9D8B030D-6E8A-4147-A177-3AD203B41FA5}">
+                      <a16:colId xmlns:a16="http://schemas.microsoft.com/office/drawing/2014/main" val="20002"/>
+                    </a:ext>
+                  </a:extLst>
+                </a:gridCol>
+                <a:gridCol w="872097">
+                  <a:extLst>
+                    <a:ext uri="{9D8B030D-6E8A-4147-A177-3AD203B41FA5}">
+                      <a16:colId xmlns:a16="http://schemas.microsoft.com/office/drawing/2014/main" val="20003"/>
+                    </a:ext>
+                  </a:extLst>
+                </a:gridCol>
+                <a:gridCol w="872097">
+                  <a:extLst>
+                    <a:ext uri="{9D8B030D-6E8A-4147-A177-3AD203B41FA5}">
+                      <a16:colId xmlns:a16="http://schemas.microsoft.com/office/drawing/2014/main" val="20004"/>
+                    </a:ext>
+                  </a:extLst>
+                </a:gridCol>
+                <a:gridCol w="872097">
+                  <a:extLst>
+                    <a:ext uri="{9D8B030D-6E8A-4147-A177-3AD203B41FA5}">
+                      <a16:colId xmlns:a16="http://schemas.microsoft.com/office/drawing/2014/main" val="20005"/>
+                    </a:ext>
+                  </a:extLst>
+                </a:gridCol>
+                <a:gridCol w="872097">
+                  <a:extLst>
+                    <a:ext uri="{9D8B030D-6E8A-4147-A177-3AD203B41FA5}">
+                      <a16:colId xmlns:a16="http://schemas.microsoft.com/office/drawing/2014/main" val="20006"/>
+                    </a:ext>
+                  </a:extLst>
+                </a:gridCol>
+                <a:gridCol w="872097">
+                  <a:extLst>
+                    <a:ext uri="{9D8B030D-6E8A-4147-A177-3AD203B41FA5}">
+                      <a16:colId xmlns:a16="http://schemas.microsoft.com/office/drawing/2014/main" val="20007"/>
+                    </a:ext>
+                  </a:extLst>
+                </a:gridCol>
+                <a:gridCol w="872097">
+                  <a:extLst>
+                    <a:ext uri="{9D8B030D-6E8A-4147-A177-3AD203B41FA5}">
+                      <a16:colId xmlns:a16="http://schemas.microsoft.com/office/drawing/2014/main" val="20008"/>
+                    </a:ext>
+                  </a:extLst>
+                </a:gridCol>
               </a:tblGrid>
               <a:tr h="504056">
                 <a:tc>
@@ -7654,6 +7860,11 @@
                     </a:solidFill>
                   </a:tcPr>
                 </a:tc>
+                <a:extLst>
+                  <a:ext uri="{0D108BD9-81ED-4DB2-BD59-A6C34878D82A}">
+                    <a16:rowId xmlns:a16="http://schemas.microsoft.com/office/drawing/2014/main" val="10000"/>
+                  </a:ext>
+                </a:extLst>
               </a:tr>
               <a:tr h="388008">
                 <a:tc>
@@ -7840,6 +8051,11 @@
                     </a:solidFill>
                   </a:tcPr>
                 </a:tc>
+                <a:extLst>
+                  <a:ext uri="{0D108BD9-81ED-4DB2-BD59-A6C34878D82A}">
+                    <a16:rowId xmlns:a16="http://schemas.microsoft.com/office/drawing/2014/main" val="10001"/>
+                  </a:ext>
+                </a:extLst>
               </a:tr>
               <a:tr h="388008">
                 <a:tc>
@@ -8042,6 +8258,11 @@
                     </a:solidFill>
                   </a:tcPr>
                 </a:tc>
+                <a:extLst>
+                  <a:ext uri="{0D108BD9-81ED-4DB2-BD59-A6C34878D82A}">
+                    <a16:rowId xmlns:a16="http://schemas.microsoft.com/office/drawing/2014/main" val="10002"/>
+                  </a:ext>
+                </a:extLst>
               </a:tr>
               <a:tr h="382536">
                 <a:tc>
@@ -8244,6 +8465,11 @@
                     </a:solidFill>
                   </a:tcPr>
                 </a:tc>
+                <a:extLst>
+                  <a:ext uri="{0D108BD9-81ED-4DB2-BD59-A6C34878D82A}">
+                    <a16:rowId xmlns:a16="http://schemas.microsoft.com/office/drawing/2014/main" val="10003"/>
+                  </a:ext>
+                </a:extLst>
               </a:tr>
               <a:tr h="366807">
                 <a:tc>
@@ -8426,6 +8652,11 @@
                     </a:solidFill>
                   </a:tcPr>
                 </a:tc>
+                <a:extLst>
+                  <a:ext uri="{0D108BD9-81ED-4DB2-BD59-A6C34878D82A}">
+                    <a16:rowId xmlns:a16="http://schemas.microsoft.com/office/drawing/2014/main" val="10004"/>
+                  </a:ext>
+                </a:extLst>
               </a:tr>
               <a:tr h="388008">
                 <a:tc>
@@ -8608,6 +8839,11 @@
                     </a:solidFill>
                   </a:tcPr>
                 </a:tc>
+                <a:extLst>
+                  <a:ext uri="{0D108BD9-81ED-4DB2-BD59-A6C34878D82A}">
+                    <a16:rowId xmlns:a16="http://schemas.microsoft.com/office/drawing/2014/main" val="10005"/>
+                  </a:ext>
+                </a:extLst>
               </a:tr>
               <a:tr h="451458">
                 <a:tc>
@@ -8790,6 +9026,11 @@
                     </a:solidFill>
                   </a:tcPr>
                 </a:tc>
+                <a:extLst>
+                  <a:ext uri="{0D108BD9-81ED-4DB2-BD59-A6C34878D82A}">
+                    <a16:rowId xmlns:a16="http://schemas.microsoft.com/office/drawing/2014/main" val="10006"/>
+                  </a:ext>
+                </a:extLst>
               </a:tr>
               <a:tr h="443487">
                 <a:tc>
@@ -8972,6 +9213,11 @@
                     </a:solidFill>
                   </a:tcPr>
                 </a:tc>
+                <a:extLst>
+                  <a:ext uri="{0D108BD9-81ED-4DB2-BD59-A6C34878D82A}">
+                    <a16:rowId xmlns:a16="http://schemas.microsoft.com/office/drawing/2014/main" val="10007"/>
+                  </a:ext>
+                </a:extLst>
               </a:tr>
               <a:tr h="432048">
                 <a:tc>
@@ -9162,6 +9408,11 @@
                     </a:solidFill>
                   </a:tcPr>
                 </a:tc>
+                <a:extLst>
+                  <a:ext uri="{0D108BD9-81ED-4DB2-BD59-A6C34878D82A}">
+                    <a16:rowId xmlns:a16="http://schemas.microsoft.com/office/drawing/2014/main" val="10008"/>
+                  </a:ext>
+                </a:extLst>
               </a:tr>
               <a:tr h="432048">
                 <a:tc>
@@ -9344,6 +9595,11 @@
                     </a:solidFill>
                   </a:tcPr>
                 </a:tc>
+                <a:extLst>
+                  <a:ext uri="{0D108BD9-81ED-4DB2-BD59-A6C34878D82A}">
+                    <a16:rowId xmlns:a16="http://schemas.microsoft.com/office/drawing/2014/main" val="10009"/>
+                  </a:ext>
+                </a:extLst>
               </a:tr>
               <a:tr h="360040">
                 <a:tc>
@@ -9558,6 +9814,11 @@
                     </a:solidFill>
                   </a:tcPr>
                 </a:tc>
+                <a:extLst>
+                  <a:ext uri="{0D108BD9-81ED-4DB2-BD59-A6C34878D82A}">
+                    <a16:rowId xmlns:a16="http://schemas.microsoft.com/office/drawing/2014/main" val="10010"/>
+                  </a:ext>
+                </a:extLst>
               </a:tr>
             </a:tbl>
           </a:graphicData>
@@ -9795,11 +10056,11 @@
   <p:clrMapOvr>
     <a:masterClrMapping/>
   </p:clrMapOvr>
-  <mc:AlternateContent xmlns:mc="http://schemas.openxmlformats.org/markup-compatibility/2006">
-    <mc:Choice xmlns:p14="http://schemas.microsoft.com/office/powerpoint/2010/main" Requires="p14">
+  <mc:AlternateContent xmlns:mc="http://schemas.openxmlformats.org/markup-compatibility/2006" xmlns:p14="http://schemas.microsoft.com/office/powerpoint/2010/main">
+    <mc:Choice Requires="p14">
       <p:transition spd="slow" p14:dur="2000"/>
     </mc:Choice>
-    <mc:Fallback>
+    <mc:Fallback xmlns="">
       <p:transition spd="slow"/>
     </mc:Fallback>
   </mc:AlternateContent>
@@ -10042,14 +10303,62 @@
                 <a:tableStyleId>{5C22544A-7EE6-4342-B048-85BDC9FD1C3A}</a:tableStyleId>
               </a:tblPr>
               <a:tblGrid>
-                <a:gridCol w="877219"/>
-                <a:gridCol w="877219"/>
-                <a:gridCol w="877219"/>
-                <a:gridCol w="877219"/>
-                <a:gridCol w="877219"/>
-                <a:gridCol w="877219"/>
-                <a:gridCol w="877219"/>
-                <a:gridCol w="877219"/>
+                <a:gridCol w="877219">
+                  <a:extLst>
+                    <a:ext uri="{9D8B030D-6E8A-4147-A177-3AD203B41FA5}">
+                      <a16:colId xmlns:a16="http://schemas.microsoft.com/office/drawing/2014/main" val="20000"/>
+                    </a:ext>
+                  </a:extLst>
+                </a:gridCol>
+                <a:gridCol w="877219">
+                  <a:extLst>
+                    <a:ext uri="{9D8B030D-6E8A-4147-A177-3AD203B41FA5}">
+                      <a16:colId xmlns:a16="http://schemas.microsoft.com/office/drawing/2014/main" val="20001"/>
+                    </a:ext>
+                  </a:extLst>
+                </a:gridCol>
+                <a:gridCol w="877219">
+                  <a:extLst>
+                    <a:ext uri="{9D8B030D-6E8A-4147-A177-3AD203B41FA5}">
+                      <a16:colId xmlns:a16="http://schemas.microsoft.com/office/drawing/2014/main" val="20002"/>
+                    </a:ext>
+                  </a:extLst>
+                </a:gridCol>
+                <a:gridCol w="877219">
+                  <a:extLst>
+                    <a:ext uri="{9D8B030D-6E8A-4147-A177-3AD203B41FA5}">
+                      <a16:colId xmlns:a16="http://schemas.microsoft.com/office/drawing/2014/main" val="20003"/>
+                    </a:ext>
+                  </a:extLst>
+                </a:gridCol>
+                <a:gridCol w="877219">
+                  <a:extLst>
+                    <a:ext uri="{9D8B030D-6E8A-4147-A177-3AD203B41FA5}">
+                      <a16:colId xmlns:a16="http://schemas.microsoft.com/office/drawing/2014/main" val="20004"/>
+                    </a:ext>
+                  </a:extLst>
+                </a:gridCol>
+                <a:gridCol w="877219">
+                  <a:extLst>
+                    <a:ext uri="{9D8B030D-6E8A-4147-A177-3AD203B41FA5}">
+                      <a16:colId xmlns:a16="http://schemas.microsoft.com/office/drawing/2014/main" val="20005"/>
+                    </a:ext>
+                  </a:extLst>
+                </a:gridCol>
+                <a:gridCol w="877219">
+                  <a:extLst>
+                    <a:ext uri="{9D8B030D-6E8A-4147-A177-3AD203B41FA5}">
+                      <a16:colId xmlns:a16="http://schemas.microsoft.com/office/drawing/2014/main" val="20006"/>
+                    </a:ext>
+                  </a:extLst>
+                </a:gridCol>
+                <a:gridCol w="877219">
+                  <a:extLst>
+                    <a:ext uri="{9D8B030D-6E8A-4147-A177-3AD203B41FA5}">
+                      <a16:colId xmlns:a16="http://schemas.microsoft.com/office/drawing/2014/main" val="20007"/>
+                    </a:ext>
+                  </a:extLst>
+                </a:gridCol>
               </a:tblGrid>
               <a:tr h="374959">
                 <a:tc>
@@ -10187,6 +10496,11 @@
                   </a:txBody>
                   <a:tcPr/>
                 </a:tc>
+                <a:extLst>
+                  <a:ext uri="{0D108BD9-81ED-4DB2-BD59-A6C34878D82A}">
+                    <a16:rowId xmlns:a16="http://schemas.microsoft.com/office/drawing/2014/main" val="10000"/>
+                  </a:ext>
+                </a:extLst>
               </a:tr>
               <a:tr h="417129">
                 <a:tc>
@@ -10376,6 +10690,11 @@
                     </a:solidFill>
                   </a:tcPr>
                 </a:tc>
+                <a:extLst>
+                  <a:ext uri="{0D108BD9-81ED-4DB2-BD59-A6C34878D82A}">
+                    <a16:rowId xmlns:a16="http://schemas.microsoft.com/office/drawing/2014/main" val="10001"/>
+                  </a:ext>
+                </a:extLst>
               </a:tr>
               <a:tr h="374959">
                 <a:tc>
@@ -10561,6 +10880,11 @@
                     </a:solidFill>
                   </a:tcPr>
                 </a:tc>
+                <a:extLst>
+                  <a:ext uri="{0D108BD9-81ED-4DB2-BD59-A6C34878D82A}">
+                    <a16:rowId xmlns:a16="http://schemas.microsoft.com/office/drawing/2014/main" val="10002"/>
+                  </a:ext>
+                </a:extLst>
               </a:tr>
               <a:tr h="374959">
                 <a:tc>
@@ -10746,6 +11070,11 @@
                     </a:solidFill>
                   </a:tcPr>
                 </a:tc>
+                <a:extLst>
+                  <a:ext uri="{0D108BD9-81ED-4DB2-BD59-A6C34878D82A}">
+                    <a16:rowId xmlns:a16="http://schemas.microsoft.com/office/drawing/2014/main" val="10003"/>
+                  </a:ext>
+                </a:extLst>
               </a:tr>
               <a:tr h="374959">
                 <a:tc>
@@ -10931,6 +11260,11 @@
                     </a:solidFill>
                   </a:tcPr>
                 </a:tc>
+                <a:extLst>
+                  <a:ext uri="{0D108BD9-81ED-4DB2-BD59-A6C34878D82A}">
+                    <a16:rowId xmlns:a16="http://schemas.microsoft.com/office/drawing/2014/main" val="10004"/>
+                  </a:ext>
+                </a:extLst>
               </a:tr>
               <a:tr h="374959">
                 <a:tc>
@@ -11116,6 +11450,11 @@
                     </a:solidFill>
                   </a:tcPr>
                 </a:tc>
+                <a:extLst>
+                  <a:ext uri="{0D108BD9-81ED-4DB2-BD59-A6C34878D82A}">
+                    <a16:rowId xmlns:a16="http://schemas.microsoft.com/office/drawing/2014/main" val="10005"/>
+                  </a:ext>
+                </a:extLst>
               </a:tr>
               <a:tr h="374959">
                 <a:tc>
@@ -11301,6 +11640,11 @@
                     </a:solidFill>
                   </a:tcPr>
                 </a:tc>
+                <a:extLst>
+                  <a:ext uri="{0D108BD9-81ED-4DB2-BD59-A6C34878D82A}">
+                    <a16:rowId xmlns:a16="http://schemas.microsoft.com/office/drawing/2014/main" val="10006"/>
+                  </a:ext>
+                </a:extLst>
               </a:tr>
               <a:tr h="374959">
                 <a:tc>
@@ -11486,6 +11830,11 @@
                     </a:solidFill>
                   </a:tcPr>
                 </a:tc>
+                <a:extLst>
+                  <a:ext uri="{0D108BD9-81ED-4DB2-BD59-A6C34878D82A}">
+                    <a16:rowId xmlns:a16="http://schemas.microsoft.com/office/drawing/2014/main" val="10007"/>
+                  </a:ext>
+                </a:extLst>
               </a:tr>
               <a:tr h="374959">
                 <a:tc>
@@ -11675,6 +12024,11 @@
                     </a:solidFill>
                   </a:tcPr>
                 </a:tc>
+                <a:extLst>
+                  <a:ext uri="{0D108BD9-81ED-4DB2-BD59-A6C34878D82A}">
+                    <a16:rowId xmlns:a16="http://schemas.microsoft.com/office/drawing/2014/main" val="10008"/>
+                  </a:ext>
+                </a:extLst>
               </a:tr>
             </a:tbl>
           </a:graphicData>
@@ -11890,11 +12244,11 @@
   <p:clrMapOvr>
     <a:masterClrMapping/>
   </p:clrMapOvr>
-  <mc:AlternateContent xmlns:mc="http://schemas.openxmlformats.org/markup-compatibility/2006">
-    <mc:Choice xmlns:p14="http://schemas.microsoft.com/office/powerpoint/2010/main" Requires="p14">
+  <mc:AlternateContent xmlns:mc="http://schemas.openxmlformats.org/markup-compatibility/2006" xmlns:p14="http://schemas.microsoft.com/office/powerpoint/2010/main">
+    <mc:Choice Requires="p14">
       <p:transition spd="slow" p14:dur="2000"/>
     </mc:Choice>
-    <mc:Fallback>
+    <mc:Fallback xmlns="">
       <p:transition spd="slow"/>
     </mc:Fallback>
   </mc:AlternateContent>
@@ -12893,11 +13247,11 @@
   <p:clrMapOvr>
     <a:masterClrMapping/>
   </p:clrMapOvr>
-  <mc:AlternateContent xmlns:mc="http://schemas.openxmlformats.org/markup-compatibility/2006">
-    <mc:Choice xmlns:p14="http://schemas.microsoft.com/office/powerpoint/2010/main" Requires="p14">
+  <mc:AlternateContent xmlns:mc="http://schemas.openxmlformats.org/markup-compatibility/2006" xmlns:p14="http://schemas.microsoft.com/office/powerpoint/2010/main">
+    <mc:Choice Requires="p14">
       <p:transition spd="slow" p14:dur="2000"/>
     </mc:Choice>
-    <mc:Fallback>
+    <mc:Fallback xmlns="">
       <p:transition spd="slow"/>
     </mc:Fallback>
   </mc:AlternateContent>
@@ -14232,76 +14586,106 @@
         </p:nvSpPr>
         <p:spPr>
           <a:xfrm>
-            <a:off x="467544" y="1772816"/>
-            <a:ext cx="7620000" cy="4373563"/>
+            <a:off x="467544" y="1772817"/>
+            <a:ext cx="7620000" cy="3096344"/>
           </a:xfrm>
         </p:spPr>
         <p:txBody>
           <a:bodyPr>
-            <a:normAutofit/>
+            <a:noAutofit/>
           </a:bodyPr>
           <a:lstStyle/>
           <a:p>
             <a:r>
-              <a:rPr lang="ru-RU" b="0" dirty="0" smtClean="0"/>
+              <a:rPr lang="ru-RU" sz="1800" b="0" dirty="0" smtClean="0"/>
               <a:t>1) Базовая реализация исследовательского инструмента и поиск необходимых библиотек.</a:t>
             </a:r>
           </a:p>
           <a:p>
             <a:r>
-              <a:rPr lang="ru-RU" b="0" dirty="0" smtClean="0"/>
+              <a:rPr lang="ru-RU" sz="1800" b="0" dirty="0" smtClean="0"/>
               <a:t>2) Попытки присоединить библиотеки </a:t>
             </a:r>
             <a:r>
-              <a:rPr lang="ru-RU" b="0" dirty="0" err="1" smtClean="0"/>
+              <a:rPr lang="ru-RU" sz="1800" b="0" dirty="0" err="1" smtClean="0"/>
               <a:t>стемминга</a:t>
             </a:r>
             <a:r>
-              <a:rPr lang="ru-RU" b="0" dirty="0" smtClean="0"/>
+              <a:rPr lang="ru-RU" sz="1800" b="0" dirty="0" smtClean="0"/>
               <a:t> на </a:t>
             </a:r>
             <a:r>
-              <a:rPr lang="en-US" b="0" dirty="0" smtClean="0"/>
+              <a:rPr lang="en-US" sz="1800" b="0" dirty="0" smtClean="0"/>
               <a:t>Python</a:t>
             </a:r>
             <a:r>
-              <a:rPr lang="ru-RU" b="0" dirty="0" smtClean="0"/>
+              <a:rPr lang="ru-RU" sz="1800" b="0" dirty="0" smtClean="0"/>
               <a:t> к исследовательскому приложению.</a:t>
             </a:r>
           </a:p>
           <a:p>
             <a:r>
-              <a:rPr lang="ru-RU" b="0" dirty="0" smtClean="0"/>
+              <a:rPr lang="ru-RU" sz="1800" b="0" dirty="0" smtClean="0"/>
               <a:t>3) Начало реализации </a:t>
             </a:r>
             <a:r>
-              <a:rPr lang="en-US" b="0" dirty="0" smtClean="0"/>
+              <a:rPr lang="en-US" sz="1800" b="0" dirty="0" smtClean="0"/>
               <a:t>web</a:t>
             </a:r>
             <a:r>
-              <a:rPr lang="ru-RU" b="0" dirty="0" smtClean="0"/>
+              <a:rPr lang="ru-RU" sz="1800" b="0" dirty="0" smtClean="0"/>
               <a:t>-сервиса.</a:t>
             </a:r>
-            <a:endParaRPr lang="en-US" b="0" dirty="0" smtClean="0"/>
-          </a:p>
-          <a:p>
-            <a:r>
-              <a:rPr lang="ru-RU" b="0" dirty="0" smtClean="0"/>
-              <a:t>4) Исследование методов кластеризации.</a:t>
-            </a:r>
-          </a:p>
-          <a:p>
-            <a:r>
-              <a:rPr lang="ru-RU" b="0" dirty="0" smtClean="0"/>
-              <a:t>5) Завершающий этап.</a:t>
-            </a:r>
-          </a:p>
-          <a:p>
-            <a:endParaRPr lang="ru-RU" dirty="0" smtClean="0"/>
+            <a:endParaRPr lang="en-US" sz="1800" b="0" dirty="0" smtClean="0"/>
+          </a:p>
+          <a:p>
+            <a:r>
+              <a:rPr lang="en-US" sz="1800" b="0" dirty="0" smtClean="0"/>
+              <a:t>4) </a:t>
+            </a:r>
+            <a:r>
+              <a:rPr lang="ru-RU" sz="1800" b="0" dirty="0" smtClean="0"/>
+              <a:t>Тестирование инструментов </a:t>
+            </a:r>
+            <a:r>
+              <a:rPr lang="ru-RU" sz="1800" b="0" dirty="0" err="1" smtClean="0"/>
+              <a:t>парсинга</a:t>
+            </a:r>
+            <a:r>
+              <a:rPr lang="ru-RU" sz="1800" b="0" dirty="0" smtClean="0"/>
+              <a:t> поисковой выдачи.</a:t>
+            </a:r>
+            <a:endParaRPr lang="en-US" sz="1800" b="0" dirty="0" smtClean="0"/>
+          </a:p>
+          <a:p>
+            <a:r>
+              <a:rPr lang="ru-RU" sz="1800" b="0" dirty="0"/>
+              <a:t>5</a:t>
+            </a:r>
+            <a:r>
+              <a:rPr lang="ru-RU" sz="1800" b="0" dirty="0" smtClean="0"/>
+              <a:t>) Исследование методов кластеризации.</a:t>
+            </a:r>
+          </a:p>
+          <a:p>
+            <a:r>
+              <a:rPr lang="ru-RU" sz="1800" b="0" dirty="0"/>
+              <a:t>6</a:t>
+            </a:r>
+            <a:r>
+              <a:rPr lang="ru-RU" sz="1800" b="0" dirty="0" smtClean="0"/>
+              <a:t>) Завершение и дальнейшее улучшение исследовательского приложения.</a:t>
+            </a:r>
+            <a:endParaRPr lang="ru-RU" sz="1800" dirty="0" smtClean="0"/>
           </a:p>
         </p:txBody>
       </p:sp>
     </p:spTree>
+    <p:extLst>
+      <p:ext uri="{BB962C8B-B14F-4D97-AF65-F5344CB8AC3E}">
+        <p14:creationId xmlns:p14="http://schemas.microsoft.com/office/powerpoint/2010/main" val="3025230937"/>
+      </p:ext>
+    </p:extLst>
   </p:cSld>
   <p:clrMapOvr>
     <a:masterClrMapping/>
@@ -14343,6 +14727,1366 @@
             <p:ph type="title"/>
           </p:nvPr>
         </p:nvSpPr>
+        <p:spPr/>
+        <p:txBody>
+          <a:bodyPr/>
+          <a:lstStyle/>
+          <a:p>
+            <a:r>
+              <a:rPr lang="ru-RU" dirty="0" smtClean="0"/>
+              <a:t>Ход работы</a:t>
+            </a:r>
+            <a:endParaRPr lang="ru-RU" dirty="0"/>
+          </a:p>
+        </p:txBody>
+      </p:sp>
+      <p:sp>
+        <p:nvSpPr>
+          <p:cNvPr id="3" name="Содержимое 2"/>
+          <p:cNvSpPr>
+            <a:spLocks noGrp="1"/>
+          </p:cNvSpPr>
+          <p:nvPr>
+            <p:ph idx="1"/>
+          </p:nvPr>
+        </p:nvSpPr>
+        <p:spPr>
+          <a:xfrm>
+            <a:off x="467544" y="1772817"/>
+            <a:ext cx="7620000" cy="720079"/>
+          </a:xfrm>
+        </p:spPr>
+        <p:txBody>
+          <a:bodyPr>
+            <a:normAutofit/>
+          </a:bodyPr>
+          <a:lstStyle/>
+          <a:p>
+            <a:r>
+              <a:rPr lang="en-US" b="0" dirty="0"/>
+              <a:t>7</a:t>
+            </a:r>
+            <a:r>
+              <a:rPr lang="ru-RU" b="0" dirty="0" smtClean="0"/>
+              <a:t>) Неудачные попытки </a:t>
+            </a:r>
+            <a:r>
+              <a:rPr lang="ru-RU" b="0" dirty="0" err="1" smtClean="0"/>
+              <a:t>портирования</a:t>
+            </a:r>
+            <a:r>
+              <a:rPr lang="ru-RU" b="0" dirty="0" smtClean="0"/>
+              <a:t> </a:t>
+            </a:r>
+            <a:r>
+              <a:rPr lang="ru-RU" b="0" dirty="0"/>
+              <a:t>на </a:t>
+            </a:r>
+            <a:r>
+              <a:rPr lang="en-US" b="0" dirty="0" smtClean="0"/>
+              <a:t>Python</a:t>
+            </a:r>
+            <a:r>
+              <a:rPr lang="ru-RU" b="0" dirty="0" smtClean="0"/>
+              <a:t> реализованных алгоритмов.</a:t>
+            </a:r>
+            <a:endParaRPr lang="ru-RU" dirty="0" smtClean="0"/>
+          </a:p>
+        </p:txBody>
+      </p:sp>
+      <p:pic>
+        <p:nvPicPr>
+          <p:cNvPr id="1026" name="Picture 2" descr="Python logo and wordmark.svg"/>
+          <p:cNvPicPr>
+            <a:picLocks noChangeAspect="1" noChangeArrowheads="1"/>
+          </p:cNvPicPr>
+          <p:nvPr/>
+        </p:nvPicPr>
+        <p:blipFill>
+          <a:blip r:embed="rId2">
+            <a:extLst>
+              <a:ext uri="{28A0092B-C50C-407E-A947-70E740481C1C}">
+                <a14:useLocalDpi xmlns:a14="http://schemas.microsoft.com/office/drawing/2010/main" val="0"/>
+              </a:ext>
+            </a:extLst>
+          </a:blip>
+          <a:srcRect/>
+          <a:stretch>
+            <a:fillRect/>
+          </a:stretch>
+        </p:blipFill>
+        <p:spPr bwMode="auto">
+          <a:xfrm>
+            <a:off x="5404913" y="2741171"/>
+            <a:ext cx="2095500" cy="619126"/>
+          </a:xfrm>
+          <a:prstGeom prst="rect">
+            <a:avLst/>
+          </a:prstGeom>
+          <a:noFill/>
+          <a:extLst>
+            <a:ext uri="{909E8E84-426E-40DD-AFC4-6F175D3DCCD1}">
+              <a14:hiddenFill xmlns:a14="http://schemas.microsoft.com/office/drawing/2010/main">
+                <a:solidFill>
+                  <a:srgbClr val="FFFFFF"/>
+                </a:solidFill>
+              </a14:hiddenFill>
+            </a:ext>
+          </a:extLst>
+        </p:spPr>
+      </p:pic>
+      <p:sp>
+        <p:nvSpPr>
+          <p:cNvPr id="7" name="Содержимое 2"/>
+          <p:cNvSpPr txBox="1">
+            <a:spLocks/>
+          </p:cNvSpPr>
+          <p:nvPr/>
+        </p:nvSpPr>
+        <p:spPr>
+          <a:xfrm>
+            <a:off x="611560" y="4788878"/>
+            <a:ext cx="7620000" cy="765192"/>
+          </a:xfrm>
+          <a:prstGeom prst="rect">
+            <a:avLst/>
+          </a:prstGeom>
+        </p:spPr>
+        <p:txBody>
+          <a:bodyPr vert="horz" lIns="91440" tIns="45720" rIns="91440" bIns="45720" rtlCol="0">
+            <a:normAutofit lnSpcReduction="10000"/>
+          </a:bodyPr>
+          <a:lstStyle>
+            <a:lvl1pPr marL="0" indent="0" algn="l" defTabSz="914400" rtl="0" eaLnBrk="1" latinLnBrk="0" hangingPunct="1">
+              <a:spcBef>
+                <a:spcPct val="20000"/>
+              </a:spcBef>
+              <a:spcAft>
+                <a:spcPts val="600"/>
+              </a:spcAft>
+              <a:buFont typeface="Arial" pitchFamily="34" charset="0"/>
+              <a:buNone/>
+              <a:defRPr sz="2000" b="1" kern="1200">
+                <a:solidFill>
+                  <a:schemeClr val="tx1"/>
+                </a:solidFill>
+                <a:latin typeface="+mn-lt"/>
+                <a:ea typeface="+mn-ea"/>
+                <a:cs typeface="+mn-cs"/>
+              </a:defRPr>
+            </a:lvl1pPr>
+            <a:lvl2pPr marL="457200" indent="-182880" algn="l" defTabSz="914400" rtl="0" eaLnBrk="1" latinLnBrk="0" hangingPunct="1">
+              <a:spcBef>
+                <a:spcPct val="20000"/>
+              </a:spcBef>
+              <a:buClr>
+                <a:schemeClr val="tx2"/>
+              </a:buClr>
+              <a:buFont typeface="Arial" pitchFamily="34" charset="0"/>
+              <a:buChar char="•"/>
+              <a:defRPr sz="2000" kern="1200">
+                <a:solidFill>
+                  <a:schemeClr val="tx1"/>
+                </a:solidFill>
+                <a:latin typeface="+mn-lt"/>
+                <a:ea typeface="+mn-ea"/>
+                <a:cs typeface="+mn-cs"/>
+              </a:defRPr>
+            </a:lvl2pPr>
+            <a:lvl3pPr marL="1143000" indent="-228600" algn="l" defTabSz="914400" rtl="0" eaLnBrk="1" latinLnBrk="0" hangingPunct="1">
+              <a:spcBef>
+                <a:spcPct val="20000"/>
+              </a:spcBef>
+              <a:buClr>
+                <a:schemeClr val="tx2"/>
+              </a:buClr>
+              <a:buFont typeface="Arial" pitchFamily="34" charset="0"/>
+              <a:buChar char="•"/>
+              <a:defRPr sz="1800" kern="1200">
+                <a:solidFill>
+                  <a:schemeClr val="tx1"/>
+                </a:solidFill>
+                <a:latin typeface="+mn-lt"/>
+                <a:ea typeface="+mn-ea"/>
+                <a:cs typeface="+mn-cs"/>
+              </a:defRPr>
+            </a:lvl3pPr>
+            <a:lvl4pPr marL="1600200" indent="-228600" algn="l" defTabSz="914400" rtl="0" eaLnBrk="1" latinLnBrk="0" hangingPunct="1">
+              <a:spcBef>
+                <a:spcPct val="20000"/>
+              </a:spcBef>
+              <a:buClr>
+                <a:schemeClr val="tx2"/>
+              </a:buClr>
+              <a:buFont typeface="Arial" pitchFamily="34" charset="0"/>
+              <a:buChar char="•"/>
+              <a:defRPr sz="1800" kern="1200">
+                <a:solidFill>
+                  <a:schemeClr val="tx1"/>
+                </a:solidFill>
+                <a:latin typeface="+mn-lt"/>
+                <a:ea typeface="+mn-ea"/>
+                <a:cs typeface="+mn-cs"/>
+              </a:defRPr>
+            </a:lvl4pPr>
+            <a:lvl5pPr marL="2057400" indent="-228600" algn="l" defTabSz="914400" rtl="0" eaLnBrk="1" latinLnBrk="0" hangingPunct="1">
+              <a:spcBef>
+                <a:spcPct val="20000"/>
+              </a:spcBef>
+              <a:buClr>
+                <a:schemeClr val="tx2"/>
+              </a:buClr>
+              <a:buFont typeface="Arial" pitchFamily="34" charset="0"/>
+              <a:buChar char="•"/>
+              <a:defRPr sz="1800" kern="1200" baseline="0">
+                <a:solidFill>
+                  <a:schemeClr val="tx1"/>
+                </a:solidFill>
+                <a:latin typeface="+mn-lt"/>
+                <a:ea typeface="+mn-ea"/>
+                <a:cs typeface="+mn-cs"/>
+              </a:defRPr>
+            </a:lvl5pPr>
+            <a:lvl6pPr marL="2514600" indent="-228600" algn="l" defTabSz="914400" rtl="0" eaLnBrk="1" latinLnBrk="0" hangingPunct="1">
+              <a:spcBef>
+                <a:spcPct val="20000"/>
+              </a:spcBef>
+              <a:buClr>
+                <a:schemeClr val="tx2"/>
+              </a:buClr>
+              <a:buFont typeface="Arial" pitchFamily="34" charset="0"/>
+              <a:buChar char="•"/>
+              <a:defRPr sz="1600" kern="1200">
+                <a:solidFill>
+                  <a:schemeClr val="tx1"/>
+                </a:solidFill>
+                <a:latin typeface="+mn-lt"/>
+                <a:ea typeface="+mn-ea"/>
+                <a:cs typeface="+mn-cs"/>
+              </a:defRPr>
+            </a:lvl6pPr>
+            <a:lvl7pPr marL="2971800" indent="-228600" algn="l" defTabSz="914400" rtl="0" eaLnBrk="1" latinLnBrk="0" hangingPunct="1">
+              <a:spcBef>
+                <a:spcPct val="20000"/>
+              </a:spcBef>
+              <a:buClr>
+                <a:schemeClr val="tx2"/>
+              </a:buClr>
+              <a:buFont typeface="Arial" pitchFamily="34" charset="0"/>
+              <a:buChar char="•"/>
+              <a:defRPr sz="1600" kern="1200">
+                <a:solidFill>
+                  <a:schemeClr val="tx1"/>
+                </a:solidFill>
+                <a:latin typeface="+mn-lt"/>
+                <a:ea typeface="+mn-ea"/>
+                <a:cs typeface="+mn-cs"/>
+              </a:defRPr>
+            </a:lvl7pPr>
+            <a:lvl8pPr marL="3429000" indent="-228600" algn="l" defTabSz="914400" rtl="0" eaLnBrk="1" latinLnBrk="0" hangingPunct="1">
+              <a:spcBef>
+                <a:spcPct val="20000"/>
+              </a:spcBef>
+              <a:buClr>
+                <a:schemeClr val="tx2"/>
+              </a:buClr>
+              <a:buFont typeface="Arial" pitchFamily="34" charset="0"/>
+              <a:buChar char="•"/>
+              <a:defRPr sz="1600" kern="1200">
+                <a:solidFill>
+                  <a:schemeClr val="tx1"/>
+                </a:solidFill>
+                <a:latin typeface="+mn-lt"/>
+                <a:ea typeface="+mn-ea"/>
+                <a:cs typeface="+mn-cs"/>
+              </a:defRPr>
+            </a:lvl8pPr>
+            <a:lvl9pPr marL="3886200" indent="-228600" algn="l" defTabSz="914400" rtl="0" eaLnBrk="1" latinLnBrk="0" hangingPunct="1">
+              <a:spcBef>
+                <a:spcPct val="20000"/>
+              </a:spcBef>
+              <a:buClr>
+                <a:schemeClr val="tx2"/>
+              </a:buClr>
+              <a:buFont typeface="Arial" pitchFamily="34" charset="0"/>
+              <a:buChar char="•"/>
+              <a:defRPr sz="1600" kern="1200">
+                <a:solidFill>
+                  <a:schemeClr val="tx1"/>
+                </a:solidFill>
+                <a:latin typeface="+mn-lt"/>
+                <a:ea typeface="+mn-ea"/>
+                <a:cs typeface="+mn-cs"/>
+              </a:defRPr>
+            </a:lvl9pPr>
+          </a:lstStyle>
+          <a:p>
+            <a:r>
+              <a:rPr lang="en-US" b="0" dirty="0"/>
+              <a:t>8</a:t>
+            </a:r>
+            <a:r>
+              <a:rPr lang="ru-RU" b="0" dirty="0" smtClean="0"/>
+              <a:t>) Прекращение работы с </a:t>
+            </a:r>
+            <a:r>
+              <a:rPr lang="en-US" b="0" dirty="0" smtClean="0"/>
+              <a:t>Python</a:t>
+            </a:r>
+            <a:r>
+              <a:rPr lang="ru-RU" b="0" dirty="0" smtClean="0"/>
+              <a:t>, переход на технологию </a:t>
+            </a:r>
+            <a:r>
+              <a:rPr lang="en-US" b="0" dirty="0" smtClean="0"/>
+              <a:t>ASP.NET MVC</a:t>
+            </a:r>
+            <a:r>
+              <a:rPr lang="ru-RU" b="0" dirty="0" smtClean="0"/>
+              <a:t>, реорганизация веб-сервиса.</a:t>
+            </a:r>
+          </a:p>
+          <a:p>
+            <a:endParaRPr lang="ru-RU" dirty="0" smtClean="0"/>
+          </a:p>
+        </p:txBody>
+      </p:sp>
+      <p:pic>
+        <p:nvPicPr>
+          <p:cNvPr id="1032" name="Picture 8" descr="NET h rgb 2.png"/>
+          <p:cNvPicPr>
+            <a:picLocks noChangeAspect="1" noChangeArrowheads="1"/>
+          </p:cNvPicPr>
+          <p:nvPr/>
+        </p:nvPicPr>
+        <p:blipFill>
+          <a:blip r:embed="rId3">
+            <a:extLst>
+              <a:ext uri="{28A0092B-C50C-407E-A947-70E740481C1C}">
+                <a14:useLocalDpi xmlns:a14="http://schemas.microsoft.com/office/drawing/2010/main" val="0"/>
+              </a:ext>
+            </a:extLst>
+          </a:blip>
+          <a:srcRect/>
+          <a:stretch>
+            <a:fillRect/>
+          </a:stretch>
+        </p:blipFill>
+        <p:spPr bwMode="auto">
+          <a:xfrm>
+            <a:off x="611560" y="3662630"/>
+            <a:ext cx="2095500" cy="514351"/>
+          </a:xfrm>
+          <a:prstGeom prst="rect">
+            <a:avLst/>
+          </a:prstGeom>
+          <a:noFill/>
+          <a:extLst>
+            <a:ext uri="{909E8E84-426E-40DD-AFC4-6F175D3DCCD1}">
+              <a14:hiddenFill xmlns:a14="http://schemas.microsoft.com/office/drawing/2010/main">
+                <a:solidFill>
+                  <a:srgbClr val="FFFFFF"/>
+                </a:solidFill>
+              </a14:hiddenFill>
+            </a:ext>
+          </a:extLst>
+        </p:spPr>
+      </p:pic>
+      <p:pic>
+        <p:nvPicPr>
+          <p:cNvPr id="1034" name="Picture 10" descr="Картинки по запросу visual c#"/>
+          <p:cNvPicPr>
+            <a:picLocks noChangeAspect="1" noChangeArrowheads="1"/>
+          </p:cNvPicPr>
+          <p:nvPr/>
+        </p:nvPicPr>
+        <p:blipFill>
+          <a:blip r:embed="rId4">
+            <a:extLst>
+              <a:ext uri="{28A0092B-C50C-407E-A947-70E740481C1C}">
+                <a14:useLocalDpi xmlns:a14="http://schemas.microsoft.com/office/drawing/2010/main" val="0"/>
+              </a:ext>
+            </a:extLst>
+          </a:blip>
+          <a:srcRect/>
+          <a:stretch>
+            <a:fillRect/>
+          </a:stretch>
+        </p:blipFill>
+        <p:spPr bwMode="auto">
+          <a:xfrm>
+            <a:off x="611560" y="2805526"/>
+            <a:ext cx="2666628" cy="490414"/>
+          </a:xfrm>
+          <a:prstGeom prst="rect">
+            <a:avLst/>
+          </a:prstGeom>
+          <a:noFill/>
+          <a:extLst>
+            <a:ext uri="{909E8E84-426E-40DD-AFC4-6F175D3DCCD1}">
+              <a14:hiddenFill xmlns:a14="http://schemas.microsoft.com/office/drawing/2010/main">
+                <a:solidFill>
+                  <a:srgbClr val="FFFFFF"/>
+                </a:solidFill>
+              </a14:hiddenFill>
+            </a:ext>
+          </a:extLst>
+        </p:spPr>
+      </p:pic>
+      <p:pic>
+        <p:nvPicPr>
+          <p:cNvPr id="1044" name="Picture 20" descr="http://www.fullstackpython.com/theme/img/django-logo-positive.png"/>
+          <p:cNvPicPr>
+            <a:picLocks noChangeAspect="1" noChangeArrowheads="1"/>
+          </p:cNvPicPr>
+          <p:nvPr/>
+        </p:nvPicPr>
+        <p:blipFill>
+          <a:blip r:embed="rId5" cstate="print">
+            <a:extLst>
+              <a:ext uri="{28A0092B-C50C-407E-A947-70E740481C1C}">
+                <a14:useLocalDpi xmlns:a14="http://schemas.microsoft.com/office/drawing/2010/main" val="0"/>
+              </a:ext>
+            </a:extLst>
+          </a:blip>
+          <a:srcRect/>
+          <a:stretch>
+            <a:fillRect/>
+          </a:stretch>
+        </p:blipFill>
+        <p:spPr bwMode="auto">
+          <a:xfrm>
+            <a:off x="5534419" y="3599951"/>
+            <a:ext cx="1836488" cy="639710"/>
+          </a:xfrm>
+          <a:prstGeom prst="rect">
+            <a:avLst/>
+          </a:prstGeom>
+          <a:noFill/>
+          <a:extLst>
+            <a:ext uri="{909E8E84-426E-40DD-AFC4-6F175D3DCCD1}">
+              <a14:hiddenFill xmlns:a14="http://schemas.microsoft.com/office/drawing/2010/main">
+                <a:solidFill>
+                  <a:srgbClr val="FFFFFF"/>
+                </a:solidFill>
+              </a14:hiddenFill>
+            </a:ext>
+          </a:extLst>
+        </p:spPr>
+      </p:pic>
+      <p:sp>
+        <p:nvSpPr>
+          <p:cNvPr id="8" name="Стрелка вправо 7"/>
+          <p:cNvSpPr/>
+          <p:nvPr/>
+        </p:nvSpPr>
+        <p:spPr>
+          <a:xfrm>
+            <a:off x="3599630" y="3349607"/>
+            <a:ext cx="1512168" cy="470693"/>
+          </a:xfrm>
+          <a:prstGeom prst="rightArrow">
+            <a:avLst/>
+          </a:prstGeom>
+          <a:solidFill>
+            <a:schemeClr val="accent1">
+              <a:lumMod val="75000"/>
+            </a:schemeClr>
+          </a:solidFill>
+          <a:ln>
+            <a:solidFill>
+              <a:schemeClr val="accent1">
+                <a:lumMod val="50000"/>
+              </a:schemeClr>
+            </a:solidFill>
+          </a:ln>
+        </p:spPr>
+        <p:style>
+          <a:lnRef idx="2">
+            <a:schemeClr val="accent1">
+              <a:shade val="50000"/>
+            </a:schemeClr>
+          </a:lnRef>
+          <a:fillRef idx="1">
+            <a:schemeClr val="accent1"/>
+          </a:fillRef>
+          <a:effectRef idx="0">
+            <a:schemeClr val="accent1"/>
+          </a:effectRef>
+          <a:fontRef idx="minor">
+            <a:schemeClr val="lt1"/>
+          </a:fontRef>
+        </p:style>
+        <p:txBody>
+          <a:bodyPr rtlCol="0" anchor="ctr"/>
+          <a:lstStyle/>
+          <a:p>
+            <a:pPr algn="ctr"/>
+            <a:endParaRPr lang="ru-RU">
+              <a:solidFill>
+                <a:srgbClr val="FF0000"/>
+              </a:solidFill>
+            </a:endParaRPr>
+          </a:p>
+        </p:txBody>
+      </p:sp>
+      <p:sp>
+        <p:nvSpPr>
+          <p:cNvPr id="9" name="Умножение 8"/>
+          <p:cNvSpPr/>
+          <p:nvPr/>
+        </p:nvSpPr>
+        <p:spPr>
+          <a:xfrm>
+            <a:off x="3535499" y="2846064"/>
+            <a:ext cx="1484090" cy="1484090"/>
+          </a:xfrm>
+          <a:prstGeom prst="mathMultiply">
+            <a:avLst/>
+          </a:prstGeom>
+          <a:solidFill>
+            <a:srgbClr val="FF0000"/>
+          </a:solidFill>
+          <a:ln>
+            <a:solidFill>
+              <a:schemeClr val="tx2">
+                <a:lumMod val="50000"/>
+              </a:schemeClr>
+            </a:solidFill>
+          </a:ln>
+        </p:spPr>
+        <p:style>
+          <a:lnRef idx="2">
+            <a:schemeClr val="accent1">
+              <a:shade val="50000"/>
+            </a:schemeClr>
+          </a:lnRef>
+          <a:fillRef idx="1">
+            <a:schemeClr val="accent1"/>
+          </a:fillRef>
+          <a:effectRef idx="0">
+            <a:schemeClr val="accent1"/>
+          </a:effectRef>
+          <a:fontRef idx="minor">
+            <a:schemeClr val="lt1"/>
+          </a:fontRef>
+        </p:style>
+        <p:txBody>
+          <a:bodyPr rtlCol="0" anchor="ctr"/>
+          <a:lstStyle/>
+          <a:p>
+            <a:pPr algn="ctr"/>
+            <a:endParaRPr lang="ru-RU"/>
+          </a:p>
+        </p:txBody>
+      </p:sp>
+      <p:pic>
+        <p:nvPicPr>
+          <p:cNvPr id="1048" name="Picture 24" descr="https://encrypted-tbn2.gstatic.com/images?q=tbn:ANd9GcRaOrdKBVPfl_IVDw1gUSQ0sNBZQ6uVURkLpTy7SbJEe-kh5AwwEw"/>
+          <p:cNvPicPr>
+            <a:picLocks noChangeAspect="1" noChangeArrowheads="1"/>
+          </p:cNvPicPr>
+          <p:nvPr/>
+        </p:nvPicPr>
+        <p:blipFill>
+          <a:blip r:embed="rId6">
+            <a:extLst>
+              <a:ext uri="{28A0092B-C50C-407E-A947-70E740481C1C}">
+                <a14:useLocalDpi xmlns:a14="http://schemas.microsoft.com/office/drawing/2010/main" val="0"/>
+              </a:ext>
+            </a:extLst>
+          </a:blip>
+          <a:srcRect/>
+          <a:stretch>
+            <a:fillRect/>
+          </a:stretch>
+        </p:blipFill>
+        <p:spPr bwMode="auto">
+          <a:xfrm>
+            <a:off x="5111798" y="2741171"/>
+            <a:ext cx="2819400" cy="1524001"/>
+          </a:xfrm>
+          <a:prstGeom prst="rect">
+            <a:avLst/>
+          </a:prstGeom>
+          <a:noFill/>
+          <a:extLst>
+            <a:ext uri="{909E8E84-426E-40DD-AFC4-6F175D3DCCD1}">
+              <a14:hiddenFill xmlns:a14="http://schemas.microsoft.com/office/drawing/2010/main">
+                <a:solidFill>
+                  <a:srgbClr val="FFFFFF"/>
+                </a:solidFill>
+              </a14:hiddenFill>
+            </a:ext>
+          </a:extLst>
+        </p:spPr>
+      </p:pic>
+    </p:spTree>
+    <p:extLst>
+      <p:ext uri="{BB962C8B-B14F-4D97-AF65-F5344CB8AC3E}">
+        <p14:creationId xmlns:p14="http://schemas.microsoft.com/office/powerpoint/2010/main" val="2936072559"/>
+      </p:ext>
+    </p:extLst>
+  </p:cSld>
+  <p:clrMapOvr>
+    <a:masterClrMapping/>
+  </p:clrMapOvr>
+  <p:timing>
+    <p:tnLst>
+      <p:par>
+        <p:cTn id="1" dur="indefinite" restart="never" nodeType="tmRoot">
+          <p:childTnLst>
+            <p:seq concurrent="1" nextAc="seek">
+              <p:cTn id="2" dur="indefinite" nodeType="mainSeq">
+                <p:childTnLst>
+                  <p:par>
+                    <p:cTn id="3" fill="hold">
+                      <p:stCondLst>
+                        <p:cond delay="indefinite"/>
+                        <p:cond evt="onBegin" delay="0">
+                          <p:tn val="2"/>
+                        </p:cond>
+                      </p:stCondLst>
+                      <p:childTnLst>
+                        <p:par>
+                          <p:cTn id="4" fill="hold">
+                            <p:stCondLst>
+                              <p:cond delay="0"/>
+                            </p:stCondLst>
+                            <p:childTnLst>
+                              <p:par>
+                                <p:cTn id="5" presetID="22" presetClass="entr" presetSubtype="4" fill="hold" nodeType="afterEffect">
+                                  <p:stCondLst>
+                                    <p:cond delay="0"/>
+                                  </p:stCondLst>
+                                  <p:childTnLst>
+                                    <p:set>
+                                      <p:cBhvr>
+                                        <p:cTn id="6" dur="1" fill="hold">
+                                          <p:stCondLst>
+                                            <p:cond delay="0"/>
+                                          </p:stCondLst>
+                                        </p:cTn>
+                                        <p:tgtEl>
+                                          <p:spTgt spid="1034"/>
+                                        </p:tgtEl>
+                                        <p:attrNameLst>
+                                          <p:attrName>style.visibility</p:attrName>
+                                        </p:attrNameLst>
+                                      </p:cBhvr>
+                                      <p:to>
+                                        <p:strVal val="visible"/>
+                                      </p:to>
+                                    </p:set>
+                                    <p:animEffect transition="in" filter="wipe(down)">
+                                      <p:cBhvr>
+                                        <p:cTn id="7" dur="500"/>
+                                        <p:tgtEl>
+                                          <p:spTgt spid="1034"/>
+                                        </p:tgtEl>
+                                      </p:cBhvr>
+                                    </p:animEffect>
+                                  </p:childTnLst>
+                                </p:cTn>
+                              </p:par>
+                              <p:par>
+                                <p:cTn id="8" presetID="22" presetClass="entr" presetSubtype="4" fill="hold" nodeType="withEffect">
+                                  <p:stCondLst>
+                                    <p:cond delay="0"/>
+                                  </p:stCondLst>
+                                  <p:childTnLst>
+                                    <p:set>
+                                      <p:cBhvr>
+                                        <p:cTn id="9" dur="1" fill="hold">
+                                          <p:stCondLst>
+                                            <p:cond delay="0"/>
+                                          </p:stCondLst>
+                                        </p:cTn>
+                                        <p:tgtEl>
+                                          <p:spTgt spid="1032"/>
+                                        </p:tgtEl>
+                                        <p:attrNameLst>
+                                          <p:attrName>style.visibility</p:attrName>
+                                        </p:attrNameLst>
+                                      </p:cBhvr>
+                                      <p:to>
+                                        <p:strVal val="visible"/>
+                                      </p:to>
+                                    </p:set>
+                                    <p:animEffect transition="in" filter="wipe(down)">
+                                      <p:cBhvr>
+                                        <p:cTn id="10" dur="500"/>
+                                        <p:tgtEl>
+                                          <p:spTgt spid="1032"/>
+                                        </p:tgtEl>
+                                      </p:cBhvr>
+                                    </p:animEffect>
+                                  </p:childTnLst>
+                                </p:cTn>
+                              </p:par>
+                            </p:childTnLst>
+                          </p:cTn>
+                        </p:par>
+                        <p:par>
+                          <p:cTn id="11" fill="hold">
+                            <p:stCondLst>
+                              <p:cond delay="500"/>
+                            </p:stCondLst>
+                            <p:childTnLst>
+                              <p:par>
+                                <p:cTn id="12" presetID="22" presetClass="entr" presetSubtype="4" fill="hold" nodeType="afterEffect">
+                                  <p:stCondLst>
+                                    <p:cond delay="0"/>
+                                  </p:stCondLst>
+                                  <p:childTnLst>
+                                    <p:set>
+                                      <p:cBhvr>
+                                        <p:cTn id="13" dur="1" fill="hold">
+                                          <p:stCondLst>
+                                            <p:cond delay="0"/>
+                                          </p:stCondLst>
+                                        </p:cTn>
+                                        <p:tgtEl>
+                                          <p:spTgt spid="1026"/>
+                                        </p:tgtEl>
+                                        <p:attrNameLst>
+                                          <p:attrName>style.visibility</p:attrName>
+                                        </p:attrNameLst>
+                                      </p:cBhvr>
+                                      <p:to>
+                                        <p:strVal val="visible"/>
+                                      </p:to>
+                                    </p:set>
+                                    <p:animEffect transition="in" filter="wipe(down)">
+                                      <p:cBhvr>
+                                        <p:cTn id="14" dur="500"/>
+                                        <p:tgtEl>
+                                          <p:spTgt spid="1026"/>
+                                        </p:tgtEl>
+                                      </p:cBhvr>
+                                    </p:animEffect>
+                                  </p:childTnLst>
+                                </p:cTn>
+                              </p:par>
+                              <p:par>
+                                <p:cTn id="15" presetID="22" presetClass="entr" presetSubtype="4" fill="hold" nodeType="withEffect">
+                                  <p:stCondLst>
+                                    <p:cond delay="0"/>
+                                  </p:stCondLst>
+                                  <p:childTnLst>
+                                    <p:set>
+                                      <p:cBhvr>
+                                        <p:cTn id="16" dur="1" fill="hold">
+                                          <p:stCondLst>
+                                            <p:cond delay="0"/>
+                                          </p:stCondLst>
+                                        </p:cTn>
+                                        <p:tgtEl>
+                                          <p:spTgt spid="1044"/>
+                                        </p:tgtEl>
+                                        <p:attrNameLst>
+                                          <p:attrName>style.visibility</p:attrName>
+                                        </p:attrNameLst>
+                                      </p:cBhvr>
+                                      <p:to>
+                                        <p:strVal val="visible"/>
+                                      </p:to>
+                                    </p:set>
+                                    <p:animEffect transition="in" filter="wipe(down)">
+                                      <p:cBhvr>
+                                        <p:cTn id="17" dur="500"/>
+                                        <p:tgtEl>
+                                          <p:spTgt spid="1044"/>
+                                        </p:tgtEl>
+                                      </p:cBhvr>
+                                    </p:animEffect>
+                                  </p:childTnLst>
+                                </p:cTn>
+                              </p:par>
+                            </p:childTnLst>
+                          </p:cTn>
+                        </p:par>
+                        <p:par>
+                          <p:cTn id="18" fill="hold">
+                            <p:stCondLst>
+                              <p:cond delay="1000"/>
+                            </p:stCondLst>
+                            <p:childTnLst>
+                              <p:par>
+                                <p:cTn id="19" presetID="53" presetClass="entr" presetSubtype="16" fill="hold" grpId="0" nodeType="afterEffect">
+                                  <p:stCondLst>
+                                    <p:cond delay="0"/>
+                                  </p:stCondLst>
+                                  <p:childTnLst>
+                                    <p:set>
+                                      <p:cBhvr>
+                                        <p:cTn id="20" dur="1" fill="hold">
+                                          <p:stCondLst>
+                                            <p:cond delay="0"/>
+                                          </p:stCondLst>
+                                        </p:cTn>
+                                        <p:tgtEl>
+                                          <p:spTgt spid="8"/>
+                                        </p:tgtEl>
+                                        <p:attrNameLst>
+                                          <p:attrName>style.visibility</p:attrName>
+                                        </p:attrNameLst>
+                                      </p:cBhvr>
+                                      <p:to>
+                                        <p:strVal val="visible"/>
+                                      </p:to>
+                                    </p:set>
+                                    <p:anim calcmode="lin" valueType="num">
+                                      <p:cBhvr>
+                                        <p:cTn id="21" dur="500" fill="hold"/>
+                                        <p:tgtEl>
+                                          <p:spTgt spid="8"/>
+                                        </p:tgtEl>
+                                        <p:attrNameLst>
+                                          <p:attrName>ppt_w</p:attrName>
+                                        </p:attrNameLst>
+                                      </p:cBhvr>
+                                      <p:tavLst>
+                                        <p:tav tm="0">
+                                          <p:val>
+                                            <p:fltVal val="0"/>
+                                          </p:val>
+                                        </p:tav>
+                                        <p:tav tm="100000">
+                                          <p:val>
+                                            <p:strVal val="#ppt_w"/>
+                                          </p:val>
+                                        </p:tav>
+                                      </p:tavLst>
+                                    </p:anim>
+                                    <p:anim calcmode="lin" valueType="num">
+                                      <p:cBhvr>
+                                        <p:cTn id="22" dur="500" fill="hold"/>
+                                        <p:tgtEl>
+                                          <p:spTgt spid="8"/>
+                                        </p:tgtEl>
+                                        <p:attrNameLst>
+                                          <p:attrName>ppt_h</p:attrName>
+                                        </p:attrNameLst>
+                                      </p:cBhvr>
+                                      <p:tavLst>
+                                        <p:tav tm="0">
+                                          <p:val>
+                                            <p:fltVal val="0"/>
+                                          </p:val>
+                                        </p:tav>
+                                        <p:tav tm="100000">
+                                          <p:val>
+                                            <p:strVal val="#ppt_h"/>
+                                          </p:val>
+                                        </p:tav>
+                                      </p:tavLst>
+                                    </p:anim>
+                                    <p:animEffect transition="in" filter="fade">
+                                      <p:cBhvr>
+                                        <p:cTn id="23" dur="500"/>
+                                        <p:tgtEl>
+                                          <p:spTgt spid="8"/>
+                                        </p:tgtEl>
+                                      </p:cBhvr>
+                                    </p:animEffect>
+                                  </p:childTnLst>
+                                </p:cTn>
+                              </p:par>
+                            </p:childTnLst>
+                          </p:cTn>
+                        </p:par>
+                        <p:par>
+                          <p:cTn id="24" fill="hold">
+                            <p:stCondLst>
+                              <p:cond delay="1500"/>
+                            </p:stCondLst>
+                            <p:childTnLst>
+                              <p:par>
+                                <p:cTn id="25" presetID="53" presetClass="entr" presetSubtype="16" fill="hold" grpId="0" nodeType="afterEffect">
+                                  <p:stCondLst>
+                                    <p:cond delay="0"/>
+                                  </p:stCondLst>
+                                  <p:childTnLst>
+                                    <p:set>
+                                      <p:cBhvr>
+                                        <p:cTn id="26" dur="1" fill="hold">
+                                          <p:stCondLst>
+                                            <p:cond delay="0"/>
+                                          </p:stCondLst>
+                                        </p:cTn>
+                                        <p:tgtEl>
+                                          <p:spTgt spid="9"/>
+                                        </p:tgtEl>
+                                        <p:attrNameLst>
+                                          <p:attrName>style.visibility</p:attrName>
+                                        </p:attrNameLst>
+                                      </p:cBhvr>
+                                      <p:to>
+                                        <p:strVal val="visible"/>
+                                      </p:to>
+                                    </p:set>
+                                    <p:anim calcmode="lin" valueType="num">
+                                      <p:cBhvr>
+                                        <p:cTn id="27" dur="500" fill="hold"/>
+                                        <p:tgtEl>
+                                          <p:spTgt spid="9"/>
+                                        </p:tgtEl>
+                                        <p:attrNameLst>
+                                          <p:attrName>ppt_w</p:attrName>
+                                        </p:attrNameLst>
+                                      </p:cBhvr>
+                                      <p:tavLst>
+                                        <p:tav tm="0">
+                                          <p:val>
+                                            <p:fltVal val="0"/>
+                                          </p:val>
+                                        </p:tav>
+                                        <p:tav tm="100000">
+                                          <p:val>
+                                            <p:strVal val="#ppt_w"/>
+                                          </p:val>
+                                        </p:tav>
+                                      </p:tavLst>
+                                    </p:anim>
+                                    <p:anim calcmode="lin" valueType="num">
+                                      <p:cBhvr>
+                                        <p:cTn id="28" dur="500" fill="hold"/>
+                                        <p:tgtEl>
+                                          <p:spTgt spid="9"/>
+                                        </p:tgtEl>
+                                        <p:attrNameLst>
+                                          <p:attrName>ppt_h</p:attrName>
+                                        </p:attrNameLst>
+                                      </p:cBhvr>
+                                      <p:tavLst>
+                                        <p:tav tm="0">
+                                          <p:val>
+                                            <p:fltVal val="0"/>
+                                          </p:val>
+                                        </p:tav>
+                                        <p:tav tm="100000">
+                                          <p:val>
+                                            <p:strVal val="#ppt_h"/>
+                                          </p:val>
+                                        </p:tav>
+                                      </p:tavLst>
+                                    </p:anim>
+                                    <p:animEffect transition="in" filter="fade">
+                                      <p:cBhvr>
+                                        <p:cTn id="29" dur="500"/>
+                                        <p:tgtEl>
+                                          <p:spTgt spid="9"/>
+                                        </p:tgtEl>
+                                      </p:cBhvr>
+                                    </p:animEffect>
+                                  </p:childTnLst>
+                                </p:cTn>
+                              </p:par>
+                            </p:childTnLst>
+                          </p:cTn>
+                        </p:par>
+                      </p:childTnLst>
+                    </p:cTn>
+                  </p:par>
+                  <p:par>
+                    <p:cTn id="30" fill="hold">
+                      <p:stCondLst>
+                        <p:cond delay="indefinite"/>
+                      </p:stCondLst>
+                      <p:childTnLst>
+                        <p:par>
+                          <p:cTn id="31" fill="hold">
+                            <p:stCondLst>
+                              <p:cond delay="0"/>
+                            </p:stCondLst>
+                            <p:childTnLst>
+                              <p:par>
+                                <p:cTn id="32" presetID="2" presetClass="entr" presetSubtype="4" fill="hold" grpId="0" nodeType="clickEffect">
+                                  <p:stCondLst>
+                                    <p:cond delay="0"/>
+                                  </p:stCondLst>
+                                  <p:childTnLst>
+                                    <p:set>
+                                      <p:cBhvr>
+                                        <p:cTn id="33" dur="1" fill="hold">
+                                          <p:stCondLst>
+                                            <p:cond delay="0"/>
+                                          </p:stCondLst>
+                                        </p:cTn>
+                                        <p:tgtEl>
+                                          <p:spTgt spid="7"/>
+                                        </p:tgtEl>
+                                        <p:attrNameLst>
+                                          <p:attrName>style.visibility</p:attrName>
+                                        </p:attrNameLst>
+                                      </p:cBhvr>
+                                      <p:to>
+                                        <p:strVal val="visible"/>
+                                      </p:to>
+                                    </p:set>
+                                    <p:anim calcmode="lin" valueType="num">
+                                      <p:cBhvr additive="base">
+                                        <p:cTn id="34" dur="500" fill="hold"/>
+                                        <p:tgtEl>
+                                          <p:spTgt spid="7"/>
+                                        </p:tgtEl>
+                                        <p:attrNameLst>
+                                          <p:attrName>ppt_x</p:attrName>
+                                        </p:attrNameLst>
+                                      </p:cBhvr>
+                                      <p:tavLst>
+                                        <p:tav tm="0">
+                                          <p:val>
+                                            <p:strVal val="#ppt_x"/>
+                                          </p:val>
+                                        </p:tav>
+                                        <p:tav tm="100000">
+                                          <p:val>
+                                            <p:strVal val="#ppt_x"/>
+                                          </p:val>
+                                        </p:tav>
+                                      </p:tavLst>
+                                    </p:anim>
+                                    <p:anim calcmode="lin" valueType="num">
+                                      <p:cBhvr additive="base">
+                                        <p:cTn id="35" dur="500" fill="hold"/>
+                                        <p:tgtEl>
+                                          <p:spTgt spid="7"/>
+                                        </p:tgtEl>
+                                        <p:attrNameLst>
+                                          <p:attrName>ppt_y</p:attrName>
+                                        </p:attrNameLst>
+                                      </p:cBhvr>
+                                      <p:tavLst>
+                                        <p:tav tm="0">
+                                          <p:val>
+                                            <p:strVal val="1+#ppt_h/2"/>
+                                          </p:val>
+                                        </p:tav>
+                                        <p:tav tm="100000">
+                                          <p:val>
+                                            <p:strVal val="#ppt_y"/>
+                                          </p:val>
+                                        </p:tav>
+                                      </p:tavLst>
+                                    </p:anim>
+                                  </p:childTnLst>
+                                </p:cTn>
+                              </p:par>
+                            </p:childTnLst>
+                          </p:cTn>
+                        </p:par>
+                        <p:par>
+                          <p:cTn id="36" fill="hold">
+                            <p:stCondLst>
+                              <p:cond delay="500"/>
+                            </p:stCondLst>
+                            <p:childTnLst>
+                              <p:par>
+                                <p:cTn id="37" presetID="14" presetClass="exit" presetSubtype="10" fill="hold" grpId="1" nodeType="afterEffect">
+                                  <p:stCondLst>
+                                    <p:cond delay="0"/>
+                                  </p:stCondLst>
+                                  <p:childTnLst>
+                                    <p:animEffect transition="out" filter="randombar(horizontal)">
+                                      <p:cBhvr>
+                                        <p:cTn id="38" dur="500"/>
+                                        <p:tgtEl>
+                                          <p:spTgt spid="8"/>
+                                        </p:tgtEl>
+                                      </p:cBhvr>
+                                    </p:animEffect>
+                                    <p:set>
+                                      <p:cBhvr>
+                                        <p:cTn id="39" dur="1" fill="hold">
+                                          <p:stCondLst>
+                                            <p:cond delay="499"/>
+                                          </p:stCondLst>
+                                        </p:cTn>
+                                        <p:tgtEl>
+                                          <p:spTgt spid="8"/>
+                                        </p:tgtEl>
+                                        <p:attrNameLst>
+                                          <p:attrName>style.visibility</p:attrName>
+                                        </p:attrNameLst>
+                                      </p:cBhvr>
+                                      <p:to>
+                                        <p:strVal val="hidden"/>
+                                      </p:to>
+                                    </p:set>
+                                  </p:childTnLst>
+                                </p:cTn>
+                              </p:par>
+                              <p:par>
+                                <p:cTn id="40" presetID="14" presetClass="exit" presetSubtype="10" fill="hold" grpId="1" nodeType="withEffect">
+                                  <p:stCondLst>
+                                    <p:cond delay="0"/>
+                                  </p:stCondLst>
+                                  <p:childTnLst>
+                                    <p:animEffect transition="out" filter="randombar(horizontal)">
+                                      <p:cBhvr>
+                                        <p:cTn id="41" dur="500"/>
+                                        <p:tgtEl>
+                                          <p:spTgt spid="9"/>
+                                        </p:tgtEl>
+                                      </p:cBhvr>
+                                    </p:animEffect>
+                                    <p:set>
+                                      <p:cBhvr>
+                                        <p:cTn id="42" dur="1" fill="hold">
+                                          <p:stCondLst>
+                                            <p:cond delay="499"/>
+                                          </p:stCondLst>
+                                        </p:cTn>
+                                        <p:tgtEl>
+                                          <p:spTgt spid="9"/>
+                                        </p:tgtEl>
+                                        <p:attrNameLst>
+                                          <p:attrName>style.visibility</p:attrName>
+                                        </p:attrNameLst>
+                                      </p:cBhvr>
+                                      <p:to>
+                                        <p:strVal val="hidden"/>
+                                      </p:to>
+                                    </p:set>
+                                  </p:childTnLst>
+                                </p:cTn>
+                              </p:par>
+                            </p:childTnLst>
+                          </p:cTn>
+                        </p:par>
+                        <p:par>
+                          <p:cTn id="43" fill="hold">
+                            <p:stCondLst>
+                              <p:cond delay="1000"/>
+                            </p:stCondLst>
+                            <p:childTnLst>
+                              <p:par>
+                                <p:cTn id="44" presetID="14" presetClass="exit" presetSubtype="10" fill="hold" nodeType="afterEffect">
+                                  <p:stCondLst>
+                                    <p:cond delay="0"/>
+                                  </p:stCondLst>
+                                  <p:childTnLst>
+                                    <p:animEffect transition="out" filter="randombar(horizontal)">
+                                      <p:cBhvr>
+                                        <p:cTn id="45" dur="500"/>
+                                        <p:tgtEl>
+                                          <p:spTgt spid="1026"/>
+                                        </p:tgtEl>
+                                      </p:cBhvr>
+                                    </p:animEffect>
+                                    <p:set>
+                                      <p:cBhvr>
+                                        <p:cTn id="46" dur="1" fill="hold">
+                                          <p:stCondLst>
+                                            <p:cond delay="499"/>
+                                          </p:stCondLst>
+                                        </p:cTn>
+                                        <p:tgtEl>
+                                          <p:spTgt spid="1026"/>
+                                        </p:tgtEl>
+                                        <p:attrNameLst>
+                                          <p:attrName>style.visibility</p:attrName>
+                                        </p:attrNameLst>
+                                      </p:cBhvr>
+                                      <p:to>
+                                        <p:strVal val="hidden"/>
+                                      </p:to>
+                                    </p:set>
+                                  </p:childTnLst>
+                                </p:cTn>
+                              </p:par>
+                              <p:par>
+                                <p:cTn id="47" presetID="14" presetClass="exit" presetSubtype="10" fill="hold" nodeType="withEffect">
+                                  <p:stCondLst>
+                                    <p:cond delay="0"/>
+                                  </p:stCondLst>
+                                  <p:childTnLst>
+                                    <p:animEffect transition="out" filter="randombar(horizontal)">
+                                      <p:cBhvr>
+                                        <p:cTn id="48" dur="500"/>
+                                        <p:tgtEl>
+                                          <p:spTgt spid="1044"/>
+                                        </p:tgtEl>
+                                      </p:cBhvr>
+                                    </p:animEffect>
+                                    <p:set>
+                                      <p:cBhvr>
+                                        <p:cTn id="49" dur="1" fill="hold">
+                                          <p:stCondLst>
+                                            <p:cond delay="499"/>
+                                          </p:stCondLst>
+                                        </p:cTn>
+                                        <p:tgtEl>
+                                          <p:spTgt spid="1044"/>
+                                        </p:tgtEl>
+                                        <p:attrNameLst>
+                                          <p:attrName>style.visibility</p:attrName>
+                                        </p:attrNameLst>
+                                      </p:cBhvr>
+                                      <p:to>
+                                        <p:strVal val="hidden"/>
+                                      </p:to>
+                                    </p:set>
+                                  </p:childTnLst>
+                                </p:cTn>
+                              </p:par>
+                            </p:childTnLst>
+                          </p:cTn>
+                        </p:par>
+                        <p:par>
+                          <p:cTn id="50" fill="hold">
+                            <p:stCondLst>
+                              <p:cond delay="1500"/>
+                            </p:stCondLst>
+                            <p:childTnLst>
+                              <p:par>
+                                <p:cTn id="51" presetID="53" presetClass="entr" presetSubtype="16" fill="hold" nodeType="afterEffect">
+                                  <p:stCondLst>
+                                    <p:cond delay="0"/>
+                                  </p:stCondLst>
+                                  <p:childTnLst>
+                                    <p:set>
+                                      <p:cBhvr>
+                                        <p:cTn id="52" dur="1" fill="hold">
+                                          <p:stCondLst>
+                                            <p:cond delay="0"/>
+                                          </p:stCondLst>
+                                        </p:cTn>
+                                        <p:tgtEl>
+                                          <p:spTgt spid="1048"/>
+                                        </p:tgtEl>
+                                        <p:attrNameLst>
+                                          <p:attrName>style.visibility</p:attrName>
+                                        </p:attrNameLst>
+                                      </p:cBhvr>
+                                      <p:to>
+                                        <p:strVal val="visible"/>
+                                      </p:to>
+                                    </p:set>
+                                    <p:anim calcmode="lin" valueType="num">
+                                      <p:cBhvr>
+                                        <p:cTn id="53" dur="500" fill="hold"/>
+                                        <p:tgtEl>
+                                          <p:spTgt spid="1048"/>
+                                        </p:tgtEl>
+                                        <p:attrNameLst>
+                                          <p:attrName>ppt_w</p:attrName>
+                                        </p:attrNameLst>
+                                      </p:cBhvr>
+                                      <p:tavLst>
+                                        <p:tav tm="0">
+                                          <p:val>
+                                            <p:fltVal val="0"/>
+                                          </p:val>
+                                        </p:tav>
+                                        <p:tav tm="100000">
+                                          <p:val>
+                                            <p:strVal val="#ppt_w"/>
+                                          </p:val>
+                                        </p:tav>
+                                      </p:tavLst>
+                                    </p:anim>
+                                    <p:anim calcmode="lin" valueType="num">
+                                      <p:cBhvr>
+                                        <p:cTn id="54" dur="500" fill="hold"/>
+                                        <p:tgtEl>
+                                          <p:spTgt spid="1048"/>
+                                        </p:tgtEl>
+                                        <p:attrNameLst>
+                                          <p:attrName>ppt_h</p:attrName>
+                                        </p:attrNameLst>
+                                      </p:cBhvr>
+                                      <p:tavLst>
+                                        <p:tav tm="0">
+                                          <p:val>
+                                            <p:fltVal val="0"/>
+                                          </p:val>
+                                        </p:tav>
+                                        <p:tav tm="100000">
+                                          <p:val>
+                                            <p:strVal val="#ppt_h"/>
+                                          </p:val>
+                                        </p:tav>
+                                      </p:tavLst>
+                                    </p:anim>
+                                    <p:animEffect transition="in" filter="fade">
+                                      <p:cBhvr>
+                                        <p:cTn id="55" dur="500"/>
+                                        <p:tgtEl>
+                                          <p:spTgt spid="1048"/>
+                                        </p:tgtEl>
+                                      </p:cBhvr>
+                                    </p:animEffect>
+                                  </p:childTnLst>
+                                </p:cTn>
+                              </p:par>
+                            </p:childTnLst>
+                          </p:cTn>
+                        </p:par>
+                      </p:childTnLst>
+                    </p:cTn>
+                  </p:par>
+                </p:childTnLst>
+              </p:cTn>
+              <p:prevCondLst>
+                <p:cond evt="onPrev" delay="0">
+                  <p:tgtEl>
+                    <p:sldTgt/>
+                  </p:tgtEl>
+                </p:cond>
+              </p:prevCondLst>
+              <p:nextCondLst>
+                <p:cond evt="onNext" delay="0">
+                  <p:tgtEl>
+                    <p:sldTgt/>
+                  </p:tgtEl>
+                </p:cond>
+              </p:nextCondLst>
+            </p:seq>
+          </p:childTnLst>
+        </p:cTn>
+      </p:par>
+    </p:tnLst>
+    <p:bldLst>
+      <p:bldP spid="7" grpId="0"/>
+      <p:bldP spid="8" grpId="0" animBg="1"/>
+      <p:bldP spid="8" grpId="1" animBg="1"/>
+      <p:bldP spid="9" grpId="0" animBg="1"/>
+      <p:bldP spid="9" grpId="1" animBg="1"/>
+    </p:bldLst>
+  </p:timing>
+</p:sld>
+</file>
+
+<file path=ppt/slides/slide23.xml><?xml version="1.0" encoding="utf-8"?>
+<p:sld xmlns:a="http://schemas.openxmlformats.org/drawingml/2006/main" xmlns:r="http://schemas.openxmlformats.org/officeDocument/2006/relationships" xmlns:p="http://schemas.openxmlformats.org/presentationml/2006/main">
+  <p:cSld>
+    <p:spTree>
+      <p:nvGrpSpPr>
+        <p:cNvPr id="1" name=""/>
+        <p:cNvGrpSpPr/>
+        <p:nvPr/>
+      </p:nvGrpSpPr>
+      <p:grpSpPr>
+        <a:xfrm>
+          <a:off x="0" y="0"/>
+          <a:ext cx="0" cy="0"/>
+          <a:chOff x="0" y="0"/>
+          <a:chExt cx="0" cy="0"/>
+        </a:xfrm>
+      </p:grpSpPr>
+      <p:sp>
+        <p:nvSpPr>
+          <p:cNvPr id="2" name="Заголовок 1"/>
+          <p:cNvSpPr>
+            <a:spLocks noGrp="1"/>
+          </p:cNvSpPr>
+          <p:nvPr>
+            <p:ph type="title"/>
+          </p:nvPr>
+        </p:nvSpPr>
         <p:spPr>
           <a:xfrm>
             <a:off x="467544" y="188640"/>
@@ -14394,13 +16138,6 @@
               <a:rPr lang="en-US" sz="2000" dirty="0" smtClean="0"/>
               <a:t>Visual C#</a:t>
             </a:r>
-          </a:p>
-          <a:p>
-            <a:pPr lvl="1"/>
-            <a:r>
-              <a:rPr lang="en-US" sz="2000" dirty="0" smtClean="0"/>
-              <a:t>Python 3.4</a:t>
-            </a:r>
             <a:endParaRPr lang="ru-RU" sz="2000" dirty="0" smtClean="0"/>
           </a:p>
           <a:p>
@@ -14408,6 +16145,14 @@
             <a:r>
               <a:rPr lang="en-US" sz="2000" dirty="0" smtClean="0"/>
               <a:t>HTML</a:t>
+            </a:r>
+            <a:endParaRPr lang="ru-RU" sz="2000" dirty="0" smtClean="0"/>
+          </a:p>
+          <a:p>
+            <a:pPr lvl="1"/>
+            <a:r>
+              <a:rPr lang="en-US" dirty="0" smtClean="0"/>
+              <a:t>CSS</a:t>
             </a:r>
             <a:endParaRPr lang="ru-RU" sz="2000" dirty="0"/>
           </a:p>
@@ -14704,16 +16449,8 @@
           <a:p>
             <a:pPr lvl="1"/>
             <a:r>
-              <a:rPr lang="en-US" dirty="0" err="1"/>
-              <a:t>Django</a:t>
-            </a:r>
-            <a:r>
-              <a:rPr lang="en-US" dirty="0"/>
-              <a:t> Framework </a:t>
-            </a:r>
-            <a:r>
               <a:rPr lang="en-US" dirty="0" smtClean="0"/>
-              <a:t>1.8.2</a:t>
+              <a:t>ASP.NET MVC 4 </a:t>
             </a:r>
             <a:endParaRPr lang="en-US" dirty="0"/>
           </a:p>
@@ -14730,7 +16467,7 @@
         <p:spPr>
           <a:xfrm>
             <a:off x="3823500" y="1275789"/>
-            <a:ext cx="3556812" cy="1576772"/>
+            <a:ext cx="3556812" cy="1016350"/>
           </a:xfrm>
           <a:prstGeom prst="rect">
             <a:avLst/>
@@ -14925,37 +16662,13 @@
             </a:r>
             <a:r>
               <a:rPr lang="en-US" dirty="0"/>
-              <a:t>Visual Studio</a:t>
-            </a:r>
-            <a:r>
-              <a:rPr lang="ru-RU" dirty="0"/>
-              <a:t> </a:t>
+              <a:t>Visual </a:t>
+            </a:r>
+            <a:r>
+              <a:rPr lang="en-US" dirty="0" smtClean="0"/>
+              <a:t>Studio</a:t>
             </a:r>
             <a:endParaRPr lang="ru-RU" dirty="0" smtClean="0"/>
-          </a:p>
-          <a:p>
-            <a:pPr lvl="1"/>
-            <a:r>
-              <a:rPr lang="en-US" dirty="0" err="1" smtClean="0"/>
-              <a:t>JetBrains</a:t>
-            </a:r>
-            <a:r>
-              <a:rPr lang="en-US" dirty="0" smtClean="0"/>
-              <a:t> </a:t>
-            </a:r>
-            <a:r>
-              <a:rPr lang="en-US" dirty="0" err="1"/>
-              <a:t>PyCharm</a:t>
-            </a:r>
-            <a:r>
-              <a:rPr lang="en-US" dirty="0"/>
-              <a:t> </a:t>
-            </a:r>
-            <a:r>
-              <a:rPr lang="en-US" dirty="0" smtClean="0"/>
-              <a:t>4.5.1</a:t>
-            </a:r>
-            <a:endParaRPr lang="en-US" dirty="0"/>
           </a:p>
         </p:txBody>
       </p:sp>
@@ -14969,7 +16682,7 @@
         </p:nvSpPr>
         <p:spPr>
           <a:xfrm>
-            <a:off x="3823500" y="4088891"/>
+            <a:off x="3851920" y="2528900"/>
             <a:ext cx="3196772" cy="1656184"/>
           </a:xfrm>
           <a:prstGeom prst="rect">
@@ -15149,17 +16862,7 @@
               <a:rPr lang="ru-RU" sz="2400" i="1" dirty="0" smtClean="0"/>
               <a:t>Используемые библиотеки:</a:t>
             </a:r>
-          </a:p>
-          <a:p>
-            <a:pPr lvl="1"/>
-            <a:r>
-              <a:rPr lang="en-US" dirty="0" err="1" smtClean="0"/>
-              <a:t>PyStemmer</a:t>
-            </a:r>
-            <a:r>
-              <a:rPr lang="en-US" dirty="0" smtClean="0"/>
-              <a:t> 1.3.0</a:t>
-            </a:r>
+            <a:endParaRPr lang="en-US" dirty="0" smtClean="0"/>
           </a:p>
           <a:p>
             <a:pPr lvl="1"/>
@@ -15174,11 +16877,224 @@
             <a:r>
               <a:rPr lang="en-US" dirty="0" smtClean="0"/>
               <a:t>Edition</a:t>
+            </a:r>
+          </a:p>
+          <a:p>
+            <a:pPr lvl="1"/>
+            <a:r>
+              <a:rPr lang="en-US" dirty="0" smtClean="0"/>
+              <a:t>Snowball</a:t>
+            </a:r>
+          </a:p>
+        </p:txBody>
+      </p:sp>
+      <p:sp>
+        <p:nvSpPr>
+          <p:cNvPr id="9" name="Содержимое 2"/>
+          <p:cNvSpPr txBox="1">
+            <a:spLocks/>
+          </p:cNvSpPr>
+          <p:nvPr/>
+        </p:nvSpPr>
+        <p:spPr>
+          <a:xfrm>
+            <a:off x="4003520" y="4457002"/>
+            <a:ext cx="3196772" cy="1656184"/>
+          </a:xfrm>
+          <a:prstGeom prst="rect">
+            <a:avLst/>
+          </a:prstGeom>
+        </p:spPr>
+        <p:txBody>
+          <a:bodyPr vert="horz" lIns="91440" tIns="45720" rIns="91440" bIns="45720" rtlCol="0">
+            <a:noAutofit/>
+          </a:bodyPr>
+          <a:lstStyle>
+            <a:lvl1pPr marL="0" indent="0" algn="l" defTabSz="914400" rtl="0" eaLnBrk="1" latinLnBrk="0" hangingPunct="1">
+              <a:spcBef>
+                <a:spcPct val="20000"/>
+              </a:spcBef>
+              <a:spcAft>
+                <a:spcPts val="600"/>
+              </a:spcAft>
+              <a:buFont typeface="Arial" pitchFamily="34" charset="0"/>
+              <a:buNone/>
+              <a:defRPr sz="2000" b="1" kern="1200">
+                <a:solidFill>
+                  <a:schemeClr val="tx1"/>
+                </a:solidFill>
+                <a:latin typeface="+mn-lt"/>
+                <a:ea typeface="+mn-ea"/>
+                <a:cs typeface="+mn-cs"/>
+              </a:defRPr>
+            </a:lvl1pPr>
+            <a:lvl2pPr marL="457200" indent="-182880" algn="l" defTabSz="914400" rtl="0" eaLnBrk="1" latinLnBrk="0" hangingPunct="1">
+              <a:spcBef>
+                <a:spcPct val="20000"/>
+              </a:spcBef>
+              <a:buClr>
+                <a:schemeClr val="tx2"/>
+              </a:buClr>
+              <a:buFont typeface="Arial" pitchFamily="34" charset="0"/>
+              <a:buChar char="•"/>
+              <a:defRPr sz="2000" kern="1200">
+                <a:solidFill>
+                  <a:schemeClr val="tx1"/>
+                </a:solidFill>
+                <a:latin typeface="+mn-lt"/>
+                <a:ea typeface="+mn-ea"/>
+                <a:cs typeface="+mn-cs"/>
+              </a:defRPr>
+            </a:lvl2pPr>
+            <a:lvl3pPr marL="1143000" indent="-228600" algn="l" defTabSz="914400" rtl="0" eaLnBrk="1" latinLnBrk="0" hangingPunct="1">
+              <a:spcBef>
+                <a:spcPct val="20000"/>
+              </a:spcBef>
+              <a:buClr>
+                <a:schemeClr val="tx2"/>
+              </a:buClr>
+              <a:buFont typeface="Arial" pitchFamily="34" charset="0"/>
+              <a:buChar char="•"/>
+              <a:defRPr sz="1800" kern="1200">
+                <a:solidFill>
+                  <a:schemeClr val="tx1"/>
+                </a:solidFill>
+                <a:latin typeface="+mn-lt"/>
+                <a:ea typeface="+mn-ea"/>
+                <a:cs typeface="+mn-cs"/>
+              </a:defRPr>
+            </a:lvl3pPr>
+            <a:lvl4pPr marL="1600200" indent="-228600" algn="l" defTabSz="914400" rtl="0" eaLnBrk="1" latinLnBrk="0" hangingPunct="1">
+              <a:spcBef>
+                <a:spcPct val="20000"/>
+              </a:spcBef>
+              <a:buClr>
+                <a:schemeClr val="tx2"/>
+              </a:buClr>
+              <a:buFont typeface="Arial" pitchFamily="34" charset="0"/>
+              <a:buChar char="•"/>
+              <a:defRPr sz="1800" kern="1200">
+                <a:solidFill>
+                  <a:schemeClr val="tx1"/>
+                </a:solidFill>
+                <a:latin typeface="+mn-lt"/>
+                <a:ea typeface="+mn-ea"/>
+                <a:cs typeface="+mn-cs"/>
+              </a:defRPr>
+            </a:lvl4pPr>
+            <a:lvl5pPr marL="2057400" indent="-228600" algn="l" defTabSz="914400" rtl="0" eaLnBrk="1" latinLnBrk="0" hangingPunct="1">
+              <a:spcBef>
+                <a:spcPct val="20000"/>
+              </a:spcBef>
+              <a:buClr>
+                <a:schemeClr val="tx2"/>
+              </a:buClr>
+              <a:buFont typeface="Arial" pitchFamily="34" charset="0"/>
+              <a:buChar char="•"/>
+              <a:defRPr sz="1800" kern="1200" baseline="0">
+                <a:solidFill>
+                  <a:schemeClr val="tx1"/>
+                </a:solidFill>
+                <a:latin typeface="+mn-lt"/>
+                <a:ea typeface="+mn-ea"/>
+                <a:cs typeface="+mn-cs"/>
+              </a:defRPr>
+            </a:lvl5pPr>
+            <a:lvl6pPr marL="2514600" indent="-228600" algn="l" defTabSz="914400" rtl="0" eaLnBrk="1" latinLnBrk="0" hangingPunct="1">
+              <a:spcBef>
+                <a:spcPct val="20000"/>
+              </a:spcBef>
+              <a:buClr>
+                <a:schemeClr val="tx2"/>
+              </a:buClr>
+              <a:buFont typeface="Arial" pitchFamily="34" charset="0"/>
+              <a:buChar char="•"/>
+              <a:defRPr sz="1600" kern="1200">
+                <a:solidFill>
+                  <a:schemeClr val="tx1"/>
+                </a:solidFill>
+                <a:latin typeface="+mn-lt"/>
+                <a:ea typeface="+mn-ea"/>
+                <a:cs typeface="+mn-cs"/>
+              </a:defRPr>
+            </a:lvl6pPr>
+            <a:lvl7pPr marL="2971800" indent="-228600" algn="l" defTabSz="914400" rtl="0" eaLnBrk="1" latinLnBrk="0" hangingPunct="1">
+              <a:spcBef>
+                <a:spcPct val="20000"/>
+              </a:spcBef>
+              <a:buClr>
+                <a:schemeClr val="tx2"/>
+              </a:buClr>
+              <a:buFont typeface="Arial" pitchFamily="34" charset="0"/>
+              <a:buChar char="•"/>
+              <a:defRPr sz="1600" kern="1200">
+                <a:solidFill>
+                  <a:schemeClr val="tx1"/>
+                </a:solidFill>
+                <a:latin typeface="+mn-lt"/>
+                <a:ea typeface="+mn-ea"/>
+                <a:cs typeface="+mn-cs"/>
+              </a:defRPr>
+            </a:lvl7pPr>
+            <a:lvl8pPr marL="3429000" indent="-228600" algn="l" defTabSz="914400" rtl="0" eaLnBrk="1" latinLnBrk="0" hangingPunct="1">
+              <a:spcBef>
+                <a:spcPct val="20000"/>
+              </a:spcBef>
+              <a:buClr>
+                <a:schemeClr val="tx2"/>
+              </a:buClr>
+              <a:buFont typeface="Arial" pitchFamily="34" charset="0"/>
+              <a:buChar char="•"/>
+              <a:defRPr sz="1600" kern="1200">
+                <a:solidFill>
+                  <a:schemeClr val="tx1"/>
+                </a:solidFill>
+                <a:latin typeface="+mn-lt"/>
+                <a:ea typeface="+mn-ea"/>
+                <a:cs typeface="+mn-cs"/>
+              </a:defRPr>
+            </a:lvl8pPr>
+            <a:lvl9pPr marL="3886200" indent="-228600" algn="l" defTabSz="914400" rtl="0" eaLnBrk="1" latinLnBrk="0" hangingPunct="1">
+              <a:spcBef>
+                <a:spcPct val="20000"/>
+              </a:spcBef>
+              <a:buClr>
+                <a:schemeClr val="tx2"/>
+              </a:buClr>
+              <a:buFont typeface="Arial" pitchFamily="34" charset="0"/>
+              <a:buChar char="•"/>
+              <a:defRPr sz="1600" kern="1200">
+                <a:solidFill>
+                  <a:schemeClr val="tx1"/>
+                </a:solidFill>
+                <a:latin typeface="+mn-lt"/>
+                <a:ea typeface="+mn-ea"/>
+                <a:cs typeface="+mn-cs"/>
+              </a:defRPr>
+            </a:lvl9pPr>
+          </a:lstStyle>
+          <a:p>
+            <a:r>
+              <a:rPr lang="ru-RU" sz="2400" i="1" dirty="0" smtClean="0"/>
+              <a:t>Дополнительные сервисы:</a:t>
+            </a:r>
+            <a:endParaRPr lang="en-US" dirty="0" smtClean="0"/>
+          </a:p>
+          <a:p>
+            <a:pPr lvl="1"/>
+            <a:r>
+              <a:rPr lang="en-US" dirty="0" smtClean="0"/>
+              <a:t>Yandex.XML</a:t>
             </a:r>
           </a:p>
         </p:txBody>
       </p:sp>
     </p:spTree>
+    <p:extLst>
+      <p:ext uri="{BB962C8B-B14F-4D97-AF65-F5344CB8AC3E}">
+        <p14:creationId xmlns:p14="http://schemas.microsoft.com/office/powerpoint/2010/main" val="655260345"/>
+      </p:ext>
+    </p:extLst>
   </p:cSld>
   <p:clrMapOvr>
     <a:masterClrMapping/>
@@ -15193,7 +17109,7 @@
 </p:sld>
 </file>
 
-<file path=ppt/slides/slide23.xml><?xml version="1.0" encoding="utf-8"?>
+<file path=ppt/slides/slide24.xml><?xml version="1.0" encoding="utf-8"?>
 <p:sld xmlns:a="http://schemas.openxmlformats.org/drawingml/2006/main" xmlns:r="http://schemas.openxmlformats.org/officeDocument/2006/relationships" xmlns:p="http://schemas.openxmlformats.org/presentationml/2006/main">
   <p:cSld>
     <p:spTree>
@@ -17197,1397 +19113,6 @@
 </p:sld>
 </file>
 
-<file path=ppt/slides/slide24.xml><?xml version="1.0" encoding="utf-8"?>
-<p:sld xmlns:a="http://schemas.openxmlformats.org/drawingml/2006/main" xmlns:r="http://schemas.openxmlformats.org/officeDocument/2006/relationships" xmlns:p="http://schemas.openxmlformats.org/presentationml/2006/main">
-  <p:cSld>
-    <p:spTree>
-      <p:nvGrpSpPr>
-        <p:cNvPr id="1" name=""/>
-        <p:cNvGrpSpPr/>
-        <p:nvPr/>
-      </p:nvGrpSpPr>
-      <p:grpSpPr>
-        <a:xfrm>
-          <a:off x="0" y="0"/>
-          <a:ext cx="0" cy="0"/>
-          <a:chOff x="0" y="0"/>
-          <a:chExt cx="0" cy="0"/>
-        </a:xfrm>
-      </p:grpSpPr>
-      <p:sp>
-        <p:nvSpPr>
-          <p:cNvPr id="2" name="Заголовок 1"/>
-          <p:cNvSpPr txBox="1">
-            <a:spLocks/>
-          </p:cNvSpPr>
-          <p:nvPr/>
-        </p:nvSpPr>
-        <p:spPr>
-          <a:xfrm>
-            <a:off x="457200" y="764704"/>
-            <a:ext cx="5791200" cy="792088"/>
-          </a:xfrm>
-          <a:prstGeom prst="rect">
-            <a:avLst/>
-          </a:prstGeom>
-        </p:spPr>
-        <p:txBody>
-          <a:bodyPr/>
-          <a:lstStyle>
-            <a:lvl1pPr algn="l" defTabSz="914400" rtl="0" eaLnBrk="1" latinLnBrk="0" hangingPunct="1">
-              <a:spcBef>
-                <a:spcPct val="0"/>
-              </a:spcBef>
-              <a:buNone/>
-              <a:defRPr sz="3600" kern="1200" cap="all" spc="-60" baseline="0">
-                <a:solidFill>
-                  <a:schemeClr val="tx2"/>
-                </a:solidFill>
-                <a:latin typeface="+mj-lt"/>
-                <a:ea typeface="+mj-ea"/>
-                <a:cs typeface="+mj-cs"/>
-              </a:defRPr>
-            </a:lvl1pPr>
-          </a:lstStyle>
-          <a:p>
-            <a:r>
-              <a:rPr lang="ru-RU" dirty="0" smtClean="0"/>
-              <a:t>Структура проекта</a:t>
-            </a:r>
-            <a:endParaRPr lang="ru-RU" dirty="0"/>
-          </a:p>
-        </p:txBody>
-      </p:sp>
-      <p:grpSp>
-        <p:nvGrpSpPr>
-          <p:cNvPr id="3" name="Group 2"/>
-          <p:cNvGrpSpPr>
-            <a:grpSpLocks/>
-          </p:cNvGrpSpPr>
-          <p:nvPr/>
-        </p:nvGrpSpPr>
-        <p:grpSpPr bwMode="auto">
-          <a:xfrm>
-            <a:off x="108384975" y="117594063"/>
-            <a:ext cx="8515350" cy="7837487"/>
-            <a:chOff x="112066986" y="120858113"/>
-            <a:chExt cx="8515119" cy="7837826"/>
-          </a:xfrm>
-        </p:grpSpPr>
-        <p:sp>
-          <p:nvSpPr>
-            <p:cNvPr id="4" name="AutoShape 3"/>
-            <p:cNvSpPr>
-              <a:spLocks noChangeArrowheads="1"/>
-            </p:cNvSpPr>
-            <p:nvPr/>
-          </p:nvSpPr>
-          <p:spPr bwMode="auto">
-            <a:xfrm>
-              <a:off x="113033908" y="125858954"/>
-              <a:ext cx="536916" cy="2041884"/>
-            </a:xfrm>
-            <a:prstGeom prst="downArrow">
-              <a:avLst>
-                <a:gd name="adj1" fmla="val 50000"/>
-                <a:gd name="adj2" fmla="val 95075"/>
-              </a:avLst>
-            </a:prstGeom>
-            <a:solidFill>
-              <a:srgbClr val="FFCC66"/>
-            </a:solidFill>
-            <a:ln w="25400" algn="ctr">
-              <a:solidFill>
-                <a:srgbClr val="000000"/>
-              </a:solidFill>
-              <a:miter lim="800000"/>
-              <a:headEnd/>
-              <a:tailEnd/>
-            </a:ln>
-            <a:effectLst/>
-            <a:extLst>
-              <a:ext uri="{AF507438-7753-43E0-B8FC-AC1667EBCBE1}">
-                <a14:hiddenEffects xmlns:a14="http://schemas.microsoft.com/office/drawing/2010/main">
-                  <a:effectLst>
-                    <a:outerShdw dist="35921" dir="2700000" algn="ctr" rotWithShape="0">
-                      <a:srgbClr val="CCCCCC"/>
-                    </a:outerShdw>
-                  </a:effectLst>
-                </a14:hiddenEffects>
-              </a:ext>
-            </a:extLst>
-          </p:spPr>
-          <p:txBody>
-            <a:bodyPr vert="eaVert" wrap="square" lIns="36576" tIns="36576" rIns="36576" bIns="36576" numCol="1" anchor="t" anchorCtr="0" compatLnSpc="1">
-              <a:prstTxWarp prst="textNoShape">
-                <a:avLst/>
-              </a:prstTxWarp>
-            </a:bodyPr>
-            <a:lstStyle/>
-            <a:p>
-              <a:endParaRPr lang="ru-RU"/>
-            </a:p>
-          </p:txBody>
-        </p:sp>
-        <p:sp>
-          <p:nvSpPr>
-            <p:cNvPr id="5" name="AutoShape 4"/>
-            <p:cNvSpPr>
-              <a:spLocks noChangeArrowheads="1"/>
-            </p:cNvSpPr>
-            <p:nvPr/>
-          </p:nvSpPr>
-          <p:spPr bwMode="auto">
-            <a:xfrm>
-              <a:off x="112066986" y="124336096"/>
-              <a:ext cx="4268202" cy="1407695"/>
-            </a:xfrm>
-            <a:prstGeom prst="roundRect">
-              <a:avLst>
-                <a:gd name="adj" fmla="val 16667"/>
-              </a:avLst>
-            </a:prstGeom>
-            <a:solidFill>
-              <a:srgbClr val="FFCC66"/>
-            </a:solidFill>
-            <a:ln w="31750" algn="ctr">
-              <a:solidFill>
-                <a:srgbClr val="000000"/>
-              </a:solidFill>
-              <a:round/>
-              <a:headEnd/>
-              <a:tailEnd/>
-            </a:ln>
-            <a:effectLst/>
-            <a:extLst>
-              <a:ext uri="{AF507438-7753-43E0-B8FC-AC1667EBCBE1}">
-                <a14:hiddenEffects xmlns:a14="http://schemas.microsoft.com/office/drawing/2010/main">
-                  <a:effectLst>
-                    <a:outerShdw dist="35921" dir="2700000" algn="ctr" rotWithShape="0">
-                      <a:srgbClr val="868686"/>
-                    </a:outerShdw>
-                  </a:effectLst>
-                </a14:hiddenEffects>
-              </a:ext>
-            </a:extLst>
-          </p:spPr>
-          <p:txBody>
-            <a:bodyPr vert="horz" wrap="square" lIns="36576" tIns="36576" rIns="36576" bIns="36576" numCol="1" anchor="t" anchorCtr="0" compatLnSpc="1">
-              <a:prstTxWarp prst="textNoShape">
-                <a:avLst/>
-              </a:prstTxWarp>
-            </a:bodyPr>
-            <a:lstStyle/>
-            <a:p>
-              <a:pPr marL="0" marR="0" lvl="0" indent="0" algn="ctr" defTabSz="914400" rtl="0" eaLnBrk="1" fontAlgn="base" latinLnBrk="0" hangingPunct="1">
-                <a:lnSpc>
-                  <a:spcPct val="100000"/>
-                </a:lnSpc>
-                <a:spcBef>
-                  <a:spcPct val="0"/>
-                </a:spcBef>
-                <a:spcAft>
-                  <a:spcPct val="0"/>
-                </a:spcAft>
-                <a:buClrTx/>
-                <a:buSzTx/>
-                <a:buFontTx/>
-                <a:buNone/>
-                <a:tabLst/>
-              </a:pPr>
-              <a:r>
-                <a:rPr kumimoji="0" lang="en-US" altLang="ru-RU" sz="3600" b="0" i="0" u="none" strike="noStrike" cap="none" normalizeH="0" baseline="0" smtClean="0">
-                  <a:ln>
-                    <a:noFill/>
-                  </a:ln>
-                  <a:solidFill>
-                    <a:srgbClr val="000000"/>
-                  </a:solidFill>
-                  <a:effectLst/>
-                  <a:latin typeface="Calibri" pitchFamily="34" charset="0"/>
-                  <a:cs typeface="Arial" pitchFamily="34" charset="0"/>
-                </a:rPr>
-                <a:t>Django </a:t>
-              </a:r>
-              <a:r>
-                <a:rPr kumimoji="0" lang="ru-RU" altLang="ru-RU" sz="3600" b="0" i="0" u="none" strike="noStrike" cap="none" normalizeH="0" baseline="0" smtClean="0">
-                  <a:ln>
-                    <a:noFill/>
-                  </a:ln>
-                  <a:solidFill>
-                    <a:srgbClr val="000000"/>
-                  </a:solidFill>
-                  <a:effectLst/>
-                  <a:latin typeface="Calibri" pitchFamily="34" charset="0"/>
-                  <a:cs typeface="Arial" pitchFamily="34" charset="0"/>
-                </a:rPr>
-                <a:t>приложение (</a:t>
-              </a:r>
-              <a:r>
-                <a:rPr kumimoji="0" lang="en-US" altLang="ru-RU" sz="3600" b="0" i="0" u="none" strike="noStrike" cap="none" normalizeH="0" baseline="0" smtClean="0">
-                  <a:ln>
-                    <a:noFill/>
-                  </a:ln>
-                  <a:solidFill>
-                    <a:srgbClr val="000000"/>
-                  </a:solidFill>
-                  <a:effectLst/>
-                  <a:latin typeface="Calibri" pitchFamily="34" charset="0"/>
-                  <a:cs typeface="Arial" pitchFamily="34" charset="0"/>
-                </a:rPr>
-                <a:t>Python)</a:t>
-              </a:r>
-              <a:endParaRPr kumimoji="0" lang="ru-RU" altLang="ru-RU" sz="1800" b="0" i="0" u="none" strike="noStrike" cap="none" normalizeH="0" baseline="0" smtClean="0">
-                <a:ln>
-                  <a:noFill/>
-                </a:ln>
-                <a:solidFill>
-                  <a:schemeClr val="tx1"/>
-                </a:solidFill>
-                <a:effectLst/>
-                <a:latin typeface="Arial" pitchFamily="34" charset="0"/>
-                <a:cs typeface="Arial" pitchFamily="34" charset="0"/>
-              </a:endParaRPr>
-            </a:p>
-          </p:txBody>
-        </p:sp>
-        <p:sp>
-          <p:nvSpPr>
-            <p:cNvPr id="6" name="AutoShape 5"/>
-            <p:cNvSpPr>
-              <a:spLocks noChangeArrowheads="1"/>
-            </p:cNvSpPr>
-            <p:nvPr/>
-          </p:nvSpPr>
-          <p:spPr bwMode="auto">
-            <a:xfrm>
-              <a:off x="112331651" y="126576487"/>
-              <a:ext cx="2087711" cy="525113"/>
-            </a:xfrm>
-            <a:prstGeom prst="roundRect">
-              <a:avLst>
-                <a:gd name="adj" fmla="val 16667"/>
-              </a:avLst>
-            </a:prstGeom>
-            <a:solidFill>
-              <a:srgbClr val="FFCC66"/>
-            </a:solidFill>
-            <a:ln w="25400" algn="ctr">
-              <a:solidFill>
-                <a:srgbClr val="000000"/>
-              </a:solidFill>
-              <a:round/>
-              <a:headEnd/>
-              <a:tailEnd/>
-            </a:ln>
-            <a:effectLst/>
-            <a:extLst>
-              <a:ext uri="{AF507438-7753-43E0-B8FC-AC1667EBCBE1}">
-                <a14:hiddenEffects xmlns:a14="http://schemas.microsoft.com/office/drawing/2010/main">
-                  <a:effectLst>
-                    <a:outerShdw dist="35921" dir="2700000" algn="ctr" rotWithShape="0">
-                      <a:srgbClr val="CCCCCC"/>
-                    </a:outerShdw>
-                  </a:effectLst>
-                </a14:hiddenEffects>
-              </a:ext>
-            </a:extLst>
-          </p:spPr>
-          <p:txBody>
-            <a:bodyPr vert="horz" wrap="square" lIns="36576" tIns="36576" rIns="36576" bIns="36576" numCol="1" anchor="t" anchorCtr="0" compatLnSpc="1">
-              <a:prstTxWarp prst="textNoShape">
-                <a:avLst/>
-              </a:prstTxWarp>
-            </a:bodyPr>
-            <a:lstStyle/>
-            <a:p>
-              <a:pPr marL="0" marR="0" lvl="0" indent="0" algn="ctr" defTabSz="914400" rtl="0" eaLnBrk="1" fontAlgn="base" latinLnBrk="0" hangingPunct="1">
-                <a:lnSpc>
-                  <a:spcPct val="100000"/>
-                </a:lnSpc>
-                <a:spcBef>
-                  <a:spcPct val="0"/>
-                </a:spcBef>
-                <a:spcAft>
-                  <a:spcPct val="0"/>
-                </a:spcAft>
-                <a:buClrTx/>
-                <a:buSzTx/>
-                <a:buFontTx/>
-                <a:buNone/>
-                <a:tabLst/>
-              </a:pPr>
-              <a:r>
-                <a:rPr kumimoji="0" lang="en-US" altLang="ru-RU" sz="2100" b="0" i="0" u="none" strike="noStrike" cap="none" normalizeH="0" baseline="0" smtClean="0">
-                  <a:ln>
-                    <a:noFill/>
-                  </a:ln>
-                  <a:solidFill>
-                    <a:srgbClr val="000000"/>
-                  </a:solidFill>
-                  <a:effectLst/>
-                  <a:latin typeface="Calibri" pitchFamily="34" charset="0"/>
-                  <a:cs typeface="Arial" pitchFamily="34" charset="0"/>
-                </a:rPr>
-                <a:t>HTML-</a:t>
-              </a:r>
-              <a:r>
-                <a:rPr kumimoji="0" lang="ru-RU" altLang="ru-RU" sz="2100" b="0" i="0" u="none" strike="noStrike" cap="none" normalizeH="0" baseline="0" smtClean="0">
-                  <a:ln>
-                    <a:noFill/>
-                  </a:ln>
-                  <a:solidFill>
-                    <a:srgbClr val="000000"/>
-                  </a:solidFill>
-                  <a:effectLst/>
-                  <a:latin typeface="Calibri" pitchFamily="34" charset="0"/>
-                  <a:cs typeface="Arial" pitchFamily="34" charset="0"/>
-                </a:rPr>
-                <a:t>станицы</a:t>
-              </a:r>
-              <a:endParaRPr kumimoji="0" lang="ru-RU" altLang="ru-RU" sz="1800" b="0" i="0" u="none" strike="noStrike" cap="none" normalizeH="0" baseline="0" smtClean="0">
-                <a:ln>
-                  <a:noFill/>
-                </a:ln>
-                <a:solidFill>
-                  <a:schemeClr val="tx1"/>
-                </a:solidFill>
-                <a:effectLst/>
-                <a:latin typeface="Arial" pitchFamily="34" charset="0"/>
-                <a:cs typeface="Arial" pitchFamily="34" charset="0"/>
-              </a:endParaRPr>
-            </a:p>
-          </p:txBody>
-        </p:sp>
-        <p:sp>
-          <p:nvSpPr>
-            <p:cNvPr id="7" name="AutoShape 6"/>
-            <p:cNvSpPr>
-              <a:spLocks noChangeArrowheads="1"/>
-            </p:cNvSpPr>
-            <p:nvPr/>
-          </p:nvSpPr>
-          <p:spPr bwMode="auto">
-            <a:xfrm>
-              <a:off x="112658769" y="127969108"/>
-              <a:ext cx="1453661" cy="726831"/>
-            </a:xfrm>
-            <a:prstGeom prst="roundRect">
-              <a:avLst>
-                <a:gd name="adj" fmla="val 16667"/>
-              </a:avLst>
-            </a:prstGeom>
-            <a:solidFill>
-              <a:srgbClr val="666666"/>
-            </a:solidFill>
-            <a:ln w="25400" algn="ctr">
-              <a:solidFill>
-                <a:srgbClr val="000000"/>
-              </a:solidFill>
-              <a:round/>
-              <a:headEnd/>
-              <a:tailEnd/>
-            </a:ln>
-            <a:effectLst/>
-            <a:extLst>
-              <a:ext uri="{AF507438-7753-43E0-B8FC-AC1667EBCBE1}">
-                <a14:hiddenEffects xmlns:a14="http://schemas.microsoft.com/office/drawing/2010/main">
-                  <a:effectLst>
-                    <a:outerShdw dist="35921" dir="2700000" algn="ctr" rotWithShape="0">
-                      <a:srgbClr val="CCCCCC"/>
-                    </a:outerShdw>
-                  </a:effectLst>
-                </a14:hiddenEffects>
-              </a:ext>
-            </a:extLst>
-          </p:spPr>
-          <p:txBody>
-            <a:bodyPr vert="horz" wrap="square" lIns="36576" tIns="36576" rIns="36576" bIns="36576" numCol="1" anchor="t" anchorCtr="0" compatLnSpc="1">
-              <a:prstTxWarp prst="textNoShape">
-                <a:avLst/>
-              </a:prstTxWarp>
-            </a:bodyPr>
-            <a:lstStyle/>
-            <a:p>
-              <a:pPr marL="0" marR="0" lvl="0" indent="0" algn="ctr" defTabSz="914400" rtl="0" eaLnBrk="1" fontAlgn="base" latinLnBrk="0" hangingPunct="1">
-                <a:lnSpc>
-                  <a:spcPct val="100000"/>
-                </a:lnSpc>
-                <a:spcBef>
-                  <a:spcPct val="0"/>
-                </a:spcBef>
-                <a:spcAft>
-                  <a:spcPct val="0"/>
-                </a:spcAft>
-                <a:buClrTx/>
-                <a:buSzTx/>
-                <a:buFontTx/>
-                <a:buNone/>
-                <a:tabLst/>
-              </a:pPr>
-              <a:r>
-                <a:rPr kumimoji="0" lang="en-US" altLang="ru-RU" sz="3600" b="0" i="0" u="none" strike="noStrike" cap="none" normalizeH="0" baseline="0" smtClean="0">
-                  <a:ln>
-                    <a:noFill/>
-                  </a:ln>
-                  <a:solidFill>
-                    <a:srgbClr val="FFFFFF"/>
-                  </a:solidFill>
-                  <a:effectLst/>
-                  <a:latin typeface="Calibri" pitchFamily="34" charset="0"/>
-                  <a:cs typeface="Arial" pitchFamily="34" charset="0"/>
-                </a:rPr>
-                <a:t>User</a:t>
-              </a:r>
-              <a:endParaRPr kumimoji="0" lang="ru-RU" altLang="ru-RU" sz="1800" b="0" i="0" u="none" strike="noStrike" cap="none" normalizeH="0" baseline="0" smtClean="0">
-                <a:ln>
-                  <a:noFill/>
-                </a:ln>
-                <a:solidFill>
-                  <a:schemeClr val="tx1"/>
-                </a:solidFill>
-                <a:effectLst/>
-                <a:latin typeface="Arial" pitchFamily="34" charset="0"/>
-                <a:cs typeface="Arial" pitchFamily="34" charset="0"/>
-              </a:endParaRPr>
-            </a:p>
-          </p:txBody>
-        </p:sp>
-        <p:sp>
-          <p:nvSpPr>
-            <p:cNvPr id="8" name="AutoShape 7"/>
-            <p:cNvSpPr>
-              <a:spLocks noChangeArrowheads="1"/>
-            </p:cNvSpPr>
-            <p:nvPr/>
-          </p:nvSpPr>
-          <p:spPr bwMode="auto">
-            <a:xfrm>
-              <a:off x="115400504" y="126576487"/>
-              <a:ext cx="3071447" cy="586154"/>
-            </a:xfrm>
-            <a:prstGeom prst="roundRect">
-              <a:avLst>
-                <a:gd name="adj" fmla="val 16667"/>
-              </a:avLst>
-            </a:prstGeom>
-            <a:solidFill>
-              <a:srgbClr val="FFCC66"/>
-            </a:solidFill>
-            <a:ln w="25400" algn="ctr">
-              <a:solidFill>
-                <a:srgbClr val="000000"/>
-              </a:solidFill>
-              <a:round/>
-              <a:headEnd/>
-              <a:tailEnd/>
-            </a:ln>
-            <a:effectLst/>
-            <a:extLst>
-              <a:ext uri="{AF507438-7753-43E0-B8FC-AC1667EBCBE1}">
-                <a14:hiddenEffects xmlns:a14="http://schemas.microsoft.com/office/drawing/2010/main">
-                  <a:effectLst>
-                    <a:outerShdw dist="35921" dir="2700000" algn="ctr" rotWithShape="0">
-                      <a:srgbClr val="CCCCCC"/>
-                    </a:outerShdw>
-                  </a:effectLst>
-                </a14:hiddenEffects>
-              </a:ext>
-            </a:extLst>
-          </p:spPr>
-          <p:txBody>
-            <a:bodyPr vert="horz" wrap="square" lIns="36576" tIns="36576" rIns="36576" bIns="36576" numCol="1" anchor="t" anchorCtr="0" compatLnSpc="1">
-              <a:prstTxWarp prst="textNoShape">
-                <a:avLst/>
-              </a:prstTxWarp>
-            </a:bodyPr>
-            <a:lstStyle/>
-            <a:p>
-              <a:pPr marL="0" marR="0" lvl="0" indent="0" algn="ctr" defTabSz="914400" rtl="0" eaLnBrk="1" fontAlgn="base" latinLnBrk="0" hangingPunct="1">
-                <a:lnSpc>
-                  <a:spcPct val="100000"/>
-                </a:lnSpc>
-                <a:spcBef>
-                  <a:spcPct val="0"/>
-                </a:spcBef>
-                <a:spcAft>
-                  <a:spcPct val="0"/>
-                </a:spcAft>
-                <a:buClrTx/>
-                <a:buSzTx/>
-                <a:buFontTx/>
-                <a:buNone/>
-                <a:tabLst/>
-              </a:pPr>
-              <a:r>
-                <a:rPr kumimoji="0" lang="ru-RU" altLang="ru-RU" sz="2400" b="0" i="0" u="none" strike="noStrike" cap="none" normalizeH="0" baseline="0" smtClean="0">
-                  <a:ln>
-                    <a:noFill/>
-                  </a:ln>
-                  <a:solidFill>
-                    <a:srgbClr val="000000"/>
-                  </a:solidFill>
-                  <a:effectLst/>
-                  <a:latin typeface="Calibri" pitchFamily="34" charset="0"/>
-                  <a:cs typeface="Arial" pitchFamily="34" charset="0"/>
-                </a:rPr>
-                <a:t>Таблица стилей </a:t>
-              </a:r>
-              <a:r>
-                <a:rPr kumimoji="0" lang="en-US" altLang="ru-RU" sz="2400" b="0" i="0" u="none" strike="noStrike" cap="none" normalizeH="0" baseline="0" smtClean="0">
-                  <a:ln>
-                    <a:noFill/>
-                  </a:ln>
-                  <a:solidFill>
-                    <a:srgbClr val="000000"/>
-                  </a:solidFill>
-                  <a:effectLst/>
-                  <a:latin typeface="Calibri" pitchFamily="34" charset="0"/>
-                  <a:cs typeface="Arial" pitchFamily="34" charset="0"/>
-                </a:rPr>
-                <a:t>CSS</a:t>
-              </a:r>
-              <a:endParaRPr kumimoji="0" lang="ru-RU" altLang="ru-RU" sz="1800" b="0" i="0" u="none" strike="noStrike" cap="none" normalizeH="0" baseline="0" smtClean="0">
-                <a:ln>
-                  <a:noFill/>
-                </a:ln>
-                <a:solidFill>
-                  <a:schemeClr val="tx1"/>
-                </a:solidFill>
-                <a:effectLst/>
-                <a:latin typeface="Arial" pitchFamily="34" charset="0"/>
-                <a:cs typeface="Arial" pitchFamily="34" charset="0"/>
-              </a:endParaRPr>
-            </a:p>
-          </p:txBody>
-        </p:sp>
-        <p:sp>
-          <p:nvSpPr>
-            <p:cNvPr id="9" name="AutoShape 8"/>
-            <p:cNvSpPr>
-              <a:spLocks noChangeArrowheads="1"/>
-            </p:cNvSpPr>
-            <p:nvPr/>
-          </p:nvSpPr>
-          <p:spPr bwMode="auto">
-            <a:xfrm>
-              <a:off x="114466255" y="126615825"/>
-              <a:ext cx="859082" cy="485775"/>
-            </a:xfrm>
-            <a:prstGeom prst="leftArrow">
-              <a:avLst>
-                <a:gd name="adj1" fmla="val 50000"/>
-                <a:gd name="adj2" fmla="val 44212"/>
-              </a:avLst>
-            </a:prstGeom>
-            <a:solidFill>
-              <a:srgbClr val="FFCC66"/>
-            </a:solidFill>
-            <a:ln w="25400" algn="ctr">
-              <a:solidFill>
-                <a:srgbClr val="000000"/>
-              </a:solidFill>
-              <a:miter lim="800000"/>
-              <a:headEnd/>
-              <a:tailEnd/>
-            </a:ln>
-            <a:effectLst/>
-            <a:extLst>
-              <a:ext uri="{AF507438-7753-43E0-B8FC-AC1667EBCBE1}">
-                <a14:hiddenEffects xmlns:a14="http://schemas.microsoft.com/office/drawing/2010/main">
-                  <a:effectLst>
-                    <a:outerShdw dist="35921" dir="2700000" algn="ctr" rotWithShape="0">
-                      <a:srgbClr val="CCCCCC"/>
-                    </a:outerShdw>
-                  </a:effectLst>
-                </a14:hiddenEffects>
-              </a:ext>
-            </a:extLst>
-          </p:spPr>
-          <p:txBody>
-            <a:bodyPr vert="horz" wrap="square" lIns="36576" tIns="36576" rIns="36576" bIns="36576" numCol="1" anchor="t" anchorCtr="0" compatLnSpc="1">
-              <a:prstTxWarp prst="textNoShape">
-                <a:avLst/>
-              </a:prstTxWarp>
-            </a:bodyPr>
-            <a:lstStyle/>
-            <a:p>
-              <a:endParaRPr lang="ru-RU"/>
-            </a:p>
-          </p:txBody>
-        </p:sp>
-        <p:sp>
-          <p:nvSpPr>
-            <p:cNvPr id="10" name="AutoShape 9"/>
-            <p:cNvSpPr>
-              <a:spLocks noChangeArrowheads="1"/>
-            </p:cNvSpPr>
-            <p:nvPr/>
-          </p:nvSpPr>
-          <p:spPr bwMode="auto">
-            <a:xfrm>
-              <a:off x="117182413" y="124100492"/>
-              <a:ext cx="3399692" cy="1875692"/>
-            </a:xfrm>
-            <a:prstGeom prst="roundRect">
-              <a:avLst>
-                <a:gd name="adj" fmla="val 16667"/>
-              </a:avLst>
-            </a:prstGeom>
-            <a:solidFill>
-              <a:srgbClr val="FFCC66"/>
-            </a:solidFill>
-            <a:ln w="25400" algn="ctr">
-              <a:solidFill>
-                <a:srgbClr val="000000"/>
-              </a:solidFill>
-              <a:round/>
-              <a:headEnd/>
-              <a:tailEnd/>
-            </a:ln>
-            <a:effectLst/>
-            <a:extLst>
-              <a:ext uri="{AF507438-7753-43E0-B8FC-AC1667EBCBE1}">
-                <a14:hiddenEffects xmlns:a14="http://schemas.microsoft.com/office/drawing/2010/main">
-                  <a:effectLst>
-                    <a:outerShdw dist="35921" dir="2700000" algn="ctr" rotWithShape="0">
-                      <a:srgbClr val="CCCCCC"/>
-                    </a:outerShdw>
-                  </a:effectLst>
-                </a14:hiddenEffects>
-              </a:ext>
-            </a:extLst>
-          </p:spPr>
-          <p:txBody>
-            <a:bodyPr vert="horz" wrap="square" lIns="36576" tIns="36576" rIns="36576" bIns="36576" numCol="1" anchor="t" anchorCtr="0" compatLnSpc="1">
-              <a:prstTxWarp prst="textNoShape">
-                <a:avLst/>
-              </a:prstTxWarp>
-            </a:bodyPr>
-            <a:lstStyle/>
-            <a:p>
-              <a:pPr marL="0" marR="0" lvl="0" indent="0" algn="l" defTabSz="914400" rtl="0" eaLnBrk="1" fontAlgn="base" latinLnBrk="0" hangingPunct="1">
-                <a:lnSpc>
-                  <a:spcPct val="100000"/>
-                </a:lnSpc>
-                <a:spcBef>
-                  <a:spcPct val="0"/>
-                </a:spcBef>
-                <a:spcAft>
-                  <a:spcPct val="0"/>
-                </a:spcAft>
-                <a:buClrTx/>
-                <a:buSzTx/>
-                <a:buFontTx/>
-                <a:buNone/>
-                <a:tabLst/>
-              </a:pPr>
-              <a:r>
-                <a:rPr kumimoji="0" lang="ru-RU" altLang="ru-RU" sz="2200" b="0" i="0" u="none" strike="noStrike" cap="none" normalizeH="0" baseline="0" smtClean="0">
-                  <a:ln>
-                    <a:noFill/>
-                  </a:ln>
-                  <a:solidFill>
-                    <a:srgbClr val="000000"/>
-                  </a:solidFill>
-                  <a:effectLst/>
-                  <a:latin typeface="Calibri" pitchFamily="34" charset="0"/>
-                  <a:cs typeface="Arial" pitchFamily="34" charset="0"/>
-                </a:rPr>
-                <a:t>Модули на  </a:t>
-              </a:r>
-              <a:r>
-                <a:rPr kumimoji="0" lang="en-US" altLang="ru-RU" sz="2200" b="0" i="0" u="none" strike="noStrike" cap="none" normalizeH="0" baseline="0" smtClean="0">
-                  <a:ln>
-                    <a:noFill/>
-                  </a:ln>
-                  <a:solidFill>
-                    <a:srgbClr val="000000"/>
-                  </a:solidFill>
-                  <a:effectLst/>
-                  <a:latin typeface="Calibri" pitchFamily="34" charset="0"/>
-                  <a:cs typeface="Arial" pitchFamily="34" charset="0"/>
-                </a:rPr>
-                <a:t>Python:</a:t>
-              </a:r>
-              <a:br>
-                <a:rPr kumimoji="0" lang="en-US" altLang="ru-RU" sz="2200" b="0" i="0" u="none" strike="noStrike" cap="none" normalizeH="0" baseline="0" smtClean="0">
-                  <a:ln>
-                    <a:noFill/>
-                  </a:ln>
-                  <a:solidFill>
-                    <a:srgbClr val="000000"/>
-                  </a:solidFill>
-                  <a:effectLst/>
-                  <a:latin typeface="Calibri" pitchFamily="34" charset="0"/>
-                  <a:cs typeface="Arial" pitchFamily="34" charset="0"/>
-                </a:rPr>
-              </a:br>
-              <a:r>
-                <a:rPr kumimoji="0" lang="en-US" altLang="ru-RU" sz="2200" b="0" i="0" u="none" strike="noStrike" cap="none" normalizeH="0" baseline="0" smtClean="0">
-                  <a:ln>
-                    <a:noFill/>
-                  </a:ln>
-                  <a:solidFill>
-                    <a:srgbClr val="000000"/>
-                  </a:solidFill>
-                  <a:effectLst/>
-                  <a:latin typeface="Calibri" pitchFamily="34" charset="0"/>
-                  <a:cs typeface="Arial" pitchFamily="34" charset="0"/>
-                </a:rPr>
-                <a:t>- Scipy</a:t>
-              </a:r>
-              <a:br>
-                <a:rPr kumimoji="0" lang="en-US" altLang="ru-RU" sz="2200" b="0" i="0" u="none" strike="noStrike" cap="none" normalizeH="0" baseline="0" smtClean="0">
-                  <a:ln>
-                    <a:noFill/>
-                  </a:ln>
-                  <a:solidFill>
-                    <a:srgbClr val="000000"/>
-                  </a:solidFill>
-                  <a:effectLst/>
-                  <a:latin typeface="Calibri" pitchFamily="34" charset="0"/>
-                  <a:cs typeface="Arial" pitchFamily="34" charset="0"/>
-                </a:rPr>
-              </a:br>
-              <a:r>
-                <a:rPr kumimoji="0" lang="en-US" altLang="ru-RU" sz="2200" b="0" i="0" u="none" strike="noStrike" cap="none" normalizeH="0" baseline="0" smtClean="0">
-                  <a:ln>
-                    <a:noFill/>
-                  </a:ln>
-                  <a:solidFill>
-                    <a:srgbClr val="000000"/>
-                  </a:solidFill>
-                  <a:effectLst/>
-                  <a:latin typeface="Calibri" pitchFamily="34" charset="0"/>
-                  <a:cs typeface="Arial" pitchFamily="34" charset="0"/>
-                </a:rPr>
-                <a:t>- NLTK (Natural Language Toolkit)</a:t>
-              </a:r>
-              <a:endParaRPr kumimoji="0" lang="ru-RU" altLang="ru-RU" sz="1800" b="0" i="0" u="none" strike="noStrike" cap="none" normalizeH="0" baseline="0" smtClean="0">
-                <a:ln>
-                  <a:noFill/>
-                </a:ln>
-                <a:solidFill>
-                  <a:schemeClr val="tx1"/>
-                </a:solidFill>
-                <a:effectLst/>
-                <a:latin typeface="Arial" pitchFamily="34" charset="0"/>
-                <a:cs typeface="Arial" pitchFamily="34" charset="0"/>
-              </a:endParaRPr>
-            </a:p>
-          </p:txBody>
-        </p:sp>
-        <p:sp>
-          <p:nvSpPr>
-            <p:cNvPr id="11" name="AutoShape 10"/>
-            <p:cNvSpPr>
-              <a:spLocks noChangeArrowheads="1"/>
-            </p:cNvSpPr>
-            <p:nvPr/>
-          </p:nvSpPr>
-          <p:spPr bwMode="auto">
-            <a:xfrm>
-              <a:off x="113298557" y="122154463"/>
-              <a:ext cx="372793" cy="2110153"/>
-            </a:xfrm>
-            <a:prstGeom prst="upArrow">
-              <a:avLst>
-                <a:gd name="adj1" fmla="val 50000"/>
-                <a:gd name="adj2" fmla="val 141510"/>
-              </a:avLst>
-            </a:prstGeom>
-            <a:solidFill>
-              <a:srgbClr val="FFCC66"/>
-            </a:solidFill>
-            <a:ln w="25400" algn="ctr">
-              <a:solidFill>
-                <a:srgbClr val="000000"/>
-              </a:solidFill>
-              <a:miter lim="800000"/>
-              <a:headEnd/>
-              <a:tailEnd/>
-            </a:ln>
-            <a:effectLst/>
-            <a:extLst>
-              <a:ext uri="{AF507438-7753-43E0-B8FC-AC1667EBCBE1}">
-                <a14:hiddenEffects xmlns:a14="http://schemas.microsoft.com/office/drawing/2010/main">
-                  <a:effectLst>
-                    <a:outerShdw dist="35921" dir="2700000" algn="ctr" rotWithShape="0">
-                      <a:srgbClr val="CCCCCC"/>
-                    </a:outerShdw>
-                  </a:effectLst>
-                </a14:hiddenEffects>
-              </a:ext>
-            </a:extLst>
-          </p:spPr>
-          <p:txBody>
-            <a:bodyPr vert="eaVert" wrap="square" lIns="36576" tIns="36576" rIns="36576" bIns="36576" numCol="1" anchor="t" anchorCtr="0" compatLnSpc="1">
-              <a:prstTxWarp prst="textNoShape">
-                <a:avLst/>
-              </a:prstTxWarp>
-            </a:bodyPr>
-            <a:lstStyle/>
-            <a:p>
-              <a:endParaRPr lang="ru-RU"/>
-            </a:p>
-          </p:txBody>
-        </p:sp>
-        <p:sp>
-          <p:nvSpPr>
-            <p:cNvPr id="12" name="AutoShape 11"/>
-            <p:cNvSpPr>
-              <a:spLocks noChangeArrowheads="1"/>
-            </p:cNvSpPr>
-            <p:nvPr/>
-          </p:nvSpPr>
-          <p:spPr bwMode="auto">
-            <a:xfrm>
-              <a:off x="112991844" y="122810952"/>
-              <a:ext cx="3001108" cy="984739"/>
-            </a:xfrm>
-            <a:prstGeom prst="roundRect">
-              <a:avLst>
-                <a:gd name="adj" fmla="val 16667"/>
-              </a:avLst>
-            </a:prstGeom>
-            <a:solidFill>
-              <a:srgbClr val="FFCC66"/>
-            </a:solidFill>
-            <a:ln w="25400" algn="ctr">
-              <a:solidFill>
-                <a:srgbClr val="000000"/>
-              </a:solidFill>
-              <a:round/>
-              <a:headEnd/>
-              <a:tailEnd/>
-            </a:ln>
-            <a:effectLst/>
-            <a:extLst>
-              <a:ext uri="{AF507438-7753-43E0-B8FC-AC1667EBCBE1}">
-                <a14:hiddenEffects xmlns:a14="http://schemas.microsoft.com/office/drawing/2010/main">
-                  <a:effectLst>
-                    <a:outerShdw dist="35921" dir="2700000" algn="ctr" rotWithShape="0">
-                      <a:srgbClr val="CCCCCC"/>
-                    </a:outerShdw>
-                  </a:effectLst>
-                </a14:hiddenEffects>
-              </a:ext>
-            </a:extLst>
-          </p:spPr>
-          <p:txBody>
-            <a:bodyPr vert="horz" wrap="square" lIns="36576" tIns="36576" rIns="36576" bIns="36576" numCol="1" anchor="t" anchorCtr="0" compatLnSpc="1">
-              <a:prstTxWarp prst="textNoShape">
-                <a:avLst/>
-              </a:prstTxWarp>
-            </a:bodyPr>
-            <a:lstStyle/>
-            <a:p>
-              <a:pPr marL="0" marR="0" lvl="0" indent="0" algn="l" defTabSz="914400" rtl="0" eaLnBrk="1" fontAlgn="base" latinLnBrk="0" hangingPunct="1">
-                <a:lnSpc>
-                  <a:spcPct val="100000"/>
-                </a:lnSpc>
-                <a:spcBef>
-                  <a:spcPct val="0"/>
-                </a:spcBef>
-                <a:spcAft>
-                  <a:spcPct val="0"/>
-                </a:spcAft>
-                <a:buClrTx/>
-                <a:buSzTx/>
-                <a:buFontTx/>
-                <a:buNone/>
-                <a:tabLst/>
-              </a:pPr>
-              <a:r>
-                <a:rPr kumimoji="0" lang="ru-RU" altLang="ru-RU" sz="2200" b="0" i="0" u="none" strike="noStrike" cap="none" normalizeH="0" baseline="0" smtClean="0">
-                  <a:ln>
-                    <a:noFill/>
-                  </a:ln>
-                  <a:solidFill>
-                    <a:srgbClr val="000000"/>
-                  </a:solidFill>
-                  <a:effectLst/>
-                  <a:latin typeface="Calibri" pitchFamily="34" charset="0"/>
-                  <a:cs typeface="Arial" pitchFamily="34" charset="0"/>
-                </a:rPr>
-                <a:t>Библиотека парсинга </a:t>
-              </a:r>
-              <a:r>
-                <a:rPr kumimoji="0" lang="en-US" altLang="ru-RU" sz="2200" b="0" i="0" u="none" strike="noStrike" cap="none" normalizeH="0" baseline="0" smtClean="0">
-                  <a:ln>
-                    <a:noFill/>
-                  </a:ln>
-                  <a:solidFill>
-                    <a:srgbClr val="000000"/>
-                  </a:solidFill>
-                  <a:effectLst/>
-                  <a:latin typeface="Calibri" pitchFamily="34" charset="0"/>
-                  <a:cs typeface="Arial" pitchFamily="34" charset="0"/>
-                </a:rPr>
-                <a:t>web-</a:t>
-              </a:r>
-              <a:r>
-                <a:rPr kumimoji="0" lang="ru-RU" altLang="ru-RU" sz="2200" b="0" i="0" u="none" strike="noStrike" cap="none" normalizeH="0" baseline="0" smtClean="0">
-                  <a:ln>
-                    <a:noFill/>
-                  </a:ln>
-                  <a:solidFill>
-                    <a:srgbClr val="000000"/>
-                  </a:solidFill>
-                  <a:effectLst/>
-                  <a:latin typeface="Calibri" pitchFamily="34" charset="0"/>
-                  <a:cs typeface="Arial" pitchFamily="34" charset="0"/>
-                </a:rPr>
-                <a:t>сайтов </a:t>
-              </a:r>
-              <a:r>
-                <a:rPr kumimoji="0" lang="en-US" altLang="ru-RU" sz="2200" b="0" i="0" u="none" strike="noStrike" cap="none" normalizeH="0" baseline="0" smtClean="0">
-                  <a:ln>
-                    <a:noFill/>
-                  </a:ln>
-                  <a:solidFill>
-                    <a:srgbClr val="000000"/>
-                  </a:solidFill>
-                  <a:effectLst/>
-                  <a:latin typeface="Calibri" pitchFamily="34" charset="0"/>
-                  <a:cs typeface="Arial" pitchFamily="34" charset="0"/>
-                </a:rPr>
-                <a:t>Grab</a:t>
-              </a:r>
-              <a:endParaRPr kumimoji="0" lang="ru-RU" altLang="ru-RU" sz="1800" b="0" i="0" u="none" strike="noStrike" cap="none" normalizeH="0" baseline="0" smtClean="0">
-                <a:ln>
-                  <a:noFill/>
-                </a:ln>
-                <a:solidFill>
-                  <a:schemeClr val="tx1"/>
-                </a:solidFill>
-                <a:effectLst/>
-                <a:latin typeface="Arial" pitchFamily="34" charset="0"/>
-                <a:cs typeface="Arial" pitchFamily="34" charset="0"/>
-              </a:endParaRPr>
-            </a:p>
-          </p:txBody>
-        </p:sp>
-        <p:sp>
-          <p:nvSpPr>
-            <p:cNvPr id="13" name="AutoShape 12"/>
-            <p:cNvSpPr>
-              <a:spLocks noChangeArrowheads="1"/>
-            </p:cNvSpPr>
-            <p:nvPr/>
-          </p:nvSpPr>
-          <p:spPr bwMode="auto">
-            <a:xfrm>
-              <a:off x="115325337" y="123842584"/>
-              <a:ext cx="438882" cy="460498"/>
-            </a:xfrm>
-            <a:prstGeom prst="downArrow">
-              <a:avLst>
-                <a:gd name="adj1" fmla="val 50000"/>
-                <a:gd name="adj2" fmla="val 26231"/>
-              </a:avLst>
-            </a:prstGeom>
-            <a:solidFill>
-              <a:srgbClr val="FFCC66"/>
-            </a:solidFill>
-            <a:ln w="25400" algn="ctr">
-              <a:solidFill>
-                <a:srgbClr val="000000"/>
-              </a:solidFill>
-              <a:miter lim="800000"/>
-              <a:headEnd/>
-              <a:tailEnd/>
-            </a:ln>
-            <a:effectLst/>
-            <a:extLst>
-              <a:ext uri="{AF507438-7753-43E0-B8FC-AC1667EBCBE1}">
-                <a14:hiddenEffects xmlns:a14="http://schemas.microsoft.com/office/drawing/2010/main">
-                  <a:effectLst>
-                    <a:outerShdw dist="35921" dir="2700000" algn="ctr" rotWithShape="0">
-                      <a:srgbClr val="CCCCCC"/>
-                    </a:outerShdw>
-                  </a:effectLst>
-                </a14:hiddenEffects>
-              </a:ext>
-            </a:extLst>
-          </p:spPr>
-          <p:txBody>
-            <a:bodyPr vert="eaVert" wrap="square" lIns="36576" tIns="36576" rIns="36576" bIns="36576" numCol="1" anchor="t" anchorCtr="0" compatLnSpc="1">
-              <a:prstTxWarp prst="textNoShape">
-                <a:avLst/>
-              </a:prstTxWarp>
-            </a:bodyPr>
-            <a:lstStyle/>
-            <a:p>
-              <a:endParaRPr lang="ru-RU"/>
-            </a:p>
-          </p:txBody>
-        </p:sp>
-        <p:grpSp>
-          <p:nvGrpSpPr>
-            <p:cNvPr id="14" name="Group 13"/>
-            <p:cNvGrpSpPr>
-              <a:grpSpLocks/>
-            </p:cNvGrpSpPr>
-            <p:nvPr/>
-          </p:nvGrpSpPr>
-          <p:grpSpPr bwMode="auto">
-            <a:xfrm>
-              <a:off x="112066986" y="120858113"/>
-              <a:ext cx="1713701" cy="1228497"/>
-              <a:chOff x="112707794" y="120858113"/>
-              <a:chExt cx="1404636" cy="1228497"/>
-            </a:xfrm>
-          </p:grpSpPr>
-          <p:sp>
-            <p:nvSpPr>
-              <p:cNvPr id="17" name="AutoShape 14"/>
-              <p:cNvSpPr>
-                <a:spLocks noChangeArrowheads="1"/>
-              </p:cNvSpPr>
-              <p:nvPr/>
-            </p:nvSpPr>
-            <p:spPr bwMode="auto">
-              <a:xfrm>
-                <a:off x="112707794" y="120858113"/>
-                <a:ext cx="1404636" cy="1228497"/>
-              </a:xfrm>
-              <a:prstGeom prst="roundRect">
-                <a:avLst>
-                  <a:gd name="adj" fmla="val 16667"/>
-                </a:avLst>
-              </a:prstGeom>
-              <a:solidFill>
-                <a:srgbClr val="FFFFFF"/>
-              </a:solidFill>
-              <a:ln w="31750" algn="ctr">
-                <a:solidFill>
-                  <a:srgbClr val="000000"/>
-                </a:solidFill>
-                <a:round/>
-                <a:headEnd/>
-                <a:tailEnd/>
-              </a:ln>
-              <a:effectLst/>
-              <a:extLst>
-                <a:ext uri="{AF507438-7753-43E0-B8FC-AC1667EBCBE1}">
-                  <a14:hiddenEffects xmlns:a14="http://schemas.microsoft.com/office/drawing/2010/main">
-                    <a:effectLst>
-                      <a:outerShdw dist="35921" dir="2700000" algn="ctr" rotWithShape="0">
-                        <a:srgbClr val="868686"/>
-                      </a:outerShdw>
-                    </a:effectLst>
-                  </a14:hiddenEffects>
-                </a:ext>
-              </a:extLst>
-            </p:spPr>
-            <p:txBody>
-              <a:bodyPr vert="horz" wrap="square" lIns="36576" tIns="36576" rIns="36576" bIns="36576" numCol="1" anchor="t" anchorCtr="0" compatLnSpc="1">
-                <a:prstTxWarp prst="textNoShape">
-                  <a:avLst/>
-                </a:prstTxWarp>
-              </a:bodyPr>
-              <a:lstStyle/>
-              <a:p>
-                <a:endParaRPr lang="ru-RU"/>
-              </a:p>
-            </p:txBody>
-          </p:sp>
-          <p:pic>
-            <p:nvPicPr>
-              <p:cNvPr id="1039" name="Picture 15" descr="unnamed"/>
-              <p:cNvPicPr>
-                <a:picLocks noChangeAspect="1" noChangeArrowheads="1"/>
-              </p:cNvPicPr>
-              <p:nvPr/>
-            </p:nvPicPr>
-            <p:blipFill>
-              <a:blip r:embed="rId2">
-                <a:extLst>
-                  <a:ext uri="{28A0092B-C50C-407E-A947-70E740481C1C}">
-                    <a14:useLocalDpi xmlns:a14="http://schemas.microsoft.com/office/drawing/2010/main" val="0"/>
-                  </a:ext>
-                </a:extLst>
-              </a:blip>
-              <a:srcRect/>
-              <a:stretch>
-                <a:fillRect/>
-              </a:stretch>
-            </p:blipFill>
-            <p:spPr bwMode="auto">
-              <a:xfrm>
-                <a:off x="112944299" y="121011392"/>
-                <a:ext cx="950302" cy="950302"/>
-              </a:xfrm>
-              <a:prstGeom prst="rect">
-                <a:avLst/>
-              </a:prstGeom>
-              <a:noFill/>
-              <a:ln>
-                <a:noFill/>
-              </a:ln>
-              <a:effectLst/>
-              <a:extLst>
-                <a:ext uri="{909E8E84-426E-40DD-AFC4-6F175D3DCCD1}">
-                  <a14:hiddenFill xmlns:a14="http://schemas.microsoft.com/office/drawing/2010/main">
-                    <a:solidFill>
-                      <a:srgbClr val="FFFFFF"/>
-                    </a:solidFill>
-                  </a14:hiddenFill>
-                </a:ext>
-                <a:ext uri="{91240B29-F687-4F45-9708-019B960494DF}">
-                  <a14:hiddenLine xmlns:a14="http://schemas.microsoft.com/office/drawing/2010/main" w="25400" algn="ctr">
-                    <a:solidFill>
-                      <a:srgbClr val="000000"/>
-                    </a:solidFill>
-                    <a:miter lim="800000"/>
-                    <a:headEnd/>
-                    <a:tailEnd/>
-                  </a14:hiddenLine>
-                </a:ext>
-                <a:ext uri="{AF507438-7753-43E0-B8FC-AC1667EBCBE1}">
-                  <a14:hiddenEffects xmlns:a14="http://schemas.microsoft.com/office/drawing/2010/main">
-                    <a:effectLst>
-                      <a:outerShdw dist="35921" dir="2700000" algn="ctr" rotWithShape="0">
-                        <a:srgbClr val="CCCCCC"/>
-                      </a:outerShdw>
-                    </a:effectLst>
-                  </a14:hiddenEffects>
-                </a:ext>
-              </a:extLst>
-            </p:spPr>
-          </p:pic>
-        </p:grpSp>
-        <p:sp>
-          <p:nvSpPr>
-            <p:cNvPr id="15" name="AutoShape 16"/>
-            <p:cNvSpPr>
-              <a:spLocks noChangeArrowheads="1"/>
-            </p:cNvSpPr>
-            <p:nvPr/>
-          </p:nvSpPr>
-          <p:spPr bwMode="auto">
-            <a:xfrm>
-              <a:off x="116386708" y="124874215"/>
-              <a:ext cx="726830" cy="445478"/>
-            </a:xfrm>
-            <a:prstGeom prst="leftArrow">
-              <a:avLst>
-                <a:gd name="adj1" fmla="val 50000"/>
-                <a:gd name="adj2" fmla="val 40789"/>
-              </a:avLst>
-            </a:prstGeom>
-            <a:solidFill>
-              <a:srgbClr val="FFCC66"/>
-            </a:solidFill>
-            <a:ln w="25400" algn="ctr">
-              <a:solidFill>
-                <a:srgbClr val="000000"/>
-              </a:solidFill>
-              <a:miter lim="800000"/>
-              <a:headEnd/>
-              <a:tailEnd/>
-            </a:ln>
-            <a:effectLst/>
-            <a:extLst>
-              <a:ext uri="{AF507438-7753-43E0-B8FC-AC1667EBCBE1}">
-                <a14:hiddenEffects xmlns:a14="http://schemas.microsoft.com/office/drawing/2010/main">
-                  <a:effectLst>
-                    <a:outerShdw dist="35921" dir="2700000" algn="ctr" rotWithShape="0">
-                      <a:srgbClr val="CCCCCC"/>
-                    </a:outerShdw>
-                  </a:effectLst>
-                </a14:hiddenEffects>
-              </a:ext>
-            </a:extLst>
-          </p:spPr>
-          <p:txBody>
-            <a:bodyPr vert="horz" wrap="square" lIns="36576" tIns="36576" rIns="36576" bIns="36576" numCol="1" anchor="t" anchorCtr="0" compatLnSpc="1">
-              <a:prstTxWarp prst="textNoShape">
-                <a:avLst/>
-              </a:prstTxWarp>
-            </a:bodyPr>
-            <a:lstStyle/>
-            <a:p>
-              <a:endParaRPr lang="ru-RU"/>
-            </a:p>
-          </p:txBody>
-        </p:sp>
-        <p:sp>
-          <p:nvSpPr>
-            <p:cNvPr id="16" name="AutoShape 17"/>
-            <p:cNvSpPr>
-              <a:spLocks noChangeArrowheads="1"/>
-            </p:cNvSpPr>
-            <p:nvPr/>
-          </p:nvSpPr>
-          <p:spPr bwMode="auto">
-            <a:xfrm>
-              <a:off x="112331651" y="122154463"/>
-              <a:ext cx="445477" cy="2110153"/>
-            </a:xfrm>
-            <a:prstGeom prst="downArrow">
-              <a:avLst>
-                <a:gd name="adj1" fmla="val 50000"/>
-                <a:gd name="adj2" fmla="val 118421"/>
-              </a:avLst>
-            </a:prstGeom>
-            <a:solidFill>
-              <a:srgbClr val="FFCC66"/>
-            </a:solidFill>
-            <a:ln w="25400" algn="ctr">
-              <a:solidFill>
-                <a:srgbClr val="000000"/>
-              </a:solidFill>
-              <a:miter lim="800000"/>
-              <a:headEnd/>
-              <a:tailEnd/>
-            </a:ln>
-            <a:effectLst/>
-            <a:extLst>
-              <a:ext uri="{AF507438-7753-43E0-B8FC-AC1667EBCBE1}">
-                <a14:hiddenEffects xmlns:a14="http://schemas.microsoft.com/office/drawing/2010/main">
-                  <a:effectLst>
-                    <a:outerShdw dist="35921" dir="2700000" algn="ctr" rotWithShape="0">
-                      <a:srgbClr val="CCCCCC"/>
-                    </a:outerShdw>
-                  </a:effectLst>
-                </a14:hiddenEffects>
-              </a:ext>
-            </a:extLst>
-          </p:spPr>
-          <p:txBody>
-            <a:bodyPr vert="eaVert" wrap="square" lIns="36576" tIns="36576" rIns="36576" bIns="36576" numCol="1" anchor="t" anchorCtr="0" compatLnSpc="1">
-              <a:prstTxWarp prst="textNoShape">
-                <a:avLst/>
-              </a:prstTxWarp>
-            </a:bodyPr>
-            <a:lstStyle/>
-            <a:p>
-              <a:endParaRPr lang="ru-RU"/>
-            </a:p>
-          </p:txBody>
-        </p:sp>
-      </p:grpSp>
-      <p:pic>
-        <p:nvPicPr>
-          <p:cNvPr id="1058" name="Picture 34"/>
-          <p:cNvPicPr>
-            <a:picLocks noChangeAspect="1" noChangeArrowheads="1"/>
-          </p:cNvPicPr>
-          <p:nvPr/>
-        </p:nvPicPr>
-        <p:blipFill>
-          <a:blip r:embed="rId3">
-            <a:extLst>
-              <a:ext uri="{28A0092B-C50C-407E-A947-70E740481C1C}">
-                <a14:useLocalDpi xmlns:a14="http://schemas.microsoft.com/office/drawing/2010/main" val="0"/>
-              </a:ext>
-            </a:extLst>
-          </a:blip>
-          <a:srcRect/>
-          <a:stretch>
-            <a:fillRect/>
-          </a:stretch>
-        </p:blipFill>
-        <p:spPr bwMode="auto">
-          <a:xfrm>
-            <a:off x="2195736" y="2348880"/>
-            <a:ext cx="4464496" cy="4111054"/>
-          </a:xfrm>
-          <a:prstGeom prst="rect">
-            <a:avLst/>
-          </a:prstGeom>
-          <a:noFill/>
-          <a:ln>
-            <a:noFill/>
-          </a:ln>
-          <a:effectLst/>
-          <a:extLst>
-            <a:ext uri="{909E8E84-426E-40DD-AFC4-6F175D3DCCD1}">
-              <a14:hiddenFill xmlns:a14="http://schemas.microsoft.com/office/drawing/2010/main">
-                <a:solidFill>
-                  <a:schemeClr val="folHlink"/>
-                </a:solidFill>
-              </a14:hiddenFill>
-            </a:ext>
-            <a:ext uri="{91240B29-F687-4F45-9708-019B960494DF}">
-              <a14:hiddenLine xmlns:a14="http://schemas.microsoft.com/office/drawing/2010/main" w="9525" cap="flat">
-                <a:solidFill>
-                  <a:schemeClr val="bg1"/>
-                </a:solidFill>
-                <a:miter lim="800000"/>
-                <a:headEnd/>
-                <a:tailEnd/>
-              </a14:hiddenLine>
-            </a:ext>
-            <a:ext uri="{AF507438-7753-43E0-B8FC-AC1667EBCBE1}">
-              <a14:hiddenEffects xmlns:a14="http://schemas.microsoft.com/office/drawing/2010/main">
-                <a:effectLst>
-                  <a:outerShdw dist="35921" dir="2700000" algn="ctr" rotWithShape="0">
-                    <a:schemeClr val="accent1"/>
-                  </a:outerShdw>
-                </a:effectLst>
-              </a14:hiddenEffects>
-            </a:ext>
-          </a:extLst>
-        </p:spPr>
-      </p:pic>
-      <p:sp>
-        <p:nvSpPr>
-          <p:cNvPr id="1025" name="TextBox 1024"/>
-          <p:cNvSpPr txBox="1"/>
-          <p:nvPr/>
-        </p:nvSpPr>
-        <p:spPr>
-          <a:xfrm>
-            <a:off x="539552" y="1681458"/>
-            <a:ext cx="1985672" cy="461665"/>
-          </a:xfrm>
-          <a:prstGeom prst="rect">
-            <a:avLst/>
-          </a:prstGeom>
-          <a:noFill/>
-        </p:spPr>
-        <p:txBody>
-          <a:bodyPr wrap="none" rtlCol="0">
-            <a:spAutoFit/>
-          </a:bodyPr>
-          <a:lstStyle/>
-          <a:p>
-            <a:r>
-              <a:rPr lang="en-US" sz="2400" dirty="0" smtClean="0"/>
-              <a:t>Web-</a:t>
-            </a:r>
-            <a:r>
-              <a:rPr lang="ru-RU" sz="2400" dirty="0" smtClean="0"/>
-              <a:t>сервис:</a:t>
-            </a:r>
-            <a:endParaRPr lang="ru-RU" sz="2400" dirty="0"/>
-          </a:p>
-        </p:txBody>
-      </p:sp>
-    </p:spTree>
-    <p:extLst>
-      <p:ext uri="{BB962C8B-B14F-4D97-AF65-F5344CB8AC3E}">
-        <p14:creationId xmlns:p14="http://schemas.microsoft.com/office/powerpoint/2010/main" val="1014406297"/>
-      </p:ext>
-    </p:extLst>
-  </p:cSld>
-  <p:clrMapOvr>
-    <a:masterClrMapping/>
-  </p:clrMapOvr>
-  <p:timing>
-    <p:tnLst>
-      <p:par>
-        <p:cTn id="1" dur="indefinite" restart="never" nodeType="tmRoot"/>
-      </p:par>
-    </p:tnLst>
-  </p:timing>
-</p:sld>
-</file>
-
 <file path=ppt/slides/slide25.xml><?xml version="1.0" encoding="utf-8"?>
 <p:sld xmlns:a="http://schemas.openxmlformats.org/drawingml/2006/main" xmlns:r="http://schemas.openxmlformats.org/officeDocument/2006/relationships" xmlns:p="http://schemas.openxmlformats.org/presentationml/2006/main">
   <p:cSld>
@@ -19182,43 +19707,20 @@
           <a:p>
             <a:r>
               <a:rPr lang="ru-RU" sz="2400" b="0" dirty="0" smtClean="0"/>
-              <a:t>1) </a:t>
-            </a:r>
+              <a:t>1) Выводятся неупорядоченно тематически</a:t>
+            </a:r>
+          </a:p>
+          <a:p>
             <a:r>
               <a:rPr lang="ru-RU" sz="2400" b="0" dirty="0" smtClean="0"/>
-              <a:t>Выводятся </a:t>
-            </a:r>
+              <a:t>2) Неудобно работать с полученными данными</a:t>
+            </a:r>
+          </a:p>
+          <a:p>
             <a:r>
               <a:rPr lang="ru-RU" sz="2400" b="0" dirty="0" smtClean="0"/>
-              <a:t>неупорядоченно </a:t>
-            </a:r>
-            <a:r>
-              <a:rPr lang="ru-RU" sz="2400" b="0" dirty="0" smtClean="0"/>
-              <a:t>тематически</a:t>
-            </a:r>
-            <a:endParaRPr lang="ru-RU" sz="2400" b="0" dirty="0" smtClean="0"/>
-          </a:p>
-          <a:p>
-            <a:r>
-              <a:rPr lang="ru-RU" sz="2400" b="0" dirty="0" smtClean="0"/>
-              <a:t>2) Неудобно работать с полученными </a:t>
-            </a:r>
-            <a:r>
-              <a:rPr lang="ru-RU" sz="2400" b="0" dirty="0" smtClean="0"/>
-              <a:t>данными</a:t>
-            </a:r>
-            <a:endParaRPr lang="ru-RU" sz="2400" b="0" dirty="0" smtClean="0"/>
-          </a:p>
-          <a:p>
-            <a:r>
-              <a:rPr lang="ru-RU" sz="2400" b="0" dirty="0" smtClean="0"/>
-              <a:t>3) Необходимо прописывать более подробный запрос для получения конкретной </a:t>
-            </a:r>
-            <a:r>
-              <a:rPr lang="ru-RU" sz="2400" b="0" dirty="0" smtClean="0"/>
-              <a:t>информации</a:t>
-            </a:r>
-            <a:endParaRPr lang="ru-RU" sz="2400" b="0" dirty="0" smtClean="0"/>
+              <a:t>3) Необходимо прописывать более подробный запрос для получения конкретной информации</a:t>
+            </a:r>
           </a:p>
         </p:txBody>
       </p:sp>
@@ -19541,7 +20043,7 @@
       </p:sp>
       <p:graphicFrame>
         <p:nvGraphicFramePr>
-          <p:cNvPr id="4" name="Содержимое 3"/>
+          <p:cNvPr id="5" name="Объект 4"/>
           <p:cNvGraphicFramePr>
             <a:graphicFrameLocks noGrp="1"/>
           </p:cNvGraphicFramePr>
@@ -19549,37 +20051,61 @@
             <p:ph idx="1"/>
             <p:extLst>
               <p:ext uri="{D42A27DB-BD31-4B8C-83A1-F6EECF244321}">
-                <p14:modId xmlns:p14="http://schemas.microsoft.com/office/powerpoint/2010/main" val="2652293584"/>
+                <p14:modId xmlns:p14="http://schemas.microsoft.com/office/powerpoint/2010/main" val="2394502235"/>
               </p:ext>
             </p:extLst>
           </p:nvPr>
         </p:nvGraphicFramePr>
         <p:xfrm>
-          <a:off x="395536" y="1412776"/>
-          <a:ext cx="8352928" cy="4023360"/>
+          <a:off x="539552" y="1484784"/>
+          <a:ext cx="7620000" cy="5187712"/>
         </p:xfrm>
         <a:graphic>
           <a:graphicData uri="http://schemas.openxmlformats.org/drawingml/2006/table">
             <a:tbl>
               <a:tblPr firstRow="1" bandRow="1">
-                <a:tableStyleId>{69CF1AB2-1976-4502-BF36-3FF5EA218861}</a:tableStyleId>
+                <a:tableStyleId>{16D9F66E-5EB9-4882-86FB-DCBF35E3C3E4}</a:tableStyleId>
               </a:tblPr>
               <a:tblGrid>
-                <a:gridCol w="2088232"/>
-                <a:gridCol w="2088232"/>
-                <a:gridCol w="2088232"/>
-                <a:gridCol w="2088232"/>
+                <a:gridCol w="1905000">
+                  <a:extLst>
+                    <a:ext uri="{9D8B030D-6E8A-4147-A177-3AD203B41FA5}">
+                      <a16:colId xmlns:a16="http://schemas.microsoft.com/office/drawing/2014/main" val="3700718738"/>
+                    </a:ext>
+                  </a:extLst>
+                </a:gridCol>
+                <a:gridCol w="1905000">
+                  <a:extLst>
+                    <a:ext uri="{9D8B030D-6E8A-4147-A177-3AD203B41FA5}">
+                      <a16:colId xmlns:a16="http://schemas.microsoft.com/office/drawing/2014/main" val="1465966498"/>
+                    </a:ext>
+                  </a:extLst>
+                </a:gridCol>
+                <a:gridCol w="1905000">
+                  <a:extLst>
+                    <a:ext uri="{9D8B030D-6E8A-4147-A177-3AD203B41FA5}">
+                      <a16:colId xmlns:a16="http://schemas.microsoft.com/office/drawing/2014/main" val="126907806"/>
+                    </a:ext>
+                  </a:extLst>
+                </a:gridCol>
+                <a:gridCol w="1905000">
+                  <a:extLst>
+                    <a:ext uri="{9D8B030D-6E8A-4147-A177-3AD203B41FA5}">
+                      <a16:colId xmlns:a16="http://schemas.microsoft.com/office/drawing/2014/main" val="2396972351"/>
+                    </a:ext>
+                  </a:extLst>
+                </a:gridCol>
               </a:tblGrid>
-              <a:tr h="370840">
-                <a:tc>
-                  <a:txBody>
-                    <a:bodyPr/>
-                    <a:lstStyle/>
-                    <a:p>
-                      <a:endParaRPr lang="ru-RU" b="1" dirty="0"/>
-                    </a:p>
-                  </a:txBody>
-                  <a:tcPr marL="84663" marR="84663"/>
+              <a:tr h="656064">
+                <a:tc>
+                  <a:txBody>
+                    <a:bodyPr/>
+                    <a:lstStyle/>
+                    <a:p>
+                      <a:endParaRPr lang="ru-RU" dirty="0"/>
+                    </a:p>
+                  </a:txBody>
+                  <a:tcPr/>
                 </a:tc>
                 <a:tc>
                   <a:txBody>
@@ -19593,7 +20119,7 @@
                       <a:endParaRPr lang="ru-RU" dirty="0"/>
                     </a:p>
                   </a:txBody>
-                  <a:tcPr marL="84663" marR="84663"/>
+                  <a:tcPr/>
                 </a:tc>
                 <a:tc>
                   <a:txBody>
@@ -19607,44 +20133,87 @@
                       <a:endParaRPr lang="ru-RU" dirty="0"/>
                     </a:p>
                   </a:txBody>
-                  <a:tcPr marL="84663" marR="84663"/>
-                </a:tc>
-                <a:tc>
-                  <a:txBody>
-                    <a:bodyPr/>
-                    <a:lstStyle/>
-                    <a:p>
-                      <a:r>
-                        <a:rPr lang="ru-RU" dirty="0" smtClean="0"/>
+                  <a:tcPr/>
+                </a:tc>
+                <a:tc>
+                  <a:txBody>
+                    <a:bodyPr/>
+                    <a:lstStyle/>
+                    <a:p>
+                      <a:r>
+                        <a:rPr lang="ru-RU" baseline="0" dirty="0" smtClean="0"/>
                         <a:t>Способ вывода</a:t>
                       </a:r>
                       <a:endParaRPr lang="ru-RU" dirty="0"/>
                     </a:p>
                   </a:txBody>
-                  <a:tcPr marL="84663" marR="84663"/>
-                </a:tc>
+                  <a:tcPr/>
+                </a:tc>
+                <a:extLst>
+                  <a:ext uri="{0D108BD9-81ED-4DB2-BD59-A6C34878D82A}">
+                    <a16:rowId xmlns:a16="http://schemas.microsoft.com/office/drawing/2014/main" val="607727698"/>
+                  </a:ext>
+                </a:extLst>
               </a:tr>
-              <a:tr h="370840">
-                <a:tc>
-                  <a:txBody>
-                    <a:bodyPr/>
-                    <a:lstStyle/>
-                    <a:p>
-                      <a:r>
-                        <a:rPr lang="en-US" b="1" dirty="0" err="1" smtClean="0"/>
+              <a:tr h="1132384">
+                <a:tc>
+                  <a:txBody>
+                    <a:bodyPr/>
+                    <a:lstStyle/>
+                    <a:p>
+                      <a:r>
+                        <a:rPr lang="en-US" b="1" dirty="0" smtClean="0">
+                          <a:latin typeface="+mn-lt"/>
+                        </a:rPr>
+                        <a:t>Yippy</a:t>
+                      </a:r>
+                      <a:r>
+                        <a:rPr lang="en-US" b="1" baseline="0" dirty="0" smtClean="0">
+                          <a:latin typeface="+mn-lt"/>
+                        </a:rPr>
+                        <a:t> </a:t>
+                      </a:r>
+                      <a:br>
+                        <a:rPr lang="en-US" b="1" baseline="0" dirty="0" smtClean="0">
+                          <a:latin typeface="+mn-lt"/>
+                        </a:rPr>
+                      </a:br>
+                      <a:r>
+                        <a:rPr lang="en-US" b="1" baseline="0" dirty="0" smtClean="0">
+                          <a:latin typeface="+mn-lt"/>
+                        </a:rPr>
+                        <a:t>(</a:t>
+                      </a:r>
+                      <a:r>
+                        <a:rPr lang="ru-RU" b="1" baseline="0" dirty="0" smtClean="0">
+                          <a:latin typeface="+mn-lt"/>
+                        </a:rPr>
+                        <a:t>ранее </a:t>
+                      </a:r>
+                      <a:r>
+                        <a:rPr lang="en-US" b="1" baseline="0" dirty="0" err="1" smtClean="0">
+                          <a:latin typeface="+mn-lt"/>
+                        </a:rPr>
                         <a:t>Clusty</a:t>
                       </a:r>
-                      <a:endParaRPr lang="ru-RU" b="1" dirty="0"/>
-                    </a:p>
-                  </a:txBody>
-                  <a:tcPr marL="84663" marR="84663"/>
-                </a:tc>
-                <a:tc>
-                  <a:txBody>
-                    <a:bodyPr/>
-                    <a:lstStyle/>
-                    <a:p>
-                      <a:pPr algn="ctr"/>
+                      <a:r>
+                        <a:rPr lang="en-US" b="1" baseline="0" dirty="0" smtClean="0">
+                          <a:latin typeface="+mn-lt"/>
+                        </a:rPr>
+                        <a:t>)</a:t>
+                      </a:r>
+                      <a:endParaRPr lang="ru-RU" b="1" dirty="0">
+                        <a:latin typeface="+mn-lt"/>
+                      </a:endParaRPr>
+                    </a:p>
+                  </a:txBody>
+                  <a:tcPr/>
+                </a:tc>
+                <a:tc>
+                  <a:txBody>
+                    <a:bodyPr/>
+                    <a:lstStyle/>
+                    <a:p>
                       <a:r>
                         <a:rPr lang="ru-RU" dirty="0" smtClean="0"/>
                         <a:t>Средняя</a:t>
@@ -19652,29 +20221,27 @@
                       <a:endParaRPr lang="ru-RU" dirty="0"/>
                     </a:p>
                   </a:txBody>
-                  <a:tcPr marL="84663" marR="84663"/>
-                </a:tc>
-                <a:tc>
-                  <a:txBody>
-                    <a:bodyPr/>
-                    <a:lstStyle/>
-                    <a:p>
-                      <a:pPr algn="ctr"/>
-                      <a:r>
-                        <a:rPr lang="ru-RU" dirty="0" smtClean="0"/>
-                        <a:t>да</a:t>
-                      </a:r>
-                      <a:endParaRPr lang="ru-RU" dirty="0"/>
-                    </a:p>
-                  </a:txBody>
-                  <a:tcPr marL="84663" marR="84663"/>
-                </a:tc>
-                <a:tc>
-                  <a:txBody>
-                    <a:bodyPr/>
-                    <a:lstStyle/>
-                    <a:p>
-                      <a:pPr algn="ctr"/>
+                  <a:tcPr/>
+                </a:tc>
+                <a:tc>
+                  <a:txBody>
+                    <a:bodyPr/>
+                    <a:lstStyle/>
+                    <a:p>
+                      <a:r>
+                        <a:rPr lang="ru-RU" dirty="0" smtClean="0"/>
+                        <a:t>Нет</a:t>
+                      </a:r>
+                      <a:endParaRPr lang="ru-RU" dirty="0"/>
+                    </a:p>
+                  </a:txBody>
+                  <a:tcPr/>
+                </a:tc>
+                <a:tc>
+                  <a:txBody>
+                    <a:bodyPr/>
+                    <a:lstStyle/>
+                    <a:p>
                       <a:r>
                         <a:rPr lang="ru-RU" dirty="0" smtClean="0"/>
                         <a:t>Группировка по папкам-кластерам</a:t>
@@ -19682,10 +20249,15 @@
                       <a:endParaRPr lang="ru-RU" dirty="0"/>
                     </a:p>
                   </a:txBody>
-                  <a:tcPr marL="84663" marR="84663"/>
-                </a:tc>
+                  <a:tcPr/>
+                </a:tc>
+                <a:extLst>
+                  <a:ext uri="{0D108BD9-81ED-4DB2-BD59-A6C34878D82A}">
+                    <a16:rowId xmlns:a16="http://schemas.microsoft.com/office/drawing/2014/main" val="1471701815"/>
+                  </a:ext>
+                </a:extLst>
               </a:tr>
-              <a:tr h="370840">
+              <a:tr h="656064">
                 <a:tc>
                   <a:txBody>
                     <a:bodyPr/>
@@ -19698,14 +20270,13 @@
                       <a:endParaRPr lang="ru-RU" b="1" dirty="0"/>
                     </a:p>
                   </a:txBody>
-                  <a:tcPr marL="84663" marR="84663"/>
-                </a:tc>
-                <a:tc>
-                  <a:txBody>
-                    <a:bodyPr/>
-                    <a:lstStyle/>
-                    <a:p>
-                      <a:pPr algn="ctr"/>
+                  <a:tcPr/>
+                </a:tc>
+                <a:tc>
+                  <a:txBody>
+                    <a:bodyPr/>
+                    <a:lstStyle/>
+                    <a:p>
                       <a:r>
                         <a:rPr lang="ru-RU" dirty="0" smtClean="0"/>
                         <a:t>Средняя</a:t>
@@ -19713,29 +20284,27 @@
                       <a:endParaRPr lang="ru-RU" dirty="0"/>
                     </a:p>
                   </a:txBody>
-                  <a:tcPr marL="84663" marR="84663"/>
-                </a:tc>
-                <a:tc>
-                  <a:txBody>
-                    <a:bodyPr/>
-                    <a:lstStyle/>
-                    <a:p>
-                      <a:pPr algn="ctr"/>
-                      <a:r>
-                        <a:rPr lang="ru-RU" dirty="0" smtClean="0"/>
-                        <a:t>нет</a:t>
-                      </a:r>
-                      <a:endParaRPr lang="ru-RU" dirty="0"/>
-                    </a:p>
-                  </a:txBody>
-                  <a:tcPr marL="84663" marR="84663"/>
-                </a:tc>
-                <a:tc>
-                  <a:txBody>
-                    <a:bodyPr/>
-                    <a:lstStyle/>
-                    <a:p>
-                      <a:pPr algn="ctr"/>
+                  <a:tcPr/>
+                </a:tc>
+                <a:tc>
+                  <a:txBody>
+                    <a:bodyPr/>
+                    <a:lstStyle/>
+                    <a:p>
+                      <a:r>
+                        <a:rPr lang="ru-RU" dirty="0" smtClean="0"/>
+                        <a:t>Да</a:t>
+                      </a:r>
+                      <a:endParaRPr lang="ru-RU" dirty="0"/>
+                    </a:p>
+                  </a:txBody>
+                  <a:tcPr/>
+                </a:tc>
+                <a:tc>
+                  <a:txBody>
+                    <a:bodyPr/>
+                    <a:lstStyle/>
+                    <a:p>
                       <a:r>
                         <a:rPr lang="ru-RU" dirty="0" smtClean="0"/>
                         <a:t>Фильтрация по тэгам</a:t>
@@ -19743,10 +20312,15 @@
                       <a:endParaRPr lang="ru-RU" dirty="0"/>
                     </a:p>
                   </a:txBody>
-                  <a:tcPr marL="84663" marR="84663"/>
-                </a:tc>
+                  <a:tcPr/>
+                </a:tc>
+                <a:extLst>
+                  <a:ext uri="{0D108BD9-81ED-4DB2-BD59-A6C34878D82A}">
+                    <a16:rowId xmlns:a16="http://schemas.microsoft.com/office/drawing/2014/main" val="1111316873"/>
+                  </a:ext>
+                </a:extLst>
               </a:tr>
-              <a:tr h="370840">
+              <a:tr h="656064">
                 <a:tc>
                   <a:txBody>
                     <a:bodyPr/>
@@ -19759,48 +20333,41 @@
                       <a:endParaRPr lang="ru-RU" b="1" dirty="0"/>
                     </a:p>
                   </a:txBody>
-                  <a:tcPr marL="84663" marR="84663"/>
-                </a:tc>
-                <a:tc>
-                  <a:txBody>
-                    <a:bodyPr/>
-                    <a:lstStyle/>
-                    <a:p>
-                      <a:pPr algn="ctr"/>
-                      <a:r>
-                        <a:rPr lang="ru-RU" dirty="0" smtClean="0"/>
-                        <a:t>Б</a:t>
-                      </a:r>
-                      <a:r>
-                        <a:rPr lang="ru-RU" baseline="0" dirty="0" smtClean="0"/>
-                        <a:t>ольшая</a:t>
-                      </a:r>
-                      <a:endParaRPr lang="ru-RU" dirty="0"/>
-                    </a:p>
-                  </a:txBody>
-                  <a:tcPr marL="84663" marR="84663"/>
-                </a:tc>
-                <a:tc>
-                  <a:txBody>
-                    <a:bodyPr/>
-                    <a:lstStyle/>
-                    <a:p>
-                      <a:pPr algn="ctr"/>
-                      <a:r>
-                        <a:rPr lang="ru-RU" dirty="0" smtClean="0"/>
-                        <a:t>да</a:t>
-                      </a:r>
-                      <a:endParaRPr lang="ru-RU" dirty="0"/>
-                    </a:p>
-                  </a:txBody>
-                  <a:tcPr marL="84663" marR="84663"/>
-                </a:tc>
-                <a:tc>
-                  <a:txBody>
-                    <a:bodyPr/>
-                    <a:lstStyle/>
-                    <a:p>
-                      <a:pPr algn="ctr"/>
+                  <a:tcPr/>
+                </a:tc>
+                <a:tc>
+                  <a:txBody>
+                    <a:bodyPr/>
+                    <a:lstStyle/>
+                    <a:p>
+                      <a:r>
+                        <a:rPr lang="ru-RU" dirty="0" smtClean="0"/>
+                        <a:t>Высокая</a:t>
+                      </a:r>
+                      <a:endParaRPr lang="ru-RU" dirty="0"/>
+                    </a:p>
+                  </a:txBody>
+                  <a:tcPr/>
+                </a:tc>
+                <a:tc>
+                  <a:txBody>
+                    <a:bodyPr/>
+                    <a:lstStyle/>
+                    <a:p>
+                      <a:r>
+                        <a:rPr lang="ru-RU" dirty="0" smtClean="0"/>
+                        <a:t>Да</a:t>
+                      </a:r>
+                      <a:endParaRPr lang="ru-RU" dirty="0"/>
+                    </a:p>
+                  </a:txBody>
+                  <a:tcPr/>
+                </a:tc>
+                <a:tc>
+                  <a:txBody>
+                    <a:bodyPr/>
+                    <a:lstStyle/>
+                    <a:p>
                       <a:r>
                         <a:rPr lang="ru-RU" dirty="0" smtClean="0"/>
                         <a:t>Реализация семантики текста</a:t>
@@ -19808,77 +20375,160 @@
                       <a:endParaRPr lang="ru-RU" dirty="0"/>
                     </a:p>
                   </a:txBody>
-                  <a:tcPr marL="84663" marR="84663"/>
-                </a:tc>
+                  <a:tcPr/>
+                </a:tc>
+                <a:extLst>
+                  <a:ext uri="{0D108BD9-81ED-4DB2-BD59-A6C34878D82A}">
+                    <a16:rowId xmlns:a16="http://schemas.microsoft.com/office/drawing/2014/main" val="780317221"/>
+                  </a:ext>
+                </a:extLst>
               </a:tr>
-              <a:tr h="370840">
-                <a:tc>
-                  <a:txBody>
-                    <a:bodyPr/>
-                    <a:lstStyle/>
-                    <a:p>
-                      <a:r>
-                        <a:rPr lang="en-US" dirty="0" smtClean="0"/>
-                        <a:t>&lt;</a:t>
-                      </a:r>
-                      <a:r>
-                        <a:rPr lang="ru-RU" dirty="0" err="1" smtClean="0"/>
-                        <a:t>наш_поисковик</a:t>
-                      </a:r>
-                      <a:r>
-                        <a:rPr lang="en-US" dirty="0" smtClean="0"/>
-                        <a:t>&gt;</a:t>
-                      </a:r>
-                      <a:endParaRPr lang="ru-RU" dirty="0"/>
-                    </a:p>
-                  </a:txBody>
-                  <a:tcPr marL="84663" marR="84663"/>
-                </a:tc>
-                <a:tc>
-                  <a:txBody>
-                    <a:bodyPr/>
-                    <a:lstStyle/>
-                    <a:p>
-                      <a:pPr algn="ctr"/>
+              <a:tr h="656064">
+                <a:tc>
+                  <a:txBody>
+                    <a:bodyPr/>
+                    <a:lstStyle/>
+                    <a:p>
+                      <a:r>
+                        <a:rPr lang="ru-RU" b="1" dirty="0" smtClean="0"/>
+                        <a:t>Наш</a:t>
+                      </a:r>
+                      <a:r>
+                        <a:rPr lang="ru-RU" b="1" baseline="0" dirty="0" smtClean="0"/>
+                        <a:t> </a:t>
+                      </a:r>
+                      <a:r>
+                        <a:rPr lang="ru-RU" b="1" baseline="0" dirty="0" err="1" smtClean="0"/>
+                        <a:t>кластеризатор</a:t>
+                      </a:r>
+                      <a:r>
+                        <a:rPr lang="ru-RU" b="1" baseline="0" dirty="0" smtClean="0"/>
+                        <a:t> текстов</a:t>
+                      </a:r>
+                      <a:endParaRPr lang="ru-RU" b="1" dirty="0"/>
+                    </a:p>
+                  </a:txBody>
+                  <a:tcPr/>
+                </a:tc>
+                <a:tc>
+                  <a:txBody>
+                    <a:bodyPr/>
+                    <a:lstStyle/>
+                    <a:p>
                       <a:r>
                         <a:rPr lang="ru-RU" dirty="0" smtClean="0"/>
                         <a:t>Средняя</a:t>
                       </a:r>
-                      <a:endParaRPr lang="ru-RU" dirty="0"/>
-                    </a:p>
-                  </a:txBody>
-                  <a:tcPr marL="84663" marR="84663"/>
-                </a:tc>
-                <a:tc>
-                  <a:txBody>
-                    <a:bodyPr/>
-                    <a:lstStyle/>
-                    <a:p>
-                      <a:pPr algn="ctr"/>
-                      <a:r>
-                        <a:rPr lang="ru-RU" dirty="0" smtClean="0"/>
-                        <a:t>да</a:t>
-                      </a:r>
-                      <a:endParaRPr lang="ru-RU" dirty="0"/>
-                    </a:p>
-                  </a:txBody>
-                  <a:tcPr marL="84663" marR="84663"/>
-                </a:tc>
-                <a:tc>
-                  <a:txBody>
-                    <a:bodyPr/>
-                    <a:lstStyle/>
-                    <a:p>
-                      <a:pPr algn="ctr"/>
-                      <a:r>
-                        <a:rPr lang="ru-RU" dirty="0" smtClean="0"/>
-                        <a:t>Группировка по папкам-кластерам</a:t>
-                      </a:r>
-                      <a:endParaRPr lang="ru-RU" dirty="0"/>
-                    </a:p>
-                  </a:txBody>
-                  <a:tcPr marL="84663" marR="84663"/>
-                </a:tc>
+                    </a:p>
+                  </a:txBody>
+                  <a:tcPr/>
+                </a:tc>
+                <a:tc>
+                  <a:txBody>
+                    <a:bodyPr/>
+                    <a:lstStyle/>
+                    <a:p>
+                      <a:r>
+                        <a:rPr lang="ru-RU" dirty="0" smtClean="0"/>
+                        <a:t>Да</a:t>
+                      </a:r>
+                      <a:endParaRPr lang="ru-RU" dirty="0"/>
+                    </a:p>
+                  </a:txBody>
+                  <a:tcPr/>
+                </a:tc>
+                <a:tc>
+                  <a:txBody>
+                    <a:bodyPr/>
+                    <a:lstStyle/>
+                    <a:p>
+                      <a:r>
+                        <a:rPr lang="ru-RU" dirty="0" smtClean="0"/>
+                        <a:t>Графическая визуализация кластеров</a:t>
+                      </a:r>
+                      <a:endParaRPr lang="ru-RU" dirty="0"/>
+                    </a:p>
+                  </a:txBody>
+                  <a:tcPr/>
+                </a:tc>
+                <a:extLst>
+                  <a:ext uri="{0D108BD9-81ED-4DB2-BD59-A6C34878D82A}">
+                    <a16:rowId xmlns:a16="http://schemas.microsoft.com/office/drawing/2014/main" val="2795637270"/>
+                  </a:ext>
+                </a:extLst>
+              </a:tr>
+              <a:tr h="656064">
+                <a:tc>
+                  <a:txBody>
+                    <a:bodyPr/>
+                    <a:lstStyle/>
+                    <a:p>
+                      <a:r>
+                        <a:rPr lang="ru-RU" b="1" dirty="0" smtClean="0"/>
+                        <a:t>Наш </a:t>
+                      </a:r>
+                    </a:p>
+                    <a:p>
+                      <a:r>
+                        <a:rPr lang="ru-RU" b="1" dirty="0" smtClean="0"/>
+                        <a:t>веб-сервис</a:t>
+                      </a:r>
+                      <a:endParaRPr lang="ru-RU" b="1" dirty="0"/>
+                    </a:p>
+                  </a:txBody>
+                  <a:tcPr/>
+                </a:tc>
+                <a:tc>
+                  <a:txBody>
+                    <a:bodyPr/>
+                    <a:lstStyle/>
+                    <a:p>
+                      <a:r>
+                        <a:rPr lang="ru-RU" dirty="0" smtClean="0"/>
+                        <a:t>Средняя</a:t>
+                      </a:r>
+                      <a:endParaRPr lang="ru-RU" dirty="0"/>
+                    </a:p>
+                  </a:txBody>
+                  <a:tcPr/>
+                </a:tc>
+                <a:tc>
+                  <a:txBody>
+                    <a:bodyPr/>
+                    <a:lstStyle/>
+                    <a:p>
+                      <a:r>
+                        <a:rPr lang="ru-RU" dirty="0" smtClean="0"/>
+                        <a:t>Да</a:t>
+                      </a:r>
+                      <a:endParaRPr lang="ru-RU" dirty="0"/>
+                    </a:p>
+                  </a:txBody>
+                  <a:tcPr/>
+                </a:tc>
+                <a:tc>
+                  <a:txBody>
+                    <a:bodyPr/>
+                    <a:lstStyle/>
+                    <a:p>
+                      <a:r>
+                        <a:rPr lang="ru-RU" i="1" dirty="0" smtClean="0"/>
+                        <a:t>В</a:t>
+                      </a:r>
+                      <a:r>
+                        <a:rPr lang="ru-RU" i="1" baseline="0" dirty="0" smtClean="0"/>
+                        <a:t> разработке</a:t>
+                      </a:r>
+                      <a:endParaRPr lang="ru-RU" i="1" dirty="0"/>
+                    </a:p>
+                  </a:txBody>
+                  <a:tcPr/>
+                </a:tc>
+                <a:extLst>
+                  <a:ext uri="{0D108BD9-81ED-4DB2-BD59-A6C34878D82A}">
+                    <a16:rowId xmlns:a16="http://schemas.microsoft.com/office/drawing/2014/main" val="3670773740"/>
+                  </a:ext>
+                </a:extLst>
               </a:tr>
             </a:tbl>
           </a:graphicData>

</xml_diff>